<commit_message>
Add bug-trimming phase to user-workflow.md
</commit_message>
<xml_diff>
--- a/assets/Workflow.pptx
+++ b/assets/Workflow.pptx
@@ -7,6 +7,7 @@
   <p:sldIdLst>
     <p:sldId id="256" r:id="rId2"/>
     <p:sldId id="257" r:id="rId3"/>
+    <p:sldId id="258" r:id="rId4"/>
   </p:sldIdLst>
   <p:sldSz cx="9144000" cy="6858000" type="screen4x3"/>
   <p:notesSz cx="6797675" cy="9926638"/>
@@ -244,7 +245,7 @@
           <a:p>
             <a:fld id="{F1DFEE79-E53D-48D5-A539-1A6C3412748C}" type="datetimeFigureOut">
               <a:rPr lang="en-US" smtClean="0"/>
-              <a:t>5/20/2021</a:t>
+              <a:t>2/21/25</a:t>
             </a:fld>
             <a:endParaRPr lang="en-US"/>
           </a:p>
@@ -414,7 +415,7 @@
           <a:p>
             <a:fld id="{F1DFEE79-E53D-48D5-A539-1A6C3412748C}" type="datetimeFigureOut">
               <a:rPr lang="en-US" smtClean="0"/>
-              <a:t>5/20/2021</a:t>
+              <a:t>2/21/25</a:t>
             </a:fld>
             <a:endParaRPr lang="en-US"/>
           </a:p>
@@ -594,7 +595,7 @@
           <a:p>
             <a:fld id="{F1DFEE79-E53D-48D5-A539-1A6C3412748C}" type="datetimeFigureOut">
               <a:rPr lang="en-US" smtClean="0"/>
-              <a:t>5/20/2021</a:t>
+              <a:t>2/21/25</a:t>
             </a:fld>
             <a:endParaRPr lang="en-US"/>
           </a:p>
@@ -764,7 +765,7 @@
           <a:p>
             <a:fld id="{F1DFEE79-E53D-48D5-A539-1A6C3412748C}" type="datetimeFigureOut">
               <a:rPr lang="en-US" smtClean="0"/>
-              <a:t>5/20/2021</a:t>
+              <a:t>2/21/25</a:t>
             </a:fld>
             <a:endParaRPr lang="en-US"/>
           </a:p>
@@ -1008,7 +1009,7 @@
           <a:p>
             <a:fld id="{F1DFEE79-E53D-48D5-A539-1A6C3412748C}" type="datetimeFigureOut">
               <a:rPr lang="en-US" smtClean="0"/>
-              <a:t>5/20/2021</a:t>
+              <a:t>2/21/25</a:t>
             </a:fld>
             <a:endParaRPr lang="en-US"/>
           </a:p>
@@ -1240,7 +1241,7 @@
           <a:p>
             <a:fld id="{F1DFEE79-E53D-48D5-A539-1A6C3412748C}" type="datetimeFigureOut">
               <a:rPr lang="en-US" smtClean="0"/>
-              <a:t>5/20/2021</a:t>
+              <a:t>2/21/25</a:t>
             </a:fld>
             <a:endParaRPr lang="en-US"/>
           </a:p>
@@ -1607,7 +1608,7 @@
           <a:p>
             <a:fld id="{F1DFEE79-E53D-48D5-A539-1A6C3412748C}" type="datetimeFigureOut">
               <a:rPr lang="en-US" smtClean="0"/>
-              <a:t>5/20/2021</a:t>
+              <a:t>2/21/25</a:t>
             </a:fld>
             <a:endParaRPr lang="en-US"/>
           </a:p>
@@ -1725,7 +1726,7 @@
           <a:p>
             <a:fld id="{F1DFEE79-E53D-48D5-A539-1A6C3412748C}" type="datetimeFigureOut">
               <a:rPr lang="en-US" smtClean="0"/>
-              <a:t>5/20/2021</a:t>
+              <a:t>2/21/25</a:t>
             </a:fld>
             <a:endParaRPr lang="en-US"/>
           </a:p>
@@ -1820,7 +1821,7 @@
           <a:p>
             <a:fld id="{F1DFEE79-E53D-48D5-A539-1A6C3412748C}" type="datetimeFigureOut">
               <a:rPr lang="en-US" smtClean="0"/>
-              <a:t>5/20/2021</a:t>
+              <a:t>2/21/25</a:t>
             </a:fld>
             <a:endParaRPr lang="en-US"/>
           </a:p>
@@ -2097,7 +2098,7 @@
           <a:p>
             <a:fld id="{F1DFEE79-E53D-48D5-A539-1A6C3412748C}" type="datetimeFigureOut">
               <a:rPr lang="en-US" smtClean="0"/>
-              <a:t>5/20/2021</a:t>
+              <a:t>2/21/25</a:t>
             </a:fld>
             <a:endParaRPr lang="en-US"/>
           </a:p>
@@ -2354,7 +2355,7 @@
           <a:p>
             <a:fld id="{F1DFEE79-E53D-48D5-A539-1A6C3412748C}" type="datetimeFigureOut">
               <a:rPr lang="en-US" smtClean="0"/>
-              <a:t>5/20/2021</a:t>
+              <a:t>2/21/25</a:t>
             </a:fld>
             <a:endParaRPr lang="en-US"/>
           </a:p>
@@ -2567,7 +2568,7 @@
           <a:p>
             <a:fld id="{F1DFEE79-E53D-48D5-A539-1A6C3412748C}" type="datetimeFigureOut">
               <a:rPr lang="en-US" smtClean="0"/>
-              <a:t>5/20/2021</a:t>
+              <a:t>2/21/25</a:t>
             </a:fld>
             <a:endParaRPr lang="en-US"/>
           </a:p>
@@ -8776,6 +8777,3282 @@
 </p:sld>
 </file>
 
+<file path=ppt/slides/slide3.xml><?xml version="1.0" encoding="utf-8"?>
+<p:sld xmlns:a="http://schemas.openxmlformats.org/drawingml/2006/main" xmlns:r="http://schemas.openxmlformats.org/officeDocument/2006/relationships" xmlns:p="http://schemas.openxmlformats.org/presentationml/2006/main">
+  <p:cSld>
+    <p:spTree>
+      <p:nvGrpSpPr>
+        <p:cNvPr id="1" name="">
+          <a:extLst>
+            <a:ext uri="{FF2B5EF4-FFF2-40B4-BE49-F238E27FC236}">
+              <a16:creationId xmlns:a16="http://schemas.microsoft.com/office/drawing/2014/main" id="{9F758D80-6C15-9C2B-72A1-DA6B493C28B9}"/>
+            </a:ext>
+          </a:extLst>
+        </p:cNvPr>
+        <p:cNvGrpSpPr/>
+        <p:nvPr/>
+      </p:nvGrpSpPr>
+      <p:grpSpPr>
+        <a:xfrm>
+          <a:off x="0" y="0"/>
+          <a:ext cx="0" cy="0"/>
+          <a:chOff x="0" y="0"/>
+          <a:chExt cx="0" cy="0"/>
+        </a:xfrm>
+      </p:grpSpPr>
+      <p:sp>
+        <p:nvSpPr>
+          <p:cNvPr id="147" name="Rectangle 146">
+            <a:extLst>
+              <a:ext uri="{FF2B5EF4-FFF2-40B4-BE49-F238E27FC236}">
+                <a16:creationId xmlns:a16="http://schemas.microsoft.com/office/drawing/2014/main" id="{6D9AAB06-285C-7686-369E-5ED6650EFAFE}"/>
+              </a:ext>
+            </a:extLst>
+          </p:cNvPr>
+          <p:cNvSpPr/>
+          <p:nvPr/>
+        </p:nvSpPr>
+        <p:spPr>
+          <a:xfrm>
+            <a:off x="2940036" y="2934720"/>
+            <a:ext cx="1432362" cy="589131"/>
+          </a:xfrm>
+          <a:prstGeom prst="rect">
+            <a:avLst/>
+          </a:prstGeom>
+          <a:solidFill>
+            <a:schemeClr val="accent1">
+              <a:lumMod val="20000"/>
+              <a:lumOff val="80000"/>
+            </a:schemeClr>
+          </a:solidFill>
+          <a:ln>
+            <a:noFill/>
+          </a:ln>
+        </p:spPr>
+        <p:style>
+          <a:lnRef idx="2">
+            <a:schemeClr val="accent1">
+              <a:shade val="50000"/>
+            </a:schemeClr>
+          </a:lnRef>
+          <a:fillRef idx="1">
+            <a:schemeClr val="accent1"/>
+          </a:fillRef>
+          <a:effectRef idx="0">
+            <a:schemeClr val="accent1"/>
+          </a:effectRef>
+          <a:fontRef idx="minor">
+            <a:schemeClr val="lt1"/>
+          </a:fontRef>
+        </p:style>
+        <p:txBody>
+          <a:bodyPr rtlCol="0" anchor="t"/>
+          <a:lstStyle/>
+          <a:p>
+            <a:pPr algn="ctr"/>
+            <a:endParaRPr lang="en-SG" sz="1000" dirty="0">
+              <a:solidFill>
+                <a:schemeClr val="accent1">
+                  <a:lumMod val="75000"/>
+                </a:schemeClr>
+              </a:solidFill>
+            </a:endParaRPr>
+          </a:p>
+        </p:txBody>
+      </p:sp>
+      <p:sp>
+        <p:nvSpPr>
+          <p:cNvPr id="136" name="Rectangle 135">
+            <a:extLst>
+              <a:ext uri="{FF2B5EF4-FFF2-40B4-BE49-F238E27FC236}">
+                <a16:creationId xmlns:a16="http://schemas.microsoft.com/office/drawing/2014/main" id="{379E8539-FD6F-7C1B-43DC-D443F35D30FA}"/>
+              </a:ext>
+            </a:extLst>
+          </p:cNvPr>
+          <p:cNvSpPr/>
+          <p:nvPr/>
+        </p:nvSpPr>
+        <p:spPr>
+          <a:xfrm>
+            <a:off x="6528916" y="681201"/>
+            <a:ext cx="1685489" cy="2171556"/>
+          </a:xfrm>
+          <a:prstGeom prst="rect">
+            <a:avLst/>
+          </a:prstGeom>
+          <a:solidFill>
+            <a:schemeClr val="accent1">
+              <a:lumMod val="20000"/>
+              <a:lumOff val="80000"/>
+            </a:schemeClr>
+          </a:solidFill>
+          <a:ln>
+            <a:noFill/>
+          </a:ln>
+        </p:spPr>
+        <p:style>
+          <a:lnRef idx="2">
+            <a:schemeClr val="accent1">
+              <a:shade val="50000"/>
+            </a:schemeClr>
+          </a:lnRef>
+          <a:fillRef idx="1">
+            <a:schemeClr val="accent1"/>
+          </a:fillRef>
+          <a:effectRef idx="0">
+            <a:schemeClr val="accent1"/>
+          </a:effectRef>
+          <a:fontRef idx="minor">
+            <a:schemeClr val="lt1"/>
+          </a:fontRef>
+        </p:style>
+        <p:txBody>
+          <a:bodyPr rtlCol="0" anchor="t"/>
+          <a:lstStyle/>
+          <a:p>
+            <a:pPr algn="ctr"/>
+            <a:r>
+              <a:rPr lang="en-SG" sz="1000" dirty="0">
+                <a:solidFill>
+                  <a:schemeClr val="accent1">
+                    <a:lumMod val="75000"/>
+                  </a:schemeClr>
+                </a:solidFill>
+              </a:rPr>
+              <a:t>Moderation phase</a:t>
+            </a:r>
+          </a:p>
+        </p:txBody>
+      </p:sp>
+      <p:sp>
+        <p:nvSpPr>
+          <p:cNvPr id="135" name="Rectangle 134">
+            <a:extLst>
+              <a:ext uri="{FF2B5EF4-FFF2-40B4-BE49-F238E27FC236}">
+                <a16:creationId xmlns:a16="http://schemas.microsoft.com/office/drawing/2014/main" id="{ED887EFA-A86A-AA2A-CB35-711F884819E0}"/>
+              </a:ext>
+            </a:extLst>
+          </p:cNvPr>
+          <p:cNvSpPr/>
+          <p:nvPr/>
+        </p:nvSpPr>
+        <p:spPr>
+          <a:xfrm>
+            <a:off x="4979025" y="681201"/>
+            <a:ext cx="1463550" cy="2171556"/>
+          </a:xfrm>
+          <a:prstGeom prst="rect">
+            <a:avLst/>
+          </a:prstGeom>
+          <a:solidFill>
+            <a:schemeClr val="accent1">
+              <a:lumMod val="20000"/>
+              <a:lumOff val="80000"/>
+            </a:schemeClr>
+          </a:solidFill>
+          <a:ln>
+            <a:noFill/>
+          </a:ln>
+        </p:spPr>
+        <p:style>
+          <a:lnRef idx="2">
+            <a:schemeClr val="accent1">
+              <a:shade val="50000"/>
+            </a:schemeClr>
+          </a:lnRef>
+          <a:fillRef idx="1">
+            <a:schemeClr val="accent1"/>
+          </a:fillRef>
+          <a:effectRef idx="0">
+            <a:schemeClr val="accent1"/>
+          </a:effectRef>
+          <a:fontRef idx="minor">
+            <a:schemeClr val="lt1"/>
+          </a:fontRef>
+        </p:style>
+        <p:txBody>
+          <a:bodyPr rtlCol="0" anchor="t"/>
+          <a:lstStyle/>
+          <a:p>
+            <a:pPr algn="ctr"/>
+            <a:r>
+              <a:rPr lang="en-SG" sz="1000" dirty="0">
+                <a:solidFill>
+                  <a:schemeClr val="accent1">
+                    <a:lumMod val="75000"/>
+                  </a:schemeClr>
+                </a:solidFill>
+              </a:rPr>
+              <a:t>Tester-response phase</a:t>
+            </a:r>
+          </a:p>
+        </p:txBody>
+      </p:sp>
+      <p:sp>
+        <p:nvSpPr>
+          <p:cNvPr id="128" name="Rectangle 127">
+            <a:extLst>
+              <a:ext uri="{FF2B5EF4-FFF2-40B4-BE49-F238E27FC236}">
+                <a16:creationId xmlns:a16="http://schemas.microsoft.com/office/drawing/2014/main" id="{1B11FE06-1927-DBC3-FA0A-6349D0F49C5D}"/>
+              </a:ext>
+            </a:extLst>
+          </p:cNvPr>
+          <p:cNvSpPr/>
+          <p:nvPr/>
+        </p:nvSpPr>
+        <p:spPr>
+          <a:xfrm>
+            <a:off x="3045972" y="681201"/>
+            <a:ext cx="1851152" cy="2171556"/>
+          </a:xfrm>
+          <a:prstGeom prst="rect">
+            <a:avLst/>
+          </a:prstGeom>
+          <a:solidFill>
+            <a:schemeClr val="accent1">
+              <a:lumMod val="20000"/>
+              <a:lumOff val="80000"/>
+            </a:schemeClr>
+          </a:solidFill>
+          <a:ln>
+            <a:noFill/>
+          </a:ln>
+        </p:spPr>
+        <p:style>
+          <a:lnRef idx="2">
+            <a:schemeClr val="accent1">
+              <a:shade val="50000"/>
+            </a:schemeClr>
+          </a:lnRef>
+          <a:fillRef idx="1">
+            <a:schemeClr val="accent1"/>
+          </a:fillRef>
+          <a:effectRef idx="0">
+            <a:schemeClr val="accent1"/>
+          </a:effectRef>
+          <a:fontRef idx="minor">
+            <a:schemeClr val="lt1"/>
+          </a:fontRef>
+        </p:style>
+        <p:txBody>
+          <a:bodyPr rtlCol="0" anchor="t"/>
+          <a:lstStyle/>
+          <a:p>
+            <a:pPr algn="ctr"/>
+            <a:r>
+              <a:rPr lang="en-SG" sz="1000" dirty="0">
+                <a:solidFill>
+                  <a:schemeClr val="accent1">
+                    <a:lumMod val="75000"/>
+                  </a:schemeClr>
+                </a:solidFill>
+              </a:rPr>
+              <a:t>Dev-response phase</a:t>
+            </a:r>
+          </a:p>
+        </p:txBody>
+      </p:sp>
+      <p:sp>
+        <p:nvSpPr>
+          <p:cNvPr id="9" name="Rectangle 8">
+            <a:extLst>
+              <a:ext uri="{FF2B5EF4-FFF2-40B4-BE49-F238E27FC236}">
+                <a16:creationId xmlns:a16="http://schemas.microsoft.com/office/drawing/2014/main" id="{1784A960-9207-0AEA-351F-98A29BD50AF8}"/>
+              </a:ext>
+            </a:extLst>
+          </p:cNvPr>
+          <p:cNvSpPr/>
+          <p:nvPr/>
+        </p:nvSpPr>
+        <p:spPr>
+          <a:xfrm>
+            <a:off x="1635603" y="684726"/>
+            <a:ext cx="1319170" cy="2839125"/>
+          </a:xfrm>
+          <a:prstGeom prst="rect">
+            <a:avLst/>
+          </a:prstGeom>
+          <a:solidFill>
+            <a:schemeClr val="accent1">
+              <a:lumMod val="20000"/>
+              <a:lumOff val="80000"/>
+            </a:schemeClr>
+          </a:solidFill>
+          <a:ln>
+            <a:noFill/>
+          </a:ln>
+        </p:spPr>
+        <p:style>
+          <a:lnRef idx="2">
+            <a:schemeClr val="accent1">
+              <a:shade val="50000"/>
+            </a:schemeClr>
+          </a:lnRef>
+          <a:fillRef idx="1">
+            <a:schemeClr val="accent1"/>
+          </a:fillRef>
+          <a:effectRef idx="0">
+            <a:schemeClr val="accent1"/>
+          </a:effectRef>
+          <a:fontRef idx="minor">
+            <a:schemeClr val="lt1"/>
+          </a:fontRef>
+        </p:style>
+        <p:txBody>
+          <a:bodyPr rtlCol="0" anchor="t"/>
+          <a:lstStyle/>
+          <a:p>
+            <a:pPr algn="ctr"/>
+            <a:r>
+              <a:rPr lang="en-SG" sz="1000" dirty="0">
+                <a:solidFill>
+                  <a:schemeClr val="accent1">
+                    <a:lumMod val="75000"/>
+                  </a:schemeClr>
+                </a:solidFill>
+              </a:rPr>
+              <a:t>Bug trimming phase</a:t>
+            </a:r>
+          </a:p>
+        </p:txBody>
+      </p:sp>
+      <p:sp>
+        <p:nvSpPr>
+          <p:cNvPr id="91" name="Rounded Rectangle 87">
+            <a:extLst>
+              <a:ext uri="{FF2B5EF4-FFF2-40B4-BE49-F238E27FC236}">
+                <a16:creationId xmlns:a16="http://schemas.microsoft.com/office/drawing/2014/main" id="{4245430E-C4F4-7EB6-F13D-89EFED28384E}"/>
+              </a:ext>
+            </a:extLst>
+          </p:cNvPr>
+          <p:cNvSpPr/>
+          <p:nvPr/>
+        </p:nvSpPr>
+        <p:spPr>
+          <a:xfrm>
+            <a:off x="1771949" y="2303770"/>
+            <a:ext cx="828431" cy="343877"/>
+          </a:xfrm>
+          <a:prstGeom prst="roundRect">
+            <a:avLst>
+              <a:gd name="adj" fmla="val 50000"/>
+            </a:avLst>
+          </a:prstGeom>
+          <a:solidFill>
+            <a:schemeClr val="bg1">
+              <a:lumMod val="85000"/>
+            </a:schemeClr>
+          </a:solidFill>
+        </p:spPr>
+        <p:style>
+          <a:lnRef idx="2">
+            <a:schemeClr val="accent1">
+              <a:shade val="50000"/>
+            </a:schemeClr>
+          </a:lnRef>
+          <a:fillRef idx="1">
+            <a:schemeClr val="accent1"/>
+          </a:fillRef>
+          <a:effectRef idx="0">
+            <a:schemeClr val="accent1"/>
+          </a:effectRef>
+          <a:fontRef idx="minor">
+            <a:schemeClr val="lt1"/>
+          </a:fontRef>
+        </p:style>
+        <p:txBody>
+          <a:bodyPr rtlCol="0" anchor="ctr"/>
+          <a:lstStyle/>
+          <a:p>
+            <a:pPr algn="ctr"/>
+            <a:r>
+              <a:rPr lang="en-US" sz="900" dirty="0">
+                <a:solidFill>
+                  <a:srgbClr val="FF0000"/>
+                </a:solidFill>
+              </a:rPr>
+              <a:t>tester</a:t>
+            </a:r>
+            <a:r>
+              <a:rPr lang="en-US" sz="900" dirty="0">
+                <a:solidFill>
+                  <a:schemeClr val="tx1"/>
+                </a:solidFill>
+              </a:rPr>
+              <a:t>/pe</a:t>
+            </a:r>
+          </a:p>
+        </p:txBody>
+      </p:sp>
+      <p:sp>
+        <p:nvSpPr>
+          <p:cNvPr id="92" name="Rounded Rectangle 90">
+            <a:extLst>
+              <a:ext uri="{FF2B5EF4-FFF2-40B4-BE49-F238E27FC236}">
+                <a16:creationId xmlns:a16="http://schemas.microsoft.com/office/drawing/2014/main" id="{1AA3EF0B-4FA4-7588-E3AB-5800A46581CE}"/>
+              </a:ext>
+            </a:extLst>
+          </p:cNvPr>
+          <p:cNvSpPr/>
+          <p:nvPr/>
+        </p:nvSpPr>
+        <p:spPr>
+          <a:xfrm>
+            <a:off x="3292458" y="2303767"/>
+            <a:ext cx="1168400" cy="343877"/>
+          </a:xfrm>
+          <a:prstGeom prst="roundRect">
+            <a:avLst>
+              <a:gd name="adj" fmla="val 50000"/>
+            </a:avLst>
+          </a:prstGeom>
+          <a:solidFill>
+            <a:schemeClr val="bg1">
+              <a:lumMod val="85000"/>
+            </a:schemeClr>
+          </a:solidFill>
+        </p:spPr>
+        <p:style>
+          <a:lnRef idx="2">
+            <a:schemeClr val="accent1">
+              <a:shade val="50000"/>
+            </a:schemeClr>
+          </a:lnRef>
+          <a:fillRef idx="1">
+            <a:schemeClr val="accent1"/>
+          </a:fillRef>
+          <a:effectRef idx="0">
+            <a:schemeClr val="accent1"/>
+          </a:effectRef>
+          <a:fontRef idx="minor">
+            <a:schemeClr val="lt1"/>
+          </a:fontRef>
+        </p:style>
+        <p:txBody>
+          <a:bodyPr rtlCol="0" anchor="ctr"/>
+          <a:lstStyle/>
+          <a:p>
+            <a:pPr algn="ctr"/>
+            <a:r>
+              <a:rPr lang="en-US" sz="900" dirty="0">
+                <a:solidFill>
+                  <a:schemeClr val="tx1"/>
+                </a:solidFill>
+              </a:rPr>
+              <a:t>module-org/</a:t>
+            </a:r>
+            <a:br>
+              <a:rPr lang="en-US" sz="900" dirty="0">
+                <a:solidFill>
+                  <a:schemeClr val="tx1"/>
+                </a:solidFill>
+              </a:rPr>
+            </a:br>
+            <a:r>
+              <a:rPr lang="en-US" sz="900" dirty="0">
+                <a:solidFill>
+                  <a:schemeClr val="tx1"/>
+                </a:solidFill>
+              </a:rPr>
+              <a:t>pe-dev-response</a:t>
+            </a:r>
+          </a:p>
+        </p:txBody>
+      </p:sp>
+      <p:sp>
+        <p:nvSpPr>
+          <p:cNvPr id="113" name="Rounded Rectangle 91">
+            <a:extLst>
+              <a:ext uri="{FF2B5EF4-FFF2-40B4-BE49-F238E27FC236}">
+                <a16:creationId xmlns:a16="http://schemas.microsoft.com/office/drawing/2014/main" id="{264250FB-DF93-7FB7-0932-14E0D347F72A}"/>
+              </a:ext>
+            </a:extLst>
+          </p:cNvPr>
+          <p:cNvSpPr/>
+          <p:nvPr/>
+        </p:nvSpPr>
+        <p:spPr>
+          <a:xfrm>
+            <a:off x="6845724" y="2303768"/>
+            <a:ext cx="997924" cy="343877"/>
+          </a:xfrm>
+          <a:prstGeom prst="roundRect">
+            <a:avLst>
+              <a:gd name="adj" fmla="val 50000"/>
+            </a:avLst>
+          </a:prstGeom>
+          <a:solidFill>
+            <a:schemeClr val="bg1">
+              <a:lumMod val="85000"/>
+            </a:schemeClr>
+          </a:solidFill>
+        </p:spPr>
+        <p:style>
+          <a:lnRef idx="2">
+            <a:schemeClr val="accent1">
+              <a:shade val="50000"/>
+            </a:schemeClr>
+          </a:lnRef>
+          <a:fillRef idx="1">
+            <a:schemeClr val="accent1"/>
+          </a:fillRef>
+          <a:effectRef idx="0">
+            <a:schemeClr val="accent1"/>
+          </a:effectRef>
+          <a:fontRef idx="minor">
+            <a:schemeClr val="lt1"/>
+          </a:fontRef>
+        </p:style>
+        <p:txBody>
+          <a:bodyPr rtlCol="0" anchor="ctr"/>
+          <a:lstStyle/>
+          <a:p>
+            <a:pPr algn="ctr"/>
+            <a:r>
+              <a:rPr lang="en-US" sz="900" dirty="0">
+                <a:solidFill>
+                  <a:schemeClr val="tx1"/>
+                </a:solidFill>
+              </a:rPr>
+              <a:t>module-org/</a:t>
+            </a:r>
+            <a:br>
+              <a:rPr lang="en-US" sz="900" dirty="0">
+                <a:solidFill>
+                  <a:schemeClr val="tx1"/>
+                </a:solidFill>
+              </a:rPr>
+            </a:br>
+            <a:r>
+              <a:rPr lang="en-US" sz="900" dirty="0">
+                <a:solidFill>
+                  <a:schemeClr val="tx1"/>
+                </a:solidFill>
+              </a:rPr>
+              <a:t>pe-moderation</a:t>
+            </a:r>
+          </a:p>
+        </p:txBody>
+      </p:sp>
+      <p:sp>
+        <p:nvSpPr>
+          <p:cNvPr id="114" name="Folded Corner 112">
+            <a:extLst>
+              <a:ext uri="{FF2B5EF4-FFF2-40B4-BE49-F238E27FC236}">
+                <a16:creationId xmlns:a16="http://schemas.microsoft.com/office/drawing/2014/main" id="{030A5579-3ADA-A1B8-A0F3-32770DBA3B31}"/>
+              </a:ext>
+            </a:extLst>
+          </p:cNvPr>
+          <p:cNvSpPr/>
+          <p:nvPr/>
+        </p:nvSpPr>
+        <p:spPr>
+          <a:xfrm>
+            <a:off x="8389633" y="2303767"/>
+            <a:ext cx="539261" cy="343877"/>
+          </a:xfrm>
+          <a:prstGeom prst="foldedCorner">
+            <a:avLst/>
+          </a:prstGeom>
+          <a:solidFill>
+            <a:schemeClr val="bg1">
+              <a:lumMod val="85000"/>
+            </a:schemeClr>
+          </a:solidFill>
+        </p:spPr>
+        <p:style>
+          <a:lnRef idx="2">
+            <a:schemeClr val="accent1">
+              <a:shade val="50000"/>
+            </a:schemeClr>
+          </a:lnRef>
+          <a:fillRef idx="1">
+            <a:schemeClr val="accent1"/>
+          </a:fillRef>
+          <a:effectRef idx="0">
+            <a:schemeClr val="accent1"/>
+          </a:effectRef>
+          <a:fontRef idx="minor">
+            <a:schemeClr val="lt1"/>
+          </a:fontRef>
+        </p:style>
+        <p:txBody>
+          <a:bodyPr rtlCol="0" anchor="ctr"/>
+          <a:lstStyle/>
+          <a:p>
+            <a:pPr algn="ctr"/>
+            <a:r>
+              <a:rPr lang="en-US" sz="900" dirty="0">
+                <a:solidFill>
+                  <a:schemeClr val="tx1"/>
+                </a:solidFill>
+              </a:rPr>
+              <a:t>report, marks</a:t>
+            </a:r>
+          </a:p>
+        </p:txBody>
+      </p:sp>
+      <p:sp>
+        <p:nvSpPr>
+          <p:cNvPr id="116" name="TextBox 114">
+            <a:extLst>
+              <a:ext uri="{FF2B5EF4-FFF2-40B4-BE49-F238E27FC236}">
+                <a16:creationId xmlns:a16="http://schemas.microsoft.com/office/drawing/2014/main" id="{04A063FA-7B84-C697-51C3-4DFB5C173D2D}"/>
+              </a:ext>
+            </a:extLst>
+          </p:cNvPr>
+          <p:cNvSpPr txBox="1"/>
+          <p:nvPr/>
+        </p:nvSpPr>
+        <p:spPr>
+          <a:xfrm>
+            <a:off x="1996463" y="3190620"/>
+            <a:ext cx="515815" cy="230832"/>
+          </a:xfrm>
+          <a:prstGeom prst="rect">
+            <a:avLst/>
+          </a:prstGeom>
+          <a:noFill/>
+        </p:spPr>
+        <p:txBody>
+          <a:bodyPr wrap="square" rtlCol="0">
+            <a:spAutoFit/>
+          </a:bodyPr>
+          <a:lstStyle/>
+          <a:p>
+            <a:r>
+              <a:rPr lang="en-US" sz="900" dirty="0"/>
+              <a:t>script</a:t>
+            </a:r>
+          </a:p>
+        </p:txBody>
+      </p:sp>
+      <p:cxnSp>
+        <p:nvCxnSpPr>
+          <p:cNvPr id="137" name="Straight Arrow Connector 135">
+            <a:extLst>
+              <a:ext uri="{FF2B5EF4-FFF2-40B4-BE49-F238E27FC236}">
+                <a16:creationId xmlns:a16="http://schemas.microsoft.com/office/drawing/2014/main" id="{706FF20E-588B-2C08-5A61-CDBB9374CBDE}"/>
+              </a:ext>
+            </a:extLst>
+          </p:cNvPr>
+          <p:cNvCxnSpPr>
+            <a:stCxn id="92" idx="3"/>
+            <a:endCxn id="170" idx="1"/>
+          </p:cNvCxnSpPr>
+          <p:nvPr/>
+        </p:nvCxnSpPr>
+        <p:spPr>
+          <a:xfrm flipV="1">
+            <a:off x="4460858" y="2475665"/>
+            <a:ext cx="742587" cy="41"/>
+          </a:xfrm>
+          <a:prstGeom prst="straightConnector1">
+            <a:avLst/>
+          </a:prstGeom>
+          <a:ln w="12700">
+            <a:solidFill>
+              <a:srgbClr val="FF0000"/>
+            </a:solidFill>
+            <a:tailEnd type="triangle"/>
+          </a:ln>
+        </p:spPr>
+        <p:style>
+          <a:lnRef idx="1">
+            <a:schemeClr val="accent1"/>
+          </a:lnRef>
+          <a:fillRef idx="0">
+            <a:schemeClr val="accent1"/>
+          </a:fillRef>
+          <a:effectRef idx="0">
+            <a:schemeClr val="accent1"/>
+          </a:effectRef>
+          <a:fontRef idx="minor">
+            <a:schemeClr val="tx1"/>
+          </a:fontRef>
+        </p:style>
+      </p:cxnSp>
+      <p:cxnSp>
+        <p:nvCxnSpPr>
+          <p:cNvPr id="145" name="Straight Arrow Connector 136">
+            <a:extLst>
+              <a:ext uri="{FF2B5EF4-FFF2-40B4-BE49-F238E27FC236}">
+                <a16:creationId xmlns:a16="http://schemas.microsoft.com/office/drawing/2014/main" id="{CAA0CDAA-D598-8346-9544-991E0C1300AF}"/>
+              </a:ext>
+            </a:extLst>
+          </p:cNvPr>
+          <p:cNvCxnSpPr>
+            <a:cxnSpLocks/>
+            <a:stCxn id="113" idx="3"/>
+            <a:endCxn id="114" idx="1"/>
+          </p:cNvCxnSpPr>
+          <p:nvPr/>
+        </p:nvCxnSpPr>
+        <p:spPr>
+          <a:xfrm flipV="1">
+            <a:off x="7843648" y="2475706"/>
+            <a:ext cx="545985" cy="1"/>
+          </a:xfrm>
+          <a:prstGeom prst="straightConnector1">
+            <a:avLst/>
+          </a:prstGeom>
+          <a:ln w="12700">
+            <a:solidFill>
+              <a:srgbClr val="FF0000"/>
+            </a:solidFill>
+            <a:tailEnd type="triangle"/>
+          </a:ln>
+        </p:spPr>
+        <p:style>
+          <a:lnRef idx="1">
+            <a:schemeClr val="accent1"/>
+          </a:lnRef>
+          <a:fillRef idx="0">
+            <a:schemeClr val="accent1"/>
+          </a:fillRef>
+          <a:effectRef idx="0">
+            <a:schemeClr val="accent1"/>
+          </a:effectRef>
+          <a:fontRef idx="minor">
+            <a:schemeClr val="tx1"/>
+          </a:fontRef>
+        </p:style>
+      </p:cxnSp>
+      <p:sp>
+        <p:nvSpPr>
+          <p:cNvPr id="146" name="TextBox 144">
+            <a:extLst>
+              <a:ext uri="{FF2B5EF4-FFF2-40B4-BE49-F238E27FC236}">
+                <a16:creationId xmlns:a16="http://schemas.microsoft.com/office/drawing/2014/main" id="{F20F8ADF-63F7-A33A-C551-B401EED32442}"/>
+              </a:ext>
+            </a:extLst>
+          </p:cNvPr>
+          <p:cNvSpPr txBox="1"/>
+          <p:nvPr/>
+        </p:nvSpPr>
+        <p:spPr>
+          <a:xfrm>
+            <a:off x="4520379" y="2607241"/>
+            <a:ext cx="515815" cy="230832"/>
+          </a:xfrm>
+          <a:prstGeom prst="rect">
+            <a:avLst/>
+          </a:prstGeom>
+          <a:noFill/>
+        </p:spPr>
+        <p:txBody>
+          <a:bodyPr wrap="square" rtlCol="0">
+            <a:spAutoFit/>
+          </a:bodyPr>
+          <a:lstStyle/>
+          <a:p>
+            <a:r>
+              <a:rPr lang="en-US" sz="900" dirty="0"/>
+              <a:t>script</a:t>
+            </a:r>
+          </a:p>
+        </p:txBody>
+      </p:sp>
+      <p:sp>
+        <p:nvSpPr>
+          <p:cNvPr id="150" name="TextBox 148">
+            <a:extLst>
+              <a:ext uri="{FF2B5EF4-FFF2-40B4-BE49-F238E27FC236}">
+                <a16:creationId xmlns:a16="http://schemas.microsoft.com/office/drawing/2014/main" id="{B78775C2-B76B-71FC-D581-337856938602}"/>
+              </a:ext>
+            </a:extLst>
+          </p:cNvPr>
+          <p:cNvSpPr txBox="1"/>
+          <p:nvPr/>
+        </p:nvSpPr>
+        <p:spPr>
+          <a:xfrm>
+            <a:off x="7815843" y="2589771"/>
+            <a:ext cx="515815" cy="230832"/>
+          </a:xfrm>
+          <a:prstGeom prst="rect">
+            <a:avLst/>
+          </a:prstGeom>
+          <a:noFill/>
+        </p:spPr>
+        <p:txBody>
+          <a:bodyPr wrap="square" rtlCol="0">
+            <a:spAutoFit/>
+          </a:bodyPr>
+          <a:lstStyle/>
+          <a:p>
+            <a:r>
+              <a:rPr lang="en-US" sz="900" dirty="0"/>
+              <a:t>script</a:t>
+            </a:r>
+          </a:p>
+        </p:txBody>
+      </p:sp>
+      <p:sp>
+        <p:nvSpPr>
+          <p:cNvPr id="154" name="Smiley Face 152">
+            <a:extLst>
+              <a:ext uri="{FF2B5EF4-FFF2-40B4-BE49-F238E27FC236}">
+                <a16:creationId xmlns:a16="http://schemas.microsoft.com/office/drawing/2014/main" id="{8DE6BDC3-6C75-8D28-A7D9-517235A96F05}"/>
+              </a:ext>
+            </a:extLst>
+          </p:cNvPr>
+          <p:cNvSpPr/>
+          <p:nvPr/>
+        </p:nvSpPr>
+        <p:spPr>
+          <a:xfrm>
+            <a:off x="2041581" y="1182537"/>
+            <a:ext cx="289166" cy="289166"/>
+          </a:xfrm>
+          <a:prstGeom prst="smileyFace">
+            <a:avLst/>
+          </a:prstGeom>
+          <a:noFill/>
+          <a:ln>
+            <a:solidFill>
+              <a:srgbClr val="0070C0"/>
+            </a:solidFill>
+          </a:ln>
+        </p:spPr>
+        <p:style>
+          <a:lnRef idx="2">
+            <a:schemeClr val="accent1">
+              <a:shade val="50000"/>
+            </a:schemeClr>
+          </a:lnRef>
+          <a:fillRef idx="1">
+            <a:schemeClr val="accent1"/>
+          </a:fillRef>
+          <a:effectRef idx="0">
+            <a:schemeClr val="accent1"/>
+          </a:effectRef>
+          <a:fontRef idx="minor">
+            <a:schemeClr val="lt1"/>
+          </a:fontRef>
+        </p:style>
+        <p:txBody>
+          <a:bodyPr rtlCol="0" anchor="ctr"/>
+          <a:lstStyle/>
+          <a:p>
+            <a:pPr algn="ctr"/>
+            <a:endParaRPr lang="en-US" sz="900">
+              <a:solidFill>
+                <a:schemeClr val="tx1"/>
+              </a:solidFill>
+            </a:endParaRPr>
+          </a:p>
+        </p:txBody>
+      </p:sp>
+      <p:sp>
+        <p:nvSpPr>
+          <p:cNvPr id="155" name="Rectangle 153">
+            <a:extLst>
+              <a:ext uri="{FF2B5EF4-FFF2-40B4-BE49-F238E27FC236}">
+                <a16:creationId xmlns:a16="http://schemas.microsoft.com/office/drawing/2014/main" id="{DEAAA19D-470C-E70B-263B-E190C68DA648}"/>
+              </a:ext>
+            </a:extLst>
+          </p:cNvPr>
+          <p:cNvSpPr/>
+          <p:nvPr/>
+        </p:nvSpPr>
+        <p:spPr>
+          <a:xfrm>
+            <a:off x="1871494" y="1758782"/>
+            <a:ext cx="629340" cy="257908"/>
+          </a:xfrm>
+          <a:prstGeom prst="rect">
+            <a:avLst/>
+          </a:prstGeom>
+          <a:solidFill>
+            <a:schemeClr val="accent2">
+              <a:lumMod val="20000"/>
+              <a:lumOff val="80000"/>
+            </a:schemeClr>
+          </a:solidFill>
+          <a:ln>
+            <a:solidFill>
+              <a:schemeClr val="accent2"/>
+            </a:solidFill>
+          </a:ln>
+        </p:spPr>
+        <p:style>
+          <a:lnRef idx="2">
+            <a:schemeClr val="accent1">
+              <a:shade val="50000"/>
+            </a:schemeClr>
+          </a:lnRef>
+          <a:fillRef idx="1">
+            <a:schemeClr val="accent1"/>
+          </a:fillRef>
+          <a:effectRef idx="0">
+            <a:schemeClr val="accent1"/>
+          </a:effectRef>
+          <a:fontRef idx="minor">
+            <a:schemeClr val="lt1"/>
+          </a:fontRef>
+        </p:style>
+        <p:txBody>
+          <a:bodyPr rtlCol="0" anchor="ctr"/>
+          <a:lstStyle/>
+          <a:p>
+            <a:pPr algn="ctr"/>
+            <a:r>
+              <a:rPr lang="en-US" sz="900" dirty="0" err="1">
+                <a:solidFill>
+                  <a:schemeClr val="tx1"/>
+                </a:solidFill>
+              </a:rPr>
+              <a:t>CATcher</a:t>
+            </a:r>
+            <a:endParaRPr lang="en-US" sz="900" dirty="0">
+              <a:solidFill>
+                <a:schemeClr val="tx1"/>
+              </a:solidFill>
+            </a:endParaRPr>
+          </a:p>
+        </p:txBody>
+      </p:sp>
+      <p:cxnSp>
+        <p:nvCxnSpPr>
+          <p:cNvPr id="156" name="Straight Arrow Connector 154">
+            <a:extLst>
+              <a:ext uri="{FF2B5EF4-FFF2-40B4-BE49-F238E27FC236}">
+                <a16:creationId xmlns:a16="http://schemas.microsoft.com/office/drawing/2014/main" id="{69872B07-C95F-CCEF-5A30-2C1052CE4788}"/>
+              </a:ext>
+            </a:extLst>
+          </p:cNvPr>
+          <p:cNvCxnSpPr>
+            <a:stCxn id="154" idx="4"/>
+            <a:endCxn id="155" idx="0"/>
+          </p:cNvCxnSpPr>
+          <p:nvPr/>
+        </p:nvCxnSpPr>
+        <p:spPr>
+          <a:xfrm>
+            <a:off x="2186164" y="1471703"/>
+            <a:ext cx="0" cy="287079"/>
+          </a:xfrm>
+          <a:prstGeom prst="straightConnector1">
+            <a:avLst/>
+          </a:prstGeom>
+          <a:ln w="12700">
+            <a:solidFill>
+              <a:schemeClr val="accent2"/>
+            </a:solidFill>
+            <a:prstDash val="sysDot"/>
+            <a:tailEnd type="triangle"/>
+          </a:ln>
+        </p:spPr>
+        <p:style>
+          <a:lnRef idx="1">
+            <a:schemeClr val="accent1"/>
+          </a:lnRef>
+          <a:fillRef idx="0">
+            <a:schemeClr val="accent1"/>
+          </a:fillRef>
+          <a:effectRef idx="0">
+            <a:schemeClr val="accent1"/>
+          </a:effectRef>
+          <a:fontRef idx="minor">
+            <a:schemeClr val="tx1"/>
+          </a:fontRef>
+        </p:style>
+      </p:cxnSp>
+      <p:cxnSp>
+        <p:nvCxnSpPr>
+          <p:cNvPr id="157" name="Straight Arrow Connector 155">
+            <a:extLst>
+              <a:ext uri="{FF2B5EF4-FFF2-40B4-BE49-F238E27FC236}">
+                <a16:creationId xmlns:a16="http://schemas.microsoft.com/office/drawing/2014/main" id="{2A56298D-1F2C-D18A-78A1-1DF5B65B22D1}"/>
+              </a:ext>
+            </a:extLst>
+          </p:cNvPr>
+          <p:cNvCxnSpPr>
+            <a:stCxn id="155" idx="2"/>
+            <a:endCxn id="91" idx="0"/>
+          </p:cNvCxnSpPr>
+          <p:nvPr/>
+        </p:nvCxnSpPr>
+        <p:spPr>
+          <a:xfrm>
+            <a:off x="2186164" y="2016690"/>
+            <a:ext cx="1" cy="287080"/>
+          </a:xfrm>
+          <a:prstGeom prst="straightConnector1">
+            <a:avLst/>
+          </a:prstGeom>
+          <a:ln w="12700">
+            <a:solidFill>
+              <a:schemeClr val="accent2"/>
+            </a:solidFill>
+            <a:prstDash val="sysDot"/>
+            <a:tailEnd type="triangle"/>
+          </a:ln>
+        </p:spPr>
+        <p:style>
+          <a:lnRef idx="1">
+            <a:schemeClr val="accent1"/>
+          </a:lnRef>
+          <a:fillRef idx="0">
+            <a:schemeClr val="accent1"/>
+          </a:fillRef>
+          <a:effectRef idx="0">
+            <a:schemeClr val="accent1"/>
+          </a:effectRef>
+          <a:fontRef idx="minor">
+            <a:schemeClr val="tx1"/>
+          </a:fontRef>
+        </p:style>
+      </p:cxnSp>
+      <p:sp>
+        <p:nvSpPr>
+          <p:cNvPr id="158" name="TextBox 156">
+            <a:extLst>
+              <a:ext uri="{FF2B5EF4-FFF2-40B4-BE49-F238E27FC236}">
+                <a16:creationId xmlns:a16="http://schemas.microsoft.com/office/drawing/2014/main" id="{A2BD10C5-00CE-2797-8555-65C3782E98EE}"/>
+              </a:ext>
+            </a:extLst>
+          </p:cNvPr>
+          <p:cNvSpPr txBox="1"/>
+          <p:nvPr/>
+        </p:nvSpPr>
+        <p:spPr>
+          <a:xfrm>
+            <a:off x="1842288" y="951705"/>
+            <a:ext cx="687753" cy="230832"/>
+          </a:xfrm>
+          <a:prstGeom prst="rect">
+            <a:avLst/>
+          </a:prstGeom>
+          <a:noFill/>
+        </p:spPr>
+        <p:txBody>
+          <a:bodyPr wrap="square" rtlCol="0">
+            <a:spAutoFit/>
+          </a:bodyPr>
+          <a:lstStyle/>
+          <a:p>
+            <a:pPr algn="ctr"/>
+            <a:r>
+              <a:rPr lang="en-US" sz="900" dirty="0"/>
+              <a:t>testers</a:t>
+            </a:r>
+          </a:p>
+        </p:txBody>
+      </p:sp>
+      <p:sp>
+        <p:nvSpPr>
+          <p:cNvPr id="159" name="Smiley Face 157">
+            <a:extLst>
+              <a:ext uri="{FF2B5EF4-FFF2-40B4-BE49-F238E27FC236}">
+                <a16:creationId xmlns:a16="http://schemas.microsoft.com/office/drawing/2014/main" id="{20F58ABA-FFF1-2A3A-B5E2-C808AD162CDD}"/>
+              </a:ext>
+            </a:extLst>
+          </p:cNvPr>
+          <p:cNvSpPr/>
+          <p:nvPr/>
+        </p:nvSpPr>
+        <p:spPr>
+          <a:xfrm>
+            <a:off x="3710580" y="1182537"/>
+            <a:ext cx="289166" cy="289166"/>
+          </a:xfrm>
+          <a:prstGeom prst="smileyFace">
+            <a:avLst/>
+          </a:prstGeom>
+          <a:noFill/>
+          <a:ln>
+            <a:solidFill>
+              <a:srgbClr val="00B050"/>
+            </a:solidFill>
+          </a:ln>
+        </p:spPr>
+        <p:style>
+          <a:lnRef idx="2">
+            <a:schemeClr val="accent1">
+              <a:shade val="50000"/>
+            </a:schemeClr>
+          </a:lnRef>
+          <a:fillRef idx="1">
+            <a:schemeClr val="accent1"/>
+          </a:fillRef>
+          <a:effectRef idx="0">
+            <a:schemeClr val="accent1"/>
+          </a:effectRef>
+          <a:fontRef idx="minor">
+            <a:schemeClr val="lt1"/>
+          </a:fontRef>
+        </p:style>
+        <p:txBody>
+          <a:bodyPr rtlCol="0" anchor="ctr"/>
+          <a:lstStyle/>
+          <a:p>
+            <a:pPr algn="ctr"/>
+            <a:endParaRPr lang="en-US" sz="900">
+              <a:solidFill>
+                <a:schemeClr val="tx1"/>
+              </a:solidFill>
+            </a:endParaRPr>
+          </a:p>
+        </p:txBody>
+      </p:sp>
+      <p:sp>
+        <p:nvSpPr>
+          <p:cNvPr id="160" name="Rectangle 158">
+            <a:extLst>
+              <a:ext uri="{FF2B5EF4-FFF2-40B4-BE49-F238E27FC236}">
+                <a16:creationId xmlns:a16="http://schemas.microsoft.com/office/drawing/2014/main" id="{21289C21-19D2-544F-21A2-0ED291A6FCC5}"/>
+              </a:ext>
+            </a:extLst>
+          </p:cNvPr>
+          <p:cNvSpPr/>
+          <p:nvPr/>
+        </p:nvSpPr>
+        <p:spPr>
+          <a:xfrm>
+            <a:off x="3540493" y="1758782"/>
+            <a:ext cx="629340" cy="257908"/>
+          </a:xfrm>
+          <a:prstGeom prst="rect">
+            <a:avLst/>
+          </a:prstGeom>
+          <a:solidFill>
+            <a:schemeClr val="accent2">
+              <a:lumMod val="20000"/>
+              <a:lumOff val="80000"/>
+            </a:schemeClr>
+          </a:solidFill>
+          <a:ln>
+            <a:solidFill>
+              <a:schemeClr val="accent2"/>
+            </a:solidFill>
+          </a:ln>
+        </p:spPr>
+        <p:style>
+          <a:lnRef idx="2">
+            <a:schemeClr val="accent1">
+              <a:shade val="50000"/>
+            </a:schemeClr>
+          </a:lnRef>
+          <a:fillRef idx="1">
+            <a:schemeClr val="accent1"/>
+          </a:fillRef>
+          <a:effectRef idx="0">
+            <a:schemeClr val="accent1"/>
+          </a:effectRef>
+          <a:fontRef idx="minor">
+            <a:schemeClr val="lt1"/>
+          </a:fontRef>
+        </p:style>
+        <p:txBody>
+          <a:bodyPr rtlCol="0" anchor="ctr"/>
+          <a:lstStyle/>
+          <a:p>
+            <a:pPr algn="ctr"/>
+            <a:r>
+              <a:rPr lang="en-US" sz="900" dirty="0" err="1">
+                <a:solidFill>
+                  <a:schemeClr val="tx1"/>
+                </a:solidFill>
+              </a:rPr>
+              <a:t>CATcher</a:t>
+            </a:r>
+            <a:endParaRPr lang="en-US" sz="900" dirty="0">
+              <a:solidFill>
+                <a:schemeClr val="tx1"/>
+              </a:solidFill>
+            </a:endParaRPr>
+          </a:p>
+        </p:txBody>
+      </p:sp>
+      <p:cxnSp>
+        <p:nvCxnSpPr>
+          <p:cNvPr id="161" name="Straight Arrow Connector 159">
+            <a:extLst>
+              <a:ext uri="{FF2B5EF4-FFF2-40B4-BE49-F238E27FC236}">
+                <a16:creationId xmlns:a16="http://schemas.microsoft.com/office/drawing/2014/main" id="{CEAB65C6-E690-4799-481F-0BAC72371A05}"/>
+              </a:ext>
+            </a:extLst>
+          </p:cNvPr>
+          <p:cNvCxnSpPr>
+            <a:stCxn id="159" idx="4"/>
+            <a:endCxn id="160" idx="0"/>
+          </p:cNvCxnSpPr>
+          <p:nvPr/>
+        </p:nvCxnSpPr>
+        <p:spPr>
+          <a:xfrm>
+            <a:off x="3855163" y="1471703"/>
+            <a:ext cx="0" cy="287079"/>
+          </a:xfrm>
+          <a:prstGeom prst="straightConnector1">
+            <a:avLst/>
+          </a:prstGeom>
+          <a:ln w="12700">
+            <a:solidFill>
+              <a:schemeClr val="accent2"/>
+            </a:solidFill>
+            <a:prstDash val="sysDot"/>
+            <a:tailEnd type="triangle"/>
+          </a:ln>
+        </p:spPr>
+        <p:style>
+          <a:lnRef idx="1">
+            <a:schemeClr val="accent1"/>
+          </a:lnRef>
+          <a:fillRef idx="0">
+            <a:schemeClr val="accent1"/>
+          </a:fillRef>
+          <a:effectRef idx="0">
+            <a:schemeClr val="accent1"/>
+          </a:effectRef>
+          <a:fontRef idx="minor">
+            <a:schemeClr val="tx1"/>
+          </a:fontRef>
+        </p:style>
+      </p:cxnSp>
+      <p:cxnSp>
+        <p:nvCxnSpPr>
+          <p:cNvPr id="162" name="Straight Arrow Connector 160">
+            <a:extLst>
+              <a:ext uri="{FF2B5EF4-FFF2-40B4-BE49-F238E27FC236}">
+                <a16:creationId xmlns:a16="http://schemas.microsoft.com/office/drawing/2014/main" id="{43B7141A-9BDD-7652-DCB1-D4B3B02E1AD4}"/>
+              </a:ext>
+            </a:extLst>
+          </p:cNvPr>
+          <p:cNvCxnSpPr>
+            <a:stCxn id="160" idx="2"/>
+          </p:cNvCxnSpPr>
+          <p:nvPr/>
+        </p:nvCxnSpPr>
+        <p:spPr>
+          <a:xfrm>
+            <a:off x="3855163" y="2016690"/>
+            <a:ext cx="1" cy="287080"/>
+          </a:xfrm>
+          <a:prstGeom prst="straightConnector1">
+            <a:avLst/>
+          </a:prstGeom>
+          <a:ln w="12700">
+            <a:solidFill>
+              <a:schemeClr val="accent2"/>
+            </a:solidFill>
+            <a:prstDash val="sysDot"/>
+            <a:tailEnd type="triangle"/>
+          </a:ln>
+        </p:spPr>
+        <p:style>
+          <a:lnRef idx="1">
+            <a:schemeClr val="accent1"/>
+          </a:lnRef>
+          <a:fillRef idx="0">
+            <a:schemeClr val="accent1"/>
+          </a:fillRef>
+          <a:effectRef idx="0">
+            <a:schemeClr val="accent1"/>
+          </a:effectRef>
+          <a:fontRef idx="minor">
+            <a:schemeClr val="tx1"/>
+          </a:fontRef>
+        </p:style>
+      </p:cxnSp>
+      <p:sp>
+        <p:nvSpPr>
+          <p:cNvPr id="163" name="TextBox 161">
+            <a:extLst>
+              <a:ext uri="{FF2B5EF4-FFF2-40B4-BE49-F238E27FC236}">
+                <a16:creationId xmlns:a16="http://schemas.microsoft.com/office/drawing/2014/main" id="{6897368A-6330-42AB-1283-40BC30421DF4}"/>
+              </a:ext>
+            </a:extLst>
+          </p:cNvPr>
+          <p:cNvSpPr txBox="1"/>
+          <p:nvPr/>
+        </p:nvSpPr>
+        <p:spPr>
+          <a:xfrm>
+            <a:off x="3511287" y="951705"/>
+            <a:ext cx="687753" cy="230832"/>
+          </a:xfrm>
+          <a:prstGeom prst="rect">
+            <a:avLst/>
+          </a:prstGeom>
+          <a:noFill/>
+        </p:spPr>
+        <p:txBody>
+          <a:bodyPr wrap="square" rtlCol="0">
+            <a:spAutoFit/>
+          </a:bodyPr>
+          <a:lstStyle/>
+          <a:p>
+            <a:pPr algn="ctr"/>
+            <a:r>
+              <a:rPr lang="en-US" sz="900" dirty="0" err="1"/>
+              <a:t>devs</a:t>
+            </a:r>
+            <a:endParaRPr lang="en-US" sz="900" dirty="0"/>
+          </a:p>
+        </p:txBody>
+      </p:sp>
+      <p:sp>
+        <p:nvSpPr>
+          <p:cNvPr id="164" name="Smiley Face 162">
+            <a:extLst>
+              <a:ext uri="{FF2B5EF4-FFF2-40B4-BE49-F238E27FC236}">
+                <a16:creationId xmlns:a16="http://schemas.microsoft.com/office/drawing/2014/main" id="{9F84D06A-1E2A-2CFB-DA94-F1F10C00EBF2}"/>
+              </a:ext>
+            </a:extLst>
+          </p:cNvPr>
+          <p:cNvSpPr/>
+          <p:nvPr/>
+        </p:nvSpPr>
+        <p:spPr>
+          <a:xfrm>
+            <a:off x="7131931" y="1182537"/>
+            <a:ext cx="289166" cy="289166"/>
+          </a:xfrm>
+          <a:prstGeom prst="smileyFace">
+            <a:avLst/>
+          </a:prstGeom>
+          <a:noFill/>
+          <a:ln>
+            <a:solidFill>
+              <a:schemeClr val="tx1"/>
+            </a:solidFill>
+          </a:ln>
+        </p:spPr>
+        <p:style>
+          <a:lnRef idx="2">
+            <a:schemeClr val="accent1">
+              <a:shade val="50000"/>
+            </a:schemeClr>
+          </a:lnRef>
+          <a:fillRef idx="1">
+            <a:schemeClr val="accent1"/>
+          </a:fillRef>
+          <a:effectRef idx="0">
+            <a:schemeClr val="accent1"/>
+          </a:effectRef>
+          <a:fontRef idx="minor">
+            <a:schemeClr val="lt1"/>
+          </a:fontRef>
+        </p:style>
+        <p:txBody>
+          <a:bodyPr rtlCol="0" anchor="ctr"/>
+          <a:lstStyle/>
+          <a:p>
+            <a:pPr algn="ctr"/>
+            <a:endParaRPr lang="en-US" sz="900">
+              <a:solidFill>
+                <a:schemeClr val="tx1"/>
+              </a:solidFill>
+            </a:endParaRPr>
+          </a:p>
+        </p:txBody>
+      </p:sp>
+      <p:sp>
+        <p:nvSpPr>
+          <p:cNvPr id="165" name="Rectangle 163">
+            <a:extLst>
+              <a:ext uri="{FF2B5EF4-FFF2-40B4-BE49-F238E27FC236}">
+                <a16:creationId xmlns:a16="http://schemas.microsoft.com/office/drawing/2014/main" id="{458E81C4-B001-AF37-DC17-9EDB29588B21}"/>
+              </a:ext>
+            </a:extLst>
+          </p:cNvPr>
+          <p:cNvSpPr/>
+          <p:nvPr/>
+        </p:nvSpPr>
+        <p:spPr>
+          <a:xfrm>
+            <a:off x="6961844" y="1758782"/>
+            <a:ext cx="629340" cy="257908"/>
+          </a:xfrm>
+          <a:prstGeom prst="rect">
+            <a:avLst/>
+          </a:prstGeom>
+          <a:solidFill>
+            <a:schemeClr val="accent2">
+              <a:lumMod val="20000"/>
+              <a:lumOff val="80000"/>
+            </a:schemeClr>
+          </a:solidFill>
+          <a:ln>
+            <a:solidFill>
+              <a:schemeClr val="accent2"/>
+            </a:solidFill>
+          </a:ln>
+        </p:spPr>
+        <p:style>
+          <a:lnRef idx="2">
+            <a:schemeClr val="accent1">
+              <a:shade val="50000"/>
+            </a:schemeClr>
+          </a:lnRef>
+          <a:fillRef idx="1">
+            <a:schemeClr val="accent1"/>
+          </a:fillRef>
+          <a:effectRef idx="0">
+            <a:schemeClr val="accent1"/>
+          </a:effectRef>
+          <a:fontRef idx="minor">
+            <a:schemeClr val="lt1"/>
+          </a:fontRef>
+        </p:style>
+        <p:txBody>
+          <a:bodyPr rtlCol="0" anchor="ctr"/>
+          <a:lstStyle/>
+          <a:p>
+            <a:pPr algn="ctr"/>
+            <a:r>
+              <a:rPr lang="en-US" sz="900" dirty="0" err="1">
+                <a:solidFill>
+                  <a:schemeClr val="tx1"/>
+                </a:solidFill>
+              </a:rPr>
+              <a:t>CATcher</a:t>
+            </a:r>
+            <a:endParaRPr lang="en-US" sz="900" dirty="0">
+              <a:solidFill>
+                <a:schemeClr val="tx1"/>
+              </a:solidFill>
+            </a:endParaRPr>
+          </a:p>
+        </p:txBody>
+      </p:sp>
+      <p:cxnSp>
+        <p:nvCxnSpPr>
+          <p:cNvPr id="166" name="Straight Arrow Connector 164">
+            <a:extLst>
+              <a:ext uri="{FF2B5EF4-FFF2-40B4-BE49-F238E27FC236}">
+                <a16:creationId xmlns:a16="http://schemas.microsoft.com/office/drawing/2014/main" id="{56E7DF6B-2BD0-7F8E-3504-E7F5D8DAA2B4}"/>
+              </a:ext>
+            </a:extLst>
+          </p:cNvPr>
+          <p:cNvCxnSpPr>
+            <a:stCxn id="164" idx="4"/>
+            <a:endCxn id="165" idx="0"/>
+          </p:cNvCxnSpPr>
+          <p:nvPr/>
+        </p:nvCxnSpPr>
+        <p:spPr>
+          <a:xfrm>
+            <a:off x="7276514" y="1471703"/>
+            <a:ext cx="0" cy="287079"/>
+          </a:xfrm>
+          <a:prstGeom prst="straightConnector1">
+            <a:avLst/>
+          </a:prstGeom>
+          <a:ln w="12700">
+            <a:solidFill>
+              <a:schemeClr val="accent2"/>
+            </a:solidFill>
+            <a:prstDash val="sysDot"/>
+            <a:tailEnd type="triangle"/>
+          </a:ln>
+        </p:spPr>
+        <p:style>
+          <a:lnRef idx="1">
+            <a:schemeClr val="accent1"/>
+          </a:lnRef>
+          <a:fillRef idx="0">
+            <a:schemeClr val="accent1"/>
+          </a:fillRef>
+          <a:effectRef idx="0">
+            <a:schemeClr val="accent1"/>
+          </a:effectRef>
+          <a:fontRef idx="minor">
+            <a:schemeClr val="tx1"/>
+          </a:fontRef>
+        </p:style>
+      </p:cxnSp>
+      <p:cxnSp>
+        <p:nvCxnSpPr>
+          <p:cNvPr id="167" name="Straight Arrow Connector 165">
+            <a:extLst>
+              <a:ext uri="{FF2B5EF4-FFF2-40B4-BE49-F238E27FC236}">
+                <a16:creationId xmlns:a16="http://schemas.microsoft.com/office/drawing/2014/main" id="{A968DD05-E1CC-60DB-0AB8-B674457B8C29}"/>
+              </a:ext>
+            </a:extLst>
+          </p:cNvPr>
+          <p:cNvCxnSpPr>
+            <a:stCxn id="165" idx="2"/>
+          </p:cNvCxnSpPr>
+          <p:nvPr/>
+        </p:nvCxnSpPr>
+        <p:spPr>
+          <a:xfrm>
+            <a:off x="7276514" y="2016690"/>
+            <a:ext cx="1" cy="287080"/>
+          </a:xfrm>
+          <a:prstGeom prst="straightConnector1">
+            <a:avLst/>
+          </a:prstGeom>
+          <a:ln w="12700">
+            <a:solidFill>
+              <a:schemeClr val="accent2"/>
+            </a:solidFill>
+            <a:prstDash val="sysDot"/>
+            <a:tailEnd type="triangle"/>
+          </a:ln>
+        </p:spPr>
+        <p:style>
+          <a:lnRef idx="1">
+            <a:schemeClr val="accent1"/>
+          </a:lnRef>
+          <a:fillRef idx="0">
+            <a:schemeClr val="accent1"/>
+          </a:fillRef>
+          <a:effectRef idx="0">
+            <a:schemeClr val="accent1"/>
+          </a:effectRef>
+          <a:fontRef idx="minor">
+            <a:schemeClr val="tx1"/>
+          </a:fontRef>
+        </p:style>
+      </p:cxnSp>
+      <p:sp>
+        <p:nvSpPr>
+          <p:cNvPr id="168" name="TextBox 166">
+            <a:extLst>
+              <a:ext uri="{FF2B5EF4-FFF2-40B4-BE49-F238E27FC236}">
+                <a16:creationId xmlns:a16="http://schemas.microsoft.com/office/drawing/2014/main" id="{6F470ADE-D457-6D2E-49E4-EF37B41CC6C5}"/>
+              </a:ext>
+            </a:extLst>
+          </p:cNvPr>
+          <p:cNvSpPr txBox="1"/>
+          <p:nvPr/>
+        </p:nvSpPr>
+        <p:spPr>
+          <a:xfrm>
+            <a:off x="6932638" y="951705"/>
+            <a:ext cx="687753" cy="230832"/>
+          </a:xfrm>
+          <a:prstGeom prst="rect">
+            <a:avLst/>
+          </a:prstGeom>
+          <a:noFill/>
+        </p:spPr>
+        <p:txBody>
+          <a:bodyPr wrap="square" rtlCol="0">
+            <a:spAutoFit/>
+          </a:bodyPr>
+          <a:lstStyle/>
+          <a:p>
+            <a:pPr algn="ctr"/>
+            <a:r>
+              <a:rPr lang="en-US" sz="900" dirty="0"/>
+              <a:t>tutors</a:t>
+            </a:r>
+          </a:p>
+        </p:txBody>
+      </p:sp>
+      <p:sp>
+        <p:nvSpPr>
+          <p:cNvPr id="169" name="TextBox 167">
+            <a:extLst>
+              <a:ext uri="{FF2B5EF4-FFF2-40B4-BE49-F238E27FC236}">
+                <a16:creationId xmlns:a16="http://schemas.microsoft.com/office/drawing/2014/main" id="{0655FEC7-6455-85B5-882A-BFEFA75E292E}"/>
+              </a:ext>
+            </a:extLst>
+          </p:cNvPr>
+          <p:cNvSpPr txBox="1"/>
+          <p:nvPr/>
+        </p:nvSpPr>
+        <p:spPr>
+          <a:xfrm>
+            <a:off x="89205" y="61969"/>
+            <a:ext cx="1380230" cy="369332"/>
+          </a:xfrm>
+          <a:prstGeom prst="rect">
+            <a:avLst/>
+          </a:prstGeom>
+          <a:noFill/>
+        </p:spPr>
+        <p:txBody>
+          <a:bodyPr wrap="square" rtlCol="0">
+            <a:spAutoFit/>
+          </a:bodyPr>
+          <a:lstStyle/>
+          <a:p>
+            <a:r>
+              <a:rPr lang="en-US" dirty="0"/>
+              <a:t>Version 4</a:t>
+            </a:r>
+          </a:p>
+        </p:txBody>
+      </p:sp>
+      <p:sp>
+        <p:nvSpPr>
+          <p:cNvPr id="170" name="Rounded Rectangle 168">
+            <a:extLst>
+              <a:ext uri="{FF2B5EF4-FFF2-40B4-BE49-F238E27FC236}">
+                <a16:creationId xmlns:a16="http://schemas.microsoft.com/office/drawing/2014/main" id="{FB84DA2B-ECFF-D306-30E4-891E9EBBD78C}"/>
+              </a:ext>
+            </a:extLst>
+          </p:cNvPr>
+          <p:cNvSpPr/>
+          <p:nvPr/>
+        </p:nvSpPr>
+        <p:spPr>
+          <a:xfrm>
+            <a:off x="5203445" y="2303726"/>
+            <a:ext cx="798034" cy="343877"/>
+          </a:xfrm>
+          <a:prstGeom prst="roundRect">
+            <a:avLst>
+              <a:gd name="adj" fmla="val 50000"/>
+            </a:avLst>
+          </a:prstGeom>
+          <a:solidFill>
+            <a:schemeClr val="bg1">
+              <a:lumMod val="85000"/>
+            </a:schemeClr>
+          </a:solidFill>
+        </p:spPr>
+        <p:style>
+          <a:lnRef idx="2">
+            <a:schemeClr val="accent1">
+              <a:shade val="50000"/>
+            </a:schemeClr>
+          </a:lnRef>
+          <a:fillRef idx="1">
+            <a:schemeClr val="accent1"/>
+          </a:fillRef>
+          <a:effectRef idx="0">
+            <a:schemeClr val="accent1"/>
+          </a:effectRef>
+          <a:fontRef idx="minor">
+            <a:schemeClr val="lt1"/>
+          </a:fontRef>
+        </p:style>
+        <p:txBody>
+          <a:bodyPr rtlCol="0" anchor="ctr"/>
+          <a:lstStyle/>
+          <a:p>
+            <a:pPr algn="ctr"/>
+            <a:r>
+              <a:rPr lang="en-US" sz="900" dirty="0">
+                <a:solidFill>
+                  <a:srgbClr val="FF0000"/>
+                </a:solidFill>
+              </a:rPr>
+              <a:t>tester</a:t>
+            </a:r>
+            <a:r>
+              <a:rPr lang="en-US" sz="900" dirty="0">
+                <a:solidFill>
+                  <a:schemeClr val="tx1"/>
+                </a:solidFill>
+              </a:rPr>
+              <a:t>/pe</a:t>
+            </a:r>
+          </a:p>
+        </p:txBody>
+      </p:sp>
+      <p:sp>
+        <p:nvSpPr>
+          <p:cNvPr id="171" name="TextBox 169">
+            <a:extLst>
+              <a:ext uri="{FF2B5EF4-FFF2-40B4-BE49-F238E27FC236}">
+                <a16:creationId xmlns:a16="http://schemas.microsoft.com/office/drawing/2014/main" id="{AC332780-140A-D401-D50E-70B31C595D01}"/>
+              </a:ext>
+            </a:extLst>
+          </p:cNvPr>
+          <p:cNvSpPr txBox="1"/>
+          <p:nvPr/>
+        </p:nvSpPr>
+        <p:spPr>
+          <a:xfrm>
+            <a:off x="6031258" y="2593204"/>
+            <a:ext cx="515815" cy="230832"/>
+          </a:xfrm>
+          <a:prstGeom prst="rect">
+            <a:avLst/>
+          </a:prstGeom>
+          <a:noFill/>
+        </p:spPr>
+        <p:txBody>
+          <a:bodyPr wrap="square" rtlCol="0">
+            <a:spAutoFit/>
+          </a:bodyPr>
+          <a:lstStyle/>
+          <a:p>
+            <a:r>
+              <a:rPr lang="en-US" sz="900" dirty="0"/>
+              <a:t>script</a:t>
+            </a:r>
+          </a:p>
+        </p:txBody>
+      </p:sp>
+      <p:sp>
+        <p:nvSpPr>
+          <p:cNvPr id="175" name="Smiley Face 173">
+            <a:extLst>
+              <a:ext uri="{FF2B5EF4-FFF2-40B4-BE49-F238E27FC236}">
+                <a16:creationId xmlns:a16="http://schemas.microsoft.com/office/drawing/2014/main" id="{EE76B243-9A95-9A64-D2D9-169C9464F992}"/>
+              </a:ext>
+            </a:extLst>
+          </p:cNvPr>
+          <p:cNvSpPr/>
+          <p:nvPr/>
+        </p:nvSpPr>
+        <p:spPr>
+          <a:xfrm>
+            <a:off x="5436384" y="1190734"/>
+            <a:ext cx="289166" cy="289166"/>
+          </a:xfrm>
+          <a:prstGeom prst="smileyFace">
+            <a:avLst/>
+          </a:prstGeom>
+          <a:noFill/>
+          <a:ln>
+            <a:solidFill>
+              <a:srgbClr val="0070C0"/>
+            </a:solidFill>
+          </a:ln>
+        </p:spPr>
+        <p:style>
+          <a:lnRef idx="2">
+            <a:schemeClr val="accent1">
+              <a:shade val="50000"/>
+            </a:schemeClr>
+          </a:lnRef>
+          <a:fillRef idx="1">
+            <a:schemeClr val="accent1"/>
+          </a:fillRef>
+          <a:effectRef idx="0">
+            <a:schemeClr val="accent1"/>
+          </a:effectRef>
+          <a:fontRef idx="minor">
+            <a:schemeClr val="lt1"/>
+          </a:fontRef>
+        </p:style>
+        <p:txBody>
+          <a:bodyPr rtlCol="0" anchor="ctr"/>
+          <a:lstStyle/>
+          <a:p>
+            <a:pPr algn="ctr"/>
+            <a:endParaRPr lang="en-US" sz="900">
+              <a:solidFill>
+                <a:schemeClr val="tx1"/>
+              </a:solidFill>
+            </a:endParaRPr>
+          </a:p>
+        </p:txBody>
+      </p:sp>
+      <p:sp>
+        <p:nvSpPr>
+          <p:cNvPr id="176" name="Rectangle 174">
+            <a:extLst>
+              <a:ext uri="{FF2B5EF4-FFF2-40B4-BE49-F238E27FC236}">
+                <a16:creationId xmlns:a16="http://schemas.microsoft.com/office/drawing/2014/main" id="{96336FF2-60AD-6A68-F42C-EBF2A1DA5437}"/>
+              </a:ext>
+            </a:extLst>
+          </p:cNvPr>
+          <p:cNvSpPr/>
+          <p:nvPr/>
+        </p:nvSpPr>
+        <p:spPr>
+          <a:xfrm>
+            <a:off x="5282773" y="1766979"/>
+            <a:ext cx="629340" cy="257908"/>
+          </a:xfrm>
+          <a:prstGeom prst="rect">
+            <a:avLst/>
+          </a:prstGeom>
+          <a:solidFill>
+            <a:schemeClr val="accent2">
+              <a:lumMod val="20000"/>
+              <a:lumOff val="80000"/>
+            </a:schemeClr>
+          </a:solidFill>
+          <a:ln>
+            <a:solidFill>
+              <a:schemeClr val="accent2"/>
+            </a:solidFill>
+          </a:ln>
+        </p:spPr>
+        <p:style>
+          <a:lnRef idx="2">
+            <a:schemeClr val="accent1">
+              <a:shade val="50000"/>
+            </a:schemeClr>
+          </a:lnRef>
+          <a:fillRef idx="1">
+            <a:schemeClr val="accent1"/>
+          </a:fillRef>
+          <a:effectRef idx="0">
+            <a:schemeClr val="accent1"/>
+          </a:effectRef>
+          <a:fontRef idx="minor">
+            <a:schemeClr val="lt1"/>
+          </a:fontRef>
+        </p:style>
+        <p:txBody>
+          <a:bodyPr rtlCol="0" anchor="ctr"/>
+          <a:lstStyle/>
+          <a:p>
+            <a:pPr algn="ctr"/>
+            <a:r>
+              <a:rPr lang="en-US" sz="900" dirty="0" err="1">
+                <a:solidFill>
+                  <a:schemeClr val="tx1"/>
+                </a:solidFill>
+              </a:rPr>
+              <a:t>CATcher</a:t>
+            </a:r>
+            <a:endParaRPr lang="en-US" sz="900" dirty="0">
+              <a:solidFill>
+                <a:schemeClr val="tx1"/>
+              </a:solidFill>
+            </a:endParaRPr>
+          </a:p>
+        </p:txBody>
+      </p:sp>
+      <p:cxnSp>
+        <p:nvCxnSpPr>
+          <p:cNvPr id="177" name="Straight Arrow Connector 175">
+            <a:extLst>
+              <a:ext uri="{FF2B5EF4-FFF2-40B4-BE49-F238E27FC236}">
+                <a16:creationId xmlns:a16="http://schemas.microsoft.com/office/drawing/2014/main" id="{8DADB2BE-327D-E6B1-A81C-F1EFA6C2C22D}"/>
+              </a:ext>
+            </a:extLst>
+          </p:cNvPr>
+          <p:cNvCxnSpPr/>
+          <p:nvPr/>
+        </p:nvCxnSpPr>
+        <p:spPr>
+          <a:xfrm>
+            <a:off x="5589205" y="1479900"/>
+            <a:ext cx="0" cy="287079"/>
+          </a:xfrm>
+          <a:prstGeom prst="straightConnector1">
+            <a:avLst/>
+          </a:prstGeom>
+          <a:ln w="12700">
+            <a:solidFill>
+              <a:schemeClr val="accent2"/>
+            </a:solidFill>
+            <a:prstDash val="sysDot"/>
+            <a:tailEnd type="triangle"/>
+          </a:ln>
+        </p:spPr>
+        <p:style>
+          <a:lnRef idx="1">
+            <a:schemeClr val="accent1"/>
+          </a:lnRef>
+          <a:fillRef idx="0">
+            <a:schemeClr val="accent1"/>
+          </a:fillRef>
+          <a:effectRef idx="0">
+            <a:schemeClr val="accent1"/>
+          </a:effectRef>
+          <a:fontRef idx="minor">
+            <a:schemeClr val="tx1"/>
+          </a:fontRef>
+        </p:style>
+      </p:cxnSp>
+      <p:cxnSp>
+        <p:nvCxnSpPr>
+          <p:cNvPr id="178" name="Straight Arrow Connector 176">
+            <a:extLst>
+              <a:ext uri="{FF2B5EF4-FFF2-40B4-BE49-F238E27FC236}">
+                <a16:creationId xmlns:a16="http://schemas.microsoft.com/office/drawing/2014/main" id="{A29545EA-3D20-2EC9-D536-75F32026C06A}"/>
+              </a:ext>
+            </a:extLst>
+          </p:cNvPr>
+          <p:cNvCxnSpPr/>
+          <p:nvPr/>
+        </p:nvCxnSpPr>
+        <p:spPr>
+          <a:xfrm>
+            <a:off x="5589205" y="2024887"/>
+            <a:ext cx="1" cy="287080"/>
+          </a:xfrm>
+          <a:prstGeom prst="straightConnector1">
+            <a:avLst/>
+          </a:prstGeom>
+          <a:ln w="12700">
+            <a:solidFill>
+              <a:schemeClr val="accent2"/>
+            </a:solidFill>
+            <a:prstDash val="sysDot"/>
+            <a:tailEnd type="triangle"/>
+          </a:ln>
+        </p:spPr>
+        <p:style>
+          <a:lnRef idx="1">
+            <a:schemeClr val="accent1"/>
+          </a:lnRef>
+          <a:fillRef idx="0">
+            <a:schemeClr val="accent1"/>
+          </a:fillRef>
+          <a:effectRef idx="0">
+            <a:schemeClr val="accent1"/>
+          </a:effectRef>
+          <a:fontRef idx="minor">
+            <a:schemeClr val="tx1"/>
+          </a:fontRef>
+        </p:style>
+      </p:cxnSp>
+      <p:sp>
+        <p:nvSpPr>
+          <p:cNvPr id="179" name="TextBox 177">
+            <a:extLst>
+              <a:ext uri="{FF2B5EF4-FFF2-40B4-BE49-F238E27FC236}">
+                <a16:creationId xmlns:a16="http://schemas.microsoft.com/office/drawing/2014/main" id="{8433DC1E-EF09-8CD4-B063-6D63DA5E955F}"/>
+              </a:ext>
+            </a:extLst>
+          </p:cNvPr>
+          <p:cNvSpPr txBox="1"/>
+          <p:nvPr/>
+        </p:nvSpPr>
+        <p:spPr>
+          <a:xfrm>
+            <a:off x="5237091" y="959902"/>
+            <a:ext cx="687753" cy="230832"/>
+          </a:xfrm>
+          <a:prstGeom prst="rect">
+            <a:avLst/>
+          </a:prstGeom>
+          <a:noFill/>
+        </p:spPr>
+        <p:txBody>
+          <a:bodyPr wrap="square" rtlCol="0">
+            <a:spAutoFit/>
+          </a:bodyPr>
+          <a:lstStyle/>
+          <a:p>
+            <a:pPr algn="ctr"/>
+            <a:r>
+              <a:rPr lang="en-US" sz="900" dirty="0"/>
+              <a:t>testers</a:t>
+            </a:r>
+          </a:p>
+        </p:txBody>
+      </p:sp>
+      <p:sp>
+        <p:nvSpPr>
+          <p:cNvPr id="143" name="Rounded Rectangle 90">
+            <a:extLst>
+              <a:ext uri="{FF2B5EF4-FFF2-40B4-BE49-F238E27FC236}">
+                <a16:creationId xmlns:a16="http://schemas.microsoft.com/office/drawing/2014/main" id="{A11E5419-2580-2D9C-4074-921CB566ED65}"/>
+              </a:ext>
+            </a:extLst>
+          </p:cNvPr>
+          <p:cNvSpPr/>
+          <p:nvPr/>
+        </p:nvSpPr>
+        <p:spPr>
+          <a:xfrm>
+            <a:off x="2589363" y="3017374"/>
+            <a:ext cx="965620" cy="343877"/>
+          </a:xfrm>
+          <a:prstGeom prst="roundRect">
+            <a:avLst>
+              <a:gd name="adj" fmla="val 50000"/>
+            </a:avLst>
+          </a:prstGeom>
+          <a:solidFill>
+            <a:schemeClr val="bg1">
+              <a:lumMod val="85000"/>
+            </a:schemeClr>
+          </a:solidFill>
+        </p:spPr>
+        <p:style>
+          <a:lnRef idx="2">
+            <a:schemeClr val="accent1">
+              <a:shade val="50000"/>
+            </a:schemeClr>
+          </a:lnRef>
+          <a:fillRef idx="1">
+            <a:schemeClr val="accent1"/>
+          </a:fillRef>
+          <a:effectRef idx="0">
+            <a:schemeClr val="accent1"/>
+          </a:effectRef>
+          <a:fontRef idx="minor">
+            <a:schemeClr val="lt1"/>
+          </a:fontRef>
+        </p:style>
+        <p:txBody>
+          <a:bodyPr rtlCol="0" anchor="ctr"/>
+          <a:lstStyle/>
+          <a:p>
+            <a:pPr algn="ctr"/>
+            <a:r>
+              <a:rPr lang="en-US" sz="900" dirty="0">
+                <a:solidFill>
+                  <a:schemeClr val="tx1"/>
+                </a:solidFill>
+              </a:rPr>
+              <a:t>module-org/</a:t>
+            </a:r>
+            <a:br>
+              <a:rPr lang="en-US" sz="900" dirty="0">
+                <a:solidFill>
+                  <a:schemeClr val="tx1"/>
+                </a:solidFill>
+              </a:rPr>
+            </a:br>
+            <a:r>
+              <a:rPr lang="en-US" sz="900" dirty="0">
+                <a:solidFill>
+                  <a:schemeClr val="tx1"/>
+                </a:solidFill>
+              </a:rPr>
+              <a:t>pe-interim</a:t>
+            </a:r>
+          </a:p>
+        </p:txBody>
+      </p:sp>
+      <p:cxnSp>
+        <p:nvCxnSpPr>
+          <p:cNvPr id="3" name="Elbow Connector 2">
+            <a:extLst>
+              <a:ext uri="{FF2B5EF4-FFF2-40B4-BE49-F238E27FC236}">
+                <a16:creationId xmlns:a16="http://schemas.microsoft.com/office/drawing/2014/main" id="{08644BA8-4389-5F89-7824-C4F66AED5FEB}"/>
+              </a:ext>
+            </a:extLst>
+          </p:cNvPr>
+          <p:cNvCxnSpPr>
+            <a:stCxn id="91" idx="2"/>
+            <a:endCxn id="143" idx="1"/>
+          </p:cNvCxnSpPr>
+          <p:nvPr/>
+        </p:nvCxnSpPr>
+        <p:spPr>
+          <a:xfrm rot="16200000" flipH="1">
+            <a:off x="2116931" y="2716881"/>
+            <a:ext cx="541666" cy="403198"/>
+          </a:xfrm>
+          <a:prstGeom prst="bentConnector2">
+            <a:avLst/>
+          </a:prstGeom>
+          <a:ln w="12700">
+            <a:solidFill>
+              <a:srgbClr val="FF0000"/>
+            </a:solidFill>
+            <a:tailEnd type="triangle"/>
+          </a:ln>
+        </p:spPr>
+        <p:style>
+          <a:lnRef idx="1">
+            <a:schemeClr val="accent1"/>
+          </a:lnRef>
+          <a:fillRef idx="0">
+            <a:schemeClr val="accent1"/>
+          </a:fillRef>
+          <a:effectRef idx="0">
+            <a:schemeClr val="accent1"/>
+          </a:effectRef>
+          <a:fontRef idx="minor">
+            <a:schemeClr val="tx1"/>
+          </a:fontRef>
+        </p:style>
+      </p:cxnSp>
+      <p:cxnSp>
+        <p:nvCxnSpPr>
+          <p:cNvPr id="180" name="Elbow Connector 179">
+            <a:extLst>
+              <a:ext uri="{FF2B5EF4-FFF2-40B4-BE49-F238E27FC236}">
+                <a16:creationId xmlns:a16="http://schemas.microsoft.com/office/drawing/2014/main" id="{733F6A7B-3FE4-CF3C-B208-B2D6704B2867}"/>
+              </a:ext>
+            </a:extLst>
+          </p:cNvPr>
+          <p:cNvCxnSpPr>
+            <a:stCxn id="143" idx="3"/>
+            <a:endCxn id="92" idx="2"/>
+          </p:cNvCxnSpPr>
+          <p:nvPr/>
+        </p:nvCxnSpPr>
+        <p:spPr>
+          <a:xfrm flipV="1">
+            <a:off x="3554983" y="2647644"/>
+            <a:ext cx="321675" cy="541669"/>
+          </a:xfrm>
+          <a:prstGeom prst="bentConnector2">
+            <a:avLst/>
+          </a:prstGeom>
+          <a:ln w="12700">
+            <a:solidFill>
+              <a:srgbClr val="FF0000"/>
+            </a:solidFill>
+            <a:tailEnd type="triangle"/>
+          </a:ln>
+        </p:spPr>
+        <p:style>
+          <a:lnRef idx="1">
+            <a:schemeClr val="accent1"/>
+          </a:lnRef>
+          <a:fillRef idx="0">
+            <a:schemeClr val="accent1"/>
+          </a:fillRef>
+          <a:effectRef idx="0">
+            <a:schemeClr val="accent1"/>
+          </a:effectRef>
+          <a:fontRef idx="minor">
+            <a:schemeClr val="tx1"/>
+          </a:fontRef>
+        </p:style>
+      </p:cxnSp>
+      <p:sp>
+        <p:nvSpPr>
+          <p:cNvPr id="181" name="TextBox 114">
+            <a:extLst>
+              <a:ext uri="{FF2B5EF4-FFF2-40B4-BE49-F238E27FC236}">
+                <a16:creationId xmlns:a16="http://schemas.microsoft.com/office/drawing/2014/main" id="{5434E282-F038-8833-D38E-BC88C35F329C}"/>
+              </a:ext>
+            </a:extLst>
+          </p:cNvPr>
+          <p:cNvSpPr txBox="1"/>
+          <p:nvPr/>
+        </p:nvSpPr>
+        <p:spPr>
+          <a:xfrm>
+            <a:off x="3914614" y="3026724"/>
+            <a:ext cx="515815" cy="230832"/>
+          </a:xfrm>
+          <a:prstGeom prst="rect">
+            <a:avLst/>
+          </a:prstGeom>
+          <a:noFill/>
+        </p:spPr>
+        <p:txBody>
+          <a:bodyPr wrap="square" rtlCol="0">
+            <a:spAutoFit/>
+          </a:bodyPr>
+          <a:lstStyle/>
+          <a:p>
+            <a:r>
+              <a:rPr lang="en-US" sz="900" dirty="0"/>
+              <a:t>script</a:t>
+            </a:r>
+          </a:p>
+        </p:txBody>
+      </p:sp>
+      <p:cxnSp>
+        <p:nvCxnSpPr>
+          <p:cNvPr id="183" name="Straight Arrow Connector 135">
+            <a:extLst>
+              <a:ext uri="{FF2B5EF4-FFF2-40B4-BE49-F238E27FC236}">
+                <a16:creationId xmlns:a16="http://schemas.microsoft.com/office/drawing/2014/main" id="{A8A563C4-86CE-641F-608C-E72F54A566C8}"/>
+              </a:ext>
+            </a:extLst>
+          </p:cNvPr>
+          <p:cNvCxnSpPr>
+            <a:cxnSpLocks/>
+            <a:stCxn id="170" idx="3"/>
+            <a:endCxn id="113" idx="1"/>
+          </p:cNvCxnSpPr>
+          <p:nvPr/>
+        </p:nvCxnSpPr>
+        <p:spPr>
+          <a:xfrm>
+            <a:off x="6001479" y="2475665"/>
+            <a:ext cx="844245" cy="42"/>
+          </a:xfrm>
+          <a:prstGeom prst="straightConnector1">
+            <a:avLst/>
+          </a:prstGeom>
+          <a:ln w="12700">
+            <a:solidFill>
+              <a:srgbClr val="FF0000"/>
+            </a:solidFill>
+            <a:tailEnd type="triangle"/>
+          </a:ln>
+        </p:spPr>
+        <p:style>
+          <a:lnRef idx="1">
+            <a:schemeClr val="accent1"/>
+          </a:lnRef>
+          <a:fillRef idx="0">
+            <a:schemeClr val="accent1"/>
+          </a:fillRef>
+          <a:effectRef idx="0">
+            <a:schemeClr val="accent1"/>
+          </a:effectRef>
+          <a:fontRef idx="minor">
+            <a:schemeClr val="tx1"/>
+          </a:fontRef>
+        </p:style>
+      </p:cxnSp>
+      <p:sp>
+        <p:nvSpPr>
+          <p:cNvPr id="115" name="Rounded Rectangle 90">
+            <a:extLst>
+              <a:ext uri="{FF2B5EF4-FFF2-40B4-BE49-F238E27FC236}">
+                <a16:creationId xmlns:a16="http://schemas.microsoft.com/office/drawing/2014/main" id="{0FAC3FBE-CB00-6118-FE97-9098098BFBF6}"/>
+              </a:ext>
+            </a:extLst>
+          </p:cNvPr>
+          <p:cNvSpPr/>
+          <p:nvPr/>
+        </p:nvSpPr>
+        <p:spPr>
+          <a:xfrm>
+            <a:off x="5203445" y="3652866"/>
+            <a:ext cx="1289696" cy="343877"/>
+          </a:xfrm>
+          <a:prstGeom prst="roundRect">
+            <a:avLst>
+              <a:gd name="adj" fmla="val 50000"/>
+            </a:avLst>
+          </a:prstGeom>
+          <a:solidFill>
+            <a:schemeClr val="bg1">
+              <a:lumMod val="85000"/>
+            </a:schemeClr>
+          </a:solidFill>
+        </p:spPr>
+        <p:style>
+          <a:lnRef idx="2">
+            <a:schemeClr val="accent1">
+              <a:shade val="50000"/>
+            </a:schemeClr>
+          </a:lnRef>
+          <a:fillRef idx="1">
+            <a:schemeClr val="accent1"/>
+          </a:fillRef>
+          <a:effectRef idx="0">
+            <a:schemeClr val="accent1"/>
+          </a:effectRef>
+          <a:fontRef idx="minor">
+            <a:schemeClr val="lt1"/>
+          </a:fontRef>
+        </p:style>
+        <p:txBody>
+          <a:bodyPr rtlCol="0" anchor="ctr"/>
+          <a:lstStyle/>
+          <a:p>
+            <a:pPr algn="ctr"/>
+            <a:r>
+              <a:rPr lang="en-US" sz="900" dirty="0">
+                <a:solidFill>
+                  <a:schemeClr val="tx1"/>
+                </a:solidFill>
+              </a:rPr>
+              <a:t>team-org/main-repo</a:t>
+            </a:r>
+          </a:p>
+        </p:txBody>
+      </p:sp>
+      <p:cxnSp>
+        <p:nvCxnSpPr>
+          <p:cNvPr id="184" name="Elbow Connector 183">
+            <a:extLst>
+              <a:ext uri="{FF2B5EF4-FFF2-40B4-BE49-F238E27FC236}">
+                <a16:creationId xmlns:a16="http://schemas.microsoft.com/office/drawing/2014/main" id="{CB16975F-EF6F-07C5-AE79-943F77A7000C}"/>
+              </a:ext>
+            </a:extLst>
+          </p:cNvPr>
+          <p:cNvCxnSpPr>
+            <a:cxnSpLocks/>
+            <a:stCxn id="91" idx="1"/>
+            <a:endCxn id="115" idx="1"/>
+          </p:cNvCxnSpPr>
+          <p:nvPr/>
+        </p:nvCxnSpPr>
+        <p:spPr>
+          <a:xfrm rot="10800000" flipH="1" flipV="1">
+            <a:off x="1771949" y="2475709"/>
+            <a:ext cx="3431496" cy="1349096"/>
+          </a:xfrm>
+          <a:prstGeom prst="bentConnector3">
+            <a:avLst>
+              <a:gd name="adj1" fmla="val -6662"/>
+            </a:avLst>
+          </a:prstGeom>
+          <a:ln w="12700">
+            <a:solidFill>
+              <a:srgbClr val="00B050"/>
+            </a:solidFill>
+            <a:prstDash val="dash"/>
+            <a:tailEnd type="triangle"/>
+          </a:ln>
+        </p:spPr>
+        <p:style>
+          <a:lnRef idx="1">
+            <a:schemeClr val="accent1"/>
+          </a:lnRef>
+          <a:fillRef idx="0">
+            <a:schemeClr val="accent1"/>
+          </a:fillRef>
+          <a:effectRef idx="0">
+            <a:schemeClr val="accent1"/>
+          </a:effectRef>
+          <a:fontRef idx="minor">
+            <a:schemeClr val="tx1"/>
+          </a:fontRef>
+        </p:style>
+      </p:cxnSp>
+      <p:cxnSp>
+        <p:nvCxnSpPr>
+          <p:cNvPr id="6" name="Straight Arrow Connector 5">
+            <a:extLst>
+              <a:ext uri="{FF2B5EF4-FFF2-40B4-BE49-F238E27FC236}">
+                <a16:creationId xmlns:a16="http://schemas.microsoft.com/office/drawing/2014/main" id="{4A67E6AD-8F09-1235-4285-3A07EAC936E4}"/>
+              </a:ext>
+            </a:extLst>
+          </p:cNvPr>
+          <p:cNvCxnSpPr/>
+          <p:nvPr/>
+        </p:nvCxnSpPr>
+        <p:spPr>
+          <a:xfrm>
+            <a:off x="7073276" y="3632249"/>
+            <a:ext cx="441904" cy="0"/>
+          </a:xfrm>
+          <a:prstGeom prst="straightConnector1">
+            <a:avLst/>
+          </a:prstGeom>
+          <a:ln w="12700">
+            <a:solidFill>
+              <a:srgbClr val="00B050"/>
+            </a:solidFill>
+            <a:prstDash val="dash"/>
+            <a:tailEnd type="triangle"/>
+          </a:ln>
+        </p:spPr>
+        <p:style>
+          <a:lnRef idx="1">
+            <a:schemeClr val="accent1"/>
+          </a:lnRef>
+          <a:fillRef idx="0">
+            <a:schemeClr val="accent1"/>
+          </a:fillRef>
+          <a:effectRef idx="0">
+            <a:schemeClr val="accent1"/>
+          </a:effectRef>
+          <a:fontRef idx="minor">
+            <a:schemeClr val="tx1"/>
+          </a:fontRef>
+        </p:style>
+      </p:cxnSp>
+      <p:sp>
+        <p:nvSpPr>
+          <p:cNvPr id="185" name="TextBox 127">
+            <a:extLst>
+              <a:ext uri="{FF2B5EF4-FFF2-40B4-BE49-F238E27FC236}">
+                <a16:creationId xmlns:a16="http://schemas.microsoft.com/office/drawing/2014/main" id="{967BF62F-67CE-15DC-EC05-94BFA7A8C001}"/>
+              </a:ext>
+            </a:extLst>
+          </p:cNvPr>
+          <p:cNvSpPr txBox="1"/>
+          <p:nvPr/>
+        </p:nvSpPr>
+        <p:spPr>
+          <a:xfrm>
+            <a:off x="7510297" y="3513181"/>
+            <a:ext cx="731328" cy="230832"/>
+          </a:xfrm>
+          <a:prstGeom prst="rect">
+            <a:avLst/>
+          </a:prstGeom>
+          <a:noFill/>
+          <a:ln>
+            <a:noFill/>
+          </a:ln>
+        </p:spPr>
+        <p:txBody>
+          <a:bodyPr wrap="square" rtlCol="0">
+            <a:spAutoFit/>
+          </a:bodyPr>
+          <a:lstStyle/>
+          <a:p>
+            <a:pPr algn="ctr"/>
+            <a:r>
+              <a:rPr lang="en-US" sz="900" dirty="0">
+                <a:solidFill>
+                  <a:srgbClr val="00B050"/>
+                </a:solidFill>
+              </a:rPr>
+              <a:t>Dry run</a:t>
+            </a:r>
+          </a:p>
+        </p:txBody>
+      </p:sp>
+      <p:cxnSp>
+        <p:nvCxnSpPr>
+          <p:cNvPr id="186" name="Straight Arrow Connector 185">
+            <a:extLst>
+              <a:ext uri="{FF2B5EF4-FFF2-40B4-BE49-F238E27FC236}">
+                <a16:creationId xmlns:a16="http://schemas.microsoft.com/office/drawing/2014/main" id="{F4C78C39-09BD-7804-F7A2-DEFD378BB70E}"/>
+              </a:ext>
+            </a:extLst>
+          </p:cNvPr>
+          <p:cNvCxnSpPr/>
+          <p:nvPr/>
+        </p:nvCxnSpPr>
+        <p:spPr>
+          <a:xfrm>
+            <a:off x="7056371" y="3363132"/>
+            <a:ext cx="441904" cy="0"/>
+          </a:xfrm>
+          <a:prstGeom prst="straightConnector1">
+            <a:avLst/>
+          </a:prstGeom>
+          <a:ln w="12700">
+            <a:solidFill>
+              <a:srgbClr val="FF0000"/>
+            </a:solidFill>
+            <a:tailEnd type="triangle"/>
+          </a:ln>
+        </p:spPr>
+        <p:style>
+          <a:lnRef idx="1">
+            <a:schemeClr val="accent1"/>
+          </a:lnRef>
+          <a:fillRef idx="0">
+            <a:schemeClr val="accent1"/>
+          </a:fillRef>
+          <a:effectRef idx="0">
+            <a:schemeClr val="accent1"/>
+          </a:effectRef>
+          <a:fontRef idx="minor">
+            <a:schemeClr val="tx1"/>
+          </a:fontRef>
+        </p:style>
+      </p:cxnSp>
+      <p:sp>
+        <p:nvSpPr>
+          <p:cNvPr id="187" name="TextBox 127">
+            <a:extLst>
+              <a:ext uri="{FF2B5EF4-FFF2-40B4-BE49-F238E27FC236}">
+                <a16:creationId xmlns:a16="http://schemas.microsoft.com/office/drawing/2014/main" id="{C1FD6B29-A6B1-B25D-ABF4-284F2ACA4D1C}"/>
+              </a:ext>
+            </a:extLst>
+          </p:cNvPr>
+          <p:cNvSpPr txBox="1"/>
+          <p:nvPr/>
+        </p:nvSpPr>
+        <p:spPr>
+          <a:xfrm>
+            <a:off x="7493392" y="3244064"/>
+            <a:ext cx="731328" cy="230832"/>
+          </a:xfrm>
+          <a:prstGeom prst="rect">
+            <a:avLst/>
+          </a:prstGeom>
+          <a:noFill/>
+          <a:ln>
+            <a:noFill/>
+          </a:ln>
+        </p:spPr>
+        <p:txBody>
+          <a:bodyPr wrap="square" rtlCol="0">
+            <a:spAutoFit/>
+          </a:bodyPr>
+          <a:lstStyle/>
+          <a:p>
+            <a:pPr algn="ctr"/>
+            <a:r>
+              <a:rPr lang="en-US" sz="900" dirty="0">
+                <a:solidFill>
+                  <a:srgbClr val="FF0000"/>
+                </a:solidFill>
+              </a:rPr>
+              <a:t>Actual PE</a:t>
+            </a:r>
+          </a:p>
+        </p:txBody>
+      </p:sp>
+      <p:sp>
+        <p:nvSpPr>
+          <p:cNvPr id="188" name="TextBox 114">
+            <a:extLst>
+              <a:ext uri="{FF2B5EF4-FFF2-40B4-BE49-F238E27FC236}">
+                <a16:creationId xmlns:a16="http://schemas.microsoft.com/office/drawing/2014/main" id="{3AF2BDC6-E443-46DC-2182-47A7D66C8386}"/>
+              </a:ext>
+            </a:extLst>
+          </p:cNvPr>
+          <p:cNvSpPr txBox="1"/>
+          <p:nvPr/>
+        </p:nvSpPr>
+        <p:spPr>
+          <a:xfrm>
+            <a:off x="2026127" y="3816935"/>
+            <a:ext cx="515815" cy="230832"/>
+          </a:xfrm>
+          <a:prstGeom prst="rect">
+            <a:avLst/>
+          </a:prstGeom>
+          <a:noFill/>
+        </p:spPr>
+        <p:txBody>
+          <a:bodyPr wrap="square" rtlCol="0">
+            <a:spAutoFit/>
+          </a:bodyPr>
+          <a:lstStyle/>
+          <a:p>
+            <a:r>
+              <a:rPr lang="en-US" sz="900" dirty="0"/>
+              <a:t>script</a:t>
+            </a:r>
+          </a:p>
+        </p:txBody>
+      </p:sp>
+      <p:sp>
+        <p:nvSpPr>
+          <p:cNvPr id="7" name="Flowchart: Connector 6">
+            <a:extLst>
+              <a:ext uri="{FF2B5EF4-FFF2-40B4-BE49-F238E27FC236}">
+                <a16:creationId xmlns:a16="http://schemas.microsoft.com/office/drawing/2014/main" id="{A4AEECE8-1B27-B3A7-BDA4-A61439694A86}"/>
+              </a:ext>
+            </a:extLst>
+          </p:cNvPr>
+          <p:cNvSpPr/>
+          <p:nvPr/>
+        </p:nvSpPr>
+        <p:spPr>
+          <a:xfrm>
+            <a:off x="3715657" y="3695789"/>
+            <a:ext cx="344060" cy="263154"/>
+          </a:xfrm>
+          <a:prstGeom prst="flowChartConnector">
+            <a:avLst/>
+          </a:prstGeom>
+          <a:solidFill>
+            <a:schemeClr val="bg1"/>
+          </a:solidFill>
+          <a:ln>
+            <a:solidFill>
+              <a:srgbClr val="00B050"/>
+            </a:solidFill>
+          </a:ln>
+        </p:spPr>
+        <p:style>
+          <a:lnRef idx="2">
+            <a:schemeClr val="accent1">
+              <a:shade val="50000"/>
+            </a:schemeClr>
+          </a:lnRef>
+          <a:fillRef idx="1">
+            <a:schemeClr val="accent1"/>
+          </a:fillRef>
+          <a:effectRef idx="0">
+            <a:schemeClr val="accent1"/>
+          </a:effectRef>
+          <a:fontRef idx="minor">
+            <a:schemeClr val="lt1"/>
+          </a:fontRef>
+        </p:style>
+        <p:txBody>
+          <a:bodyPr lIns="0" tIns="0" rIns="0" bIns="0" rtlCol="0" anchor="ctr"/>
+          <a:lstStyle/>
+          <a:p>
+            <a:pPr algn="ctr"/>
+            <a:r>
+              <a:rPr lang="en-US" sz="1000" dirty="0">
+                <a:solidFill>
+                  <a:srgbClr val="00B050"/>
+                </a:solidFill>
+              </a:rPr>
+              <a:t>S1c</a:t>
+            </a:r>
+          </a:p>
+        </p:txBody>
+      </p:sp>
+      <p:sp>
+        <p:nvSpPr>
+          <p:cNvPr id="189" name="Flowchart: Connector 188">
+            <a:extLst>
+              <a:ext uri="{FF2B5EF4-FFF2-40B4-BE49-F238E27FC236}">
+                <a16:creationId xmlns:a16="http://schemas.microsoft.com/office/drawing/2014/main" id="{58726892-FE52-5B36-107C-E2F4DACB9EC3}"/>
+              </a:ext>
+            </a:extLst>
+          </p:cNvPr>
+          <p:cNvSpPr/>
+          <p:nvPr/>
+        </p:nvSpPr>
+        <p:spPr>
+          <a:xfrm>
+            <a:off x="1994038" y="2813473"/>
+            <a:ext cx="382031" cy="263154"/>
+          </a:xfrm>
+          <a:prstGeom prst="flowChartConnector">
+            <a:avLst/>
+          </a:prstGeom>
+          <a:solidFill>
+            <a:schemeClr val="bg1"/>
+          </a:solidFill>
+          <a:ln>
+            <a:solidFill>
+              <a:srgbClr val="FF0000"/>
+            </a:solidFill>
+          </a:ln>
+        </p:spPr>
+        <p:style>
+          <a:lnRef idx="2">
+            <a:schemeClr val="accent1">
+              <a:shade val="50000"/>
+            </a:schemeClr>
+          </a:lnRef>
+          <a:fillRef idx="1">
+            <a:schemeClr val="accent1"/>
+          </a:fillRef>
+          <a:effectRef idx="0">
+            <a:schemeClr val="accent1"/>
+          </a:effectRef>
+          <a:fontRef idx="minor">
+            <a:schemeClr val="lt1"/>
+          </a:fontRef>
+        </p:style>
+        <p:txBody>
+          <a:bodyPr lIns="0" tIns="0" rIns="0" bIns="0" rtlCol="0" anchor="ctr"/>
+          <a:lstStyle/>
+          <a:p>
+            <a:pPr algn="ctr"/>
+            <a:r>
+              <a:rPr lang="en-US" sz="1000" dirty="0">
+                <a:solidFill>
+                  <a:srgbClr val="FF0000"/>
+                </a:solidFill>
+              </a:rPr>
+              <a:t>S1a</a:t>
+            </a:r>
+          </a:p>
+        </p:txBody>
+      </p:sp>
+      <p:sp>
+        <p:nvSpPr>
+          <p:cNvPr id="190" name="Flowchart: Connector 189">
+            <a:extLst>
+              <a:ext uri="{FF2B5EF4-FFF2-40B4-BE49-F238E27FC236}">
+                <a16:creationId xmlns:a16="http://schemas.microsoft.com/office/drawing/2014/main" id="{97856CA9-F37F-94FC-6D97-D53160BC8A1F}"/>
+              </a:ext>
+            </a:extLst>
+          </p:cNvPr>
+          <p:cNvSpPr/>
+          <p:nvPr/>
+        </p:nvSpPr>
+        <p:spPr>
+          <a:xfrm>
+            <a:off x="3685644" y="2793018"/>
+            <a:ext cx="382031" cy="263154"/>
+          </a:xfrm>
+          <a:prstGeom prst="flowChartConnector">
+            <a:avLst/>
+          </a:prstGeom>
+          <a:solidFill>
+            <a:schemeClr val="bg1"/>
+          </a:solidFill>
+          <a:ln>
+            <a:solidFill>
+              <a:srgbClr val="FF0000"/>
+            </a:solidFill>
+          </a:ln>
+        </p:spPr>
+        <p:style>
+          <a:lnRef idx="2">
+            <a:schemeClr val="accent1">
+              <a:shade val="50000"/>
+            </a:schemeClr>
+          </a:lnRef>
+          <a:fillRef idx="1">
+            <a:schemeClr val="accent1"/>
+          </a:fillRef>
+          <a:effectRef idx="0">
+            <a:schemeClr val="accent1"/>
+          </a:effectRef>
+          <a:fontRef idx="minor">
+            <a:schemeClr val="lt1"/>
+          </a:fontRef>
+        </p:style>
+        <p:txBody>
+          <a:bodyPr lIns="0" tIns="0" rIns="0" bIns="0" rtlCol="0" anchor="ctr"/>
+          <a:lstStyle/>
+          <a:p>
+            <a:pPr algn="ctr"/>
+            <a:r>
+              <a:rPr lang="en-US" sz="1000" dirty="0">
+                <a:solidFill>
+                  <a:srgbClr val="FF0000"/>
+                </a:solidFill>
+              </a:rPr>
+              <a:t>S1b</a:t>
+            </a:r>
+          </a:p>
+        </p:txBody>
+      </p:sp>
+      <p:sp>
+        <p:nvSpPr>
+          <p:cNvPr id="191" name="Flowchart: Connector 190">
+            <a:extLst>
+              <a:ext uri="{FF2B5EF4-FFF2-40B4-BE49-F238E27FC236}">
+                <a16:creationId xmlns:a16="http://schemas.microsoft.com/office/drawing/2014/main" id="{AF46CB45-70A8-D949-73AE-F665FF7255DA}"/>
+              </a:ext>
+            </a:extLst>
+          </p:cNvPr>
+          <p:cNvSpPr/>
+          <p:nvPr/>
+        </p:nvSpPr>
+        <p:spPr>
+          <a:xfrm>
+            <a:off x="4664184" y="2337289"/>
+            <a:ext cx="260932" cy="263154"/>
+          </a:xfrm>
+          <a:prstGeom prst="flowChartConnector">
+            <a:avLst/>
+          </a:prstGeom>
+          <a:solidFill>
+            <a:schemeClr val="bg1"/>
+          </a:solidFill>
+          <a:ln>
+            <a:solidFill>
+              <a:srgbClr val="FF0000"/>
+            </a:solidFill>
+          </a:ln>
+        </p:spPr>
+        <p:style>
+          <a:lnRef idx="2">
+            <a:schemeClr val="accent1">
+              <a:shade val="50000"/>
+            </a:schemeClr>
+          </a:lnRef>
+          <a:fillRef idx="1">
+            <a:schemeClr val="accent1"/>
+          </a:fillRef>
+          <a:effectRef idx="0">
+            <a:schemeClr val="accent1"/>
+          </a:effectRef>
+          <a:fontRef idx="minor">
+            <a:schemeClr val="lt1"/>
+          </a:fontRef>
+        </p:style>
+        <p:txBody>
+          <a:bodyPr lIns="0" tIns="0" rIns="0" bIns="0" rtlCol="0" anchor="ctr"/>
+          <a:lstStyle/>
+          <a:p>
+            <a:pPr algn="ctr"/>
+            <a:r>
+              <a:rPr lang="en-US" sz="1000" dirty="0">
+                <a:solidFill>
+                  <a:srgbClr val="FF0000"/>
+                </a:solidFill>
+              </a:rPr>
+              <a:t>S2</a:t>
+            </a:r>
+          </a:p>
+        </p:txBody>
+      </p:sp>
+      <p:sp>
+        <p:nvSpPr>
+          <p:cNvPr id="192" name="Flowchart: Connector 191">
+            <a:extLst>
+              <a:ext uri="{FF2B5EF4-FFF2-40B4-BE49-F238E27FC236}">
+                <a16:creationId xmlns:a16="http://schemas.microsoft.com/office/drawing/2014/main" id="{458A25C3-FC02-B23B-470D-CB2F887B1BDB}"/>
+              </a:ext>
+            </a:extLst>
+          </p:cNvPr>
+          <p:cNvSpPr/>
+          <p:nvPr/>
+        </p:nvSpPr>
+        <p:spPr>
+          <a:xfrm>
+            <a:off x="6232209" y="2344087"/>
+            <a:ext cx="260932" cy="263154"/>
+          </a:xfrm>
+          <a:prstGeom prst="flowChartConnector">
+            <a:avLst/>
+          </a:prstGeom>
+          <a:solidFill>
+            <a:schemeClr val="bg1"/>
+          </a:solidFill>
+          <a:ln>
+            <a:solidFill>
+              <a:srgbClr val="FF0000"/>
+            </a:solidFill>
+          </a:ln>
+        </p:spPr>
+        <p:style>
+          <a:lnRef idx="2">
+            <a:schemeClr val="accent1">
+              <a:shade val="50000"/>
+            </a:schemeClr>
+          </a:lnRef>
+          <a:fillRef idx="1">
+            <a:schemeClr val="accent1"/>
+          </a:fillRef>
+          <a:effectRef idx="0">
+            <a:schemeClr val="accent1"/>
+          </a:effectRef>
+          <a:fontRef idx="minor">
+            <a:schemeClr val="lt1"/>
+          </a:fontRef>
+        </p:style>
+        <p:txBody>
+          <a:bodyPr lIns="0" tIns="0" rIns="0" bIns="0" rtlCol="0" anchor="ctr"/>
+          <a:lstStyle/>
+          <a:p>
+            <a:pPr algn="ctr"/>
+            <a:r>
+              <a:rPr lang="en-US" sz="1000" dirty="0">
+                <a:solidFill>
+                  <a:srgbClr val="FF0000"/>
+                </a:solidFill>
+              </a:rPr>
+              <a:t>S3</a:t>
+            </a:r>
+          </a:p>
+        </p:txBody>
+      </p:sp>
+      <p:sp>
+        <p:nvSpPr>
+          <p:cNvPr id="193" name="Flowchart: Connector 192">
+            <a:extLst>
+              <a:ext uri="{FF2B5EF4-FFF2-40B4-BE49-F238E27FC236}">
+                <a16:creationId xmlns:a16="http://schemas.microsoft.com/office/drawing/2014/main" id="{F3DA81DB-DF16-39FD-B533-D8D7DC022F6D}"/>
+              </a:ext>
+            </a:extLst>
+          </p:cNvPr>
+          <p:cNvSpPr/>
+          <p:nvPr/>
+        </p:nvSpPr>
+        <p:spPr>
+          <a:xfrm>
+            <a:off x="7992467" y="2330050"/>
+            <a:ext cx="260932" cy="263154"/>
+          </a:xfrm>
+          <a:prstGeom prst="flowChartConnector">
+            <a:avLst/>
+          </a:prstGeom>
+          <a:solidFill>
+            <a:schemeClr val="bg1"/>
+          </a:solidFill>
+          <a:ln>
+            <a:solidFill>
+              <a:srgbClr val="FF0000"/>
+            </a:solidFill>
+          </a:ln>
+        </p:spPr>
+        <p:style>
+          <a:lnRef idx="2">
+            <a:schemeClr val="accent1">
+              <a:shade val="50000"/>
+            </a:schemeClr>
+          </a:lnRef>
+          <a:fillRef idx="1">
+            <a:schemeClr val="accent1"/>
+          </a:fillRef>
+          <a:effectRef idx="0">
+            <a:schemeClr val="accent1"/>
+          </a:effectRef>
+          <a:fontRef idx="minor">
+            <a:schemeClr val="lt1"/>
+          </a:fontRef>
+        </p:style>
+        <p:txBody>
+          <a:bodyPr lIns="0" tIns="0" rIns="0" bIns="0" rtlCol="0" anchor="ctr"/>
+          <a:lstStyle/>
+          <a:p>
+            <a:pPr algn="ctr"/>
+            <a:r>
+              <a:rPr lang="en-US" sz="1000" dirty="0">
+                <a:solidFill>
+                  <a:srgbClr val="FF0000"/>
+                </a:solidFill>
+              </a:rPr>
+              <a:t>S4</a:t>
+            </a:r>
+          </a:p>
+        </p:txBody>
+      </p:sp>
+      <p:sp>
+        <p:nvSpPr>
+          <p:cNvPr id="2" name="Rectangle 1">
+            <a:extLst>
+              <a:ext uri="{FF2B5EF4-FFF2-40B4-BE49-F238E27FC236}">
+                <a16:creationId xmlns:a16="http://schemas.microsoft.com/office/drawing/2014/main" id="{511A7A8B-01E5-754C-7B58-FF189F2D7BB3}"/>
+              </a:ext>
+            </a:extLst>
+          </p:cNvPr>
+          <p:cNvSpPr/>
+          <p:nvPr/>
+        </p:nvSpPr>
+        <p:spPr>
+          <a:xfrm>
+            <a:off x="128111" y="681202"/>
+            <a:ext cx="1319170" cy="2156872"/>
+          </a:xfrm>
+          <a:prstGeom prst="rect">
+            <a:avLst/>
+          </a:prstGeom>
+          <a:solidFill>
+            <a:schemeClr val="accent1">
+              <a:lumMod val="20000"/>
+              <a:lumOff val="80000"/>
+            </a:schemeClr>
+          </a:solidFill>
+          <a:ln>
+            <a:noFill/>
+          </a:ln>
+        </p:spPr>
+        <p:style>
+          <a:lnRef idx="2">
+            <a:schemeClr val="accent1">
+              <a:shade val="50000"/>
+            </a:schemeClr>
+          </a:lnRef>
+          <a:fillRef idx="1">
+            <a:schemeClr val="accent1"/>
+          </a:fillRef>
+          <a:effectRef idx="0">
+            <a:schemeClr val="accent1"/>
+          </a:effectRef>
+          <a:fontRef idx="minor">
+            <a:schemeClr val="lt1"/>
+          </a:fontRef>
+        </p:style>
+        <p:txBody>
+          <a:bodyPr rtlCol="0" anchor="t"/>
+          <a:lstStyle/>
+          <a:p>
+            <a:pPr algn="ctr"/>
+            <a:r>
+              <a:rPr lang="en-SG" sz="1000" dirty="0">
+                <a:solidFill>
+                  <a:schemeClr val="accent1">
+                    <a:lumMod val="75000"/>
+                  </a:schemeClr>
+                </a:solidFill>
+              </a:rPr>
+              <a:t>Bug reporting phase</a:t>
+            </a:r>
+          </a:p>
+        </p:txBody>
+      </p:sp>
+      <p:sp>
+        <p:nvSpPr>
+          <p:cNvPr id="5" name="TextBox 156">
+            <a:extLst>
+              <a:ext uri="{FF2B5EF4-FFF2-40B4-BE49-F238E27FC236}">
+                <a16:creationId xmlns:a16="http://schemas.microsoft.com/office/drawing/2014/main" id="{0A141964-3CEA-CEAE-61E4-752613F85499}"/>
+              </a:ext>
+            </a:extLst>
+          </p:cNvPr>
+          <p:cNvSpPr txBox="1"/>
+          <p:nvPr/>
+        </p:nvSpPr>
+        <p:spPr>
+          <a:xfrm>
+            <a:off x="323824" y="949259"/>
+            <a:ext cx="687753" cy="230832"/>
+          </a:xfrm>
+          <a:prstGeom prst="rect">
+            <a:avLst/>
+          </a:prstGeom>
+          <a:noFill/>
+        </p:spPr>
+        <p:txBody>
+          <a:bodyPr wrap="square" rtlCol="0">
+            <a:spAutoFit/>
+          </a:bodyPr>
+          <a:lstStyle/>
+          <a:p>
+            <a:pPr algn="ctr"/>
+            <a:r>
+              <a:rPr lang="en-US" sz="900" dirty="0"/>
+              <a:t>testers</a:t>
+            </a:r>
+          </a:p>
+        </p:txBody>
+      </p:sp>
+      <p:sp>
+        <p:nvSpPr>
+          <p:cNvPr id="11" name="Smiley Face 152">
+            <a:extLst>
+              <a:ext uri="{FF2B5EF4-FFF2-40B4-BE49-F238E27FC236}">
+                <a16:creationId xmlns:a16="http://schemas.microsoft.com/office/drawing/2014/main" id="{266F0882-C370-29D4-9978-2522FFA31760}"/>
+              </a:ext>
+            </a:extLst>
+          </p:cNvPr>
+          <p:cNvSpPr/>
+          <p:nvPr/>
+        </p:nvSpPr>
+        <p:spPr>
+          <a:xfrm>
+            <a:off x="542446" y="1180091"/>
+            <a:ext cx="289166" cy="289166"/>
+          </a:xfrm>
+          <a:prstGeom prst="smileyFace">
+            <a:avLst/>
+          </a:prstGeom>
+          <a:noFill/>
+          <a:ln>
+            <a:solidFill>
+              <a:srgbClr val="0070C0"/>
+            </a:solidFill>
+          </a:ln>
+        </p:spPr>
+        <p:style>
+          <a:lnRef idx="2">
+            <a:schemeClr val="accent1">
+              <a:shade val="50000"/>
+            </a:schemeClr>
+          </a:lnRef>
+          <a:fillRef idx="1">
+            <a:schemeClr val="accent1"/>
+          </a:fillRef>
+          <a:effectRef idx="0">
+            <a:schemeClr val="accent1"/>
+          </a:effectRef>
+          <a:fontRef idx="minor">
+            <a:schemeClr val="lt1"/>
+          </a:fontRef>
+        </p:style>
+        <p:txBody>
+          <a:bodyPr rtlCol="0" anchor="ctr"/>
+          <a:lstStyle/>
+          <a:p>
+            <a:pPr algn="ctr"/>
+            <a:endParaRPr lang="en-US" sz="900">
+              <a:solidFill>
+                <a:schemeClr val="tx1"/>
+              </a:solidFill>
+            </a:endParaRPr>
+          </a:p>
+        </p:txBody>
+      </p:sp>
+      <p:cxnSp>
+        <p:nvCxnSpPr>
+          <p:cNvPr id="12" name="Straight Arrow Connector 154">
+            <a:extLst>
+              <a:ext uri="{FF2B5EF4-FFF2-40B4-BE49-F238E27FC236}">
+                <a16:creationId xmlns:a16="http://schemas.microsoft.com/office/drawing/2014/main" id="{5C780608-0FD8-262E-14CC-0B9F9F9F339F}"/>
+              </a:ext>
+            </a:extLst>
+          </p:cNvPr>
+          <p:cNvCxnSpPr>
+            <a:stCxn id="11" idx="4"/>
+          </p:cNvCxnSpPr>
+          <p:nvPr/>
+        </p:nvCxnSpPr>
+        <p:spPr>
+          <a:xfrm>
+            <a:off x="687029" y="1469257"/>
+            <a:ext cx="0" cy="287079"/>
+          </a:xfrm>
+          <a:prstGeom prst="straightConnector1">
+            <a:avLst/>
+          </a:prstGeom>
+          <a:ln w="12700">
+            <a:solidFill>
+              <a:schemeClr val="accent2"/>
+            </a:solidFill>
+            <a:prstDash val="sysDot"/>
+            <a:tailEnd type="triangle"/>
+          </a:ln>
+        </p:spPr>
+        <p:style>
+          <a:lnRef idx="1">
+            <a:schemeClr val="accent1"/>
+          </a:lnRef>
+          <a:fillRef idx="0">
+            <a:schemeClr val="accent1"/>
+          </a:fillRef>
+          <a:effectRef idx="0">
+            <a:schemeClr val="accent1"/>
+          </a:effectRef>
+          <a:fontRef idx="minor">
+            <a:schemeClr val="tx1"/>
+          </a:fontRef>
+        </p:style>
+      </p:cxnSp>
+      <p:cxnSp>
+        <p:nvCxnSpPr>
+          <p:cNvPr id="13" name="Straight Arrow Connector 155">
+            <a:extLst>
+              <a:ext uri="{FF2B5EF4-FFF2-40B4-BE49-F238E27FC236}">
+                <a16:creationId xmlns:a16="http://schemas.microsoft.com/office/drawing/2014/main" id="{EC672569-39D9-9D05-9D4F-E9EFD70020D0}"/>
+              </a:ext>
+            </a:extLst>
+          </p:cNvPr>
+          <p:cNvCxnSpPr/>
+          <p:nvPr/>
+        </p:nvCxnSpPr>
+        <p:spPr>
+          <a:xfrm>
+            <a:off x="687029" y="2014244"/>
+            <a:ext cx="1" cy="287080"/>
+          </a:xfrm>
+          <a:prstGeom prst="straightConnector1">
+            <a:avLst/>
+          </a:prstGeom>
+          <a:ln w="12700">
+            <a:solidFill>
+              <a:schemeClr val="accent2"/>
+            </a:solidFill>
+            <a:prstDash val="sysDot"/>
+            <a:tailEnd type="triangle"/>
+          </a:ln>
+        </p:spPr>
+        <p:style>
+          <a:lnRef idx="1">
+            <a:schemeClr val="accent1"/>
+          </a:lnRef>
+          <a:fillRef idx="0">
+            <a:schemeClr val="accent1"/>
+          </a:fillRef>
+          <a:effectRef idx="0">
+            <a:schemeClr val="accent1"/>
+          </a:effectRef>
+          <a:fontRef idx="minor">
+            <a:schemeClr val="tx1"/>
+          </a:fontRef>
+        </p:style>
+      </p:cxnSp>
+      <p:sp>
+        <p:nvSpPr>
+          <p:cNvPr id="15" name="Rectangle 153">
+            <a:extLst>
+              <a:ext uri="{FF2B5EF4-FFF2-40B4-BE49-F238E27FC236}">
+                <a16:creationId xmlns:a16="http://schemas.microsoft.com/office/drawing/2014/main" id="{33C52576-3C90-BB94-F4D8-4D0BA33F1375}"/>
+              </a:ext>
+            </a:extLst>
+          </p:cNvPr>
+          <p:cNvSpPr/>
+          <p:nvPr/>
+        </p:nvSpPr>
+        <p:spPr>
+          <a:xfrm>
+            <a:off x="371248" y="1755962"/>
+            <a:ext cx="629340" cy="257908"/>
+          </a:xfrm>
+          <a:prstGeom prst="rect">
+            <a:avLst/>
+          </a:prstGeom>
+          <a:solidFill>
+            <a:schemeClr val="accent2">
+              <a:lumMod val="20000"/>
+              <a:lumOff val="80000"/>
+            </a:schemeClr>
+          </a:solidFill>
+          <a:ln>
+            <a:solidFill>
+              <a:schemeClr val="accent2"/>
+            </a:solidFill>
+          </a:ln>
+        </p:spPr>
+        <p:style>
+          <a:lnRef idx="2">
+            <a:schemeClr val="accent1">
+              <a:shade val="50000"/>
+            </a:schemeClr>
+          </a:lnRef>
+          <a:fillRef idx="1">
+            <a:schemeClr val="accent1"/>
+          </a:fillRef>
+          <a:effectRef idx="0">
+            <a:schemeClr val="accent1"/>
+          </a:effectRef>
+          <a:fontRef idx="minor">
+            <a:schemeClr val="lt1"/>
+          </a:fontRef>
+        </p:style>
+        <p:txBody>
+          <a:bodyPr rtlCol="0" anchor="ctr"/>
+          <a:lstStyle/>
+          <a:p>
+            <a:pPr algn="ctr"/>
+            <a:r>
+              <a:rPr lang="en-US" sz="900" dirty="0" err="1">
+                <a:solidFill>
+                  <a:schemeClr val="tx1"/>
+                </a:solidFill>
+              </a:rPr>
+              <a:t>CATcher</a:t>
+            </a:r>
+            <a:endParaRPr lang="en-US" sz="900" dirty="0">
+              <a:solidFill>
+                <a:schemeClr val="tx1"/>
+              </a:solidFill>
+            </a:endParaRPr>
+          </a:p>
+        </p:txBody>
+      </p:sp>
+      <p:sp>
+        <p:nvSpPr>
+          <p:cNvPr id="16" name="Rounded Rectangle 87">
+            <a:extLst>
+              <a:ext uri="{FF2B5EF4-FFF2-40B4-BE49-F238E27FC236}">
+                <a16:creationId xmlns:a16="http://schemas.microsoft.com/office/drawing/2014/main" id="{0E9884E5-08E5-D69F-06AE-6AFC0C210C6A}"/>
+              </a:ext>
+            </a:extLst>
+          </p:cNvPr>
+          <p:cNvSpPr/>
+          <p:nvPr/>
+        </p:nvSpPr>
+        <p:spPr>
+          <a:xfrm>
+            <a:off x="307180" y="2311967"/>
+            <a:ext cx="828431" cy="343877"/>
+          </a:xfrm>
+          <a:prstGeom prst="roundRect">
+            <a:avLst>
+              <a:gd name="adj" fmla="val 50000"/>
+            </a:avLst>
+          </a:prstGeom>
+          <a:solidFill>
+            <a:schemeClr val="bg1">
+              <a:lumMod val="85000"/>
+            </a:schemeClr>
+          </a:solidFill>
+        </p:spPr>
+        <p:style>
+          <a:lnRef idx="2">
+            <a:schemeClr val="accent1">
+              <a:shade val="50000"/>
+            </a:schemeClr>
+          </a:lnRef>
+          <a:fillRef idx="1">
+            <a:schemeClr val="accent1"/>
+          </a:fillRef>
+          <a:effectRef idx="0">
+            <a:schemeClr val="accent1"/>
+          </a:effectRef>
+          <a:fontRef idx="minor">
+            <a:schemeClr val="lt1"/>
+          </a:fontRef>
+        </p:style>
+        <p:txBody>
+          <a:bodyPr rtlCol="0" anchor="ctr"/>
+          <a:lstStyle/>
+          <a:p>
+            <a:pPr algn="ctr"/>
+            <a:r>
+              <a:rPr lang="en-US" sz="900" dirty="0">
+                <a:solidFill>
+                  <a:srgbClr val="FF0000"/>
+                </a:solidFill>
+              </a:rPr>
+              <a:t>tester</a:t>
+            </a:r>
+            <a:r>
+              <a:rPr lang="en-US" sz="900" dirty="0">
+                <a:solidFill>
+                  <a:schemeClr val="tx1"/>
+                </a:solidFill>
+              </a:rPr>
+              <a:t>/pe</a:t>
+            </a:r>
+          </a:p>
+        </p:txBody>
+      </p:sp>
+    </p:spTree>
+    <p:extLst>
+      <p:ext uri="{BB962C8B-B14F-4D97-AF65-F5344CB8AC3E}">
+        <p14:creationId xmlns:p14="http://schemas.microsoft.com/office/powerpoint/2010/main" val="3898920289"/>
+      </p:ext>
+    </p:extLst>
+  </p:cSld>
+  <p:clrMapOvr>
+    <a:masterClrMapping/>
+  </p:clrMapOvr>
+</p:sld>
+</file>
+
 <file path=ppt/theme/theme1.xml><?xml version="1.0" encoding="utf-8"?>
 <a:theme xmlns:a="http://schemas.openxmlformats.org/drawingml/2006/main" name="Office Theme">
   <a:themeElements>

</xml_diff>

<commit_message>
Update workflow for PE-D
</commit_message>
<xml_diff>
--- a/assets/Workflow.pptx
+++ b/assets/Workflow.pptx
@@ -8814,7 +8814,7 @@
         </p:nvSpPr>
         <p:spPr>
           <a:xfrm>
-            <a:off x="2940036" y="2934720"/>
+            <a:off x="3051548" y="2923569"/>
             <a:ext cx="1432362" cy="589131"/>
           </a:xfrm>
           <a:prstGeom prst="rect">
@@ -8875,7 +8875,7 @@
         </p:nvSpPr>
         <p:spPr>
           <a:xfrm>
-            <a:off x="6528916" y="681201"/>
+            <a:off x="6640428" y="670050"/>
             <a:ext cx="1685489" cy="2171556"/>
           </a:xfrm>
           <a:prstGeom prst="rect">
@@ -8939,7 +8939,7 @@
         </p:nvSpPr>
         <p:spPr>
           <a:xfrm>
-            <a:off x="4979025" y="681201"/>
+            <a:off x="5090537" y="670050"/>
             <a:ext cx="1463550" cy="2171556"/>
           </a:xfrm>
           <a:prstGeom prst="rect">
@@ -9003,7 +9003,7 @@
         </p:nvSpPr>
         <p:spPr>
           <a:xfrm>
-            <a:off x="3045972" y="681201"/>
+            <a:off x="3157484" y="670050"/>
             <a:ext cx="1851152" cy="2171556"/>
           </a:xfrm>
           <a:prstGeom prst="rect">
@@ -9067,7 +9067,7 @@
         </p:nvSpPr>
         <p:spPr>
           <a:xfrm>
-            <a:off x="1635603" y="684726"/>
+            <a:off x="1747115" y="673575"/>
             <a:ext cx="1319170" cy="2839125"/>
           </a:xfrm>
           <a:prstGeom prst="rect">
@@ -9131,7 +9131,7 @@
         </p:nvSpPr>
         <p:spPr>
           <a:xfrm>
-            <a:off x="1771949" y="2303770"/>
+            <a:off x="1883461" y="2292619"/>
             <a:ext cx="828431" cy="343877"/>
           </a:xfrm>
           <a:prstGeom prst="roundRect">
@@ -9199,7 +9199,7 @@
         </p:nvSpPr>
         <p:spPr>
           <a:xfrm>
-            <a:off x="3292458" y="2303767"/>
+            <a:off x="3403970" y="2292616"/>
             <a:ext cx="1168400" cy="343877"/>
           </a:xfrm>
           <a:prstGeom prst="roundRect">
@@ -9274,7 +9274,7 @@
         </p:nvSpPr>
         <p:spPr>
           <a:xfrm>
-            <a:off x="6845724" y="2303768"/>
+            <a:off x="6957236" y="2292617"/>
             <a:ext cx="997924" cy="343877"/>
           </a:xfrm>
           <a:prstGeom prst="roundRect">
@@ -9349,7 +9349,7 @@
         </p:nvSpPr>
         <p:spPr>
           <a:xfrm>
-            <a:off x="8389633" y="2303767"/>
+            <a:off x="8501145" y="2292616"/>
             <a:ext cx="539261" cy="343877"/>
           </a:xfrm>
           <a:prstGeom prst="foldedCorner">
@@ -9407,7 +9407,7 @@
         </p:nvSpPr>
         <p:spPr>
           <a:xfrm>
-            <a:off x="1996463" y="3190620"/>
+            <a:off x="2107975" y="3179469"/>
             <a:ext cx="515815" cy="230832"/>
           </a:xfrm>
           <a:prstGeom prst="rect">
@@ -9445,7 +9445,7 @@
         </p:nvCxnSpPr>
         <p:spPr>
           <a:xfrm flipV="1">
-            <a:off x="4460858" y="2475665"/>
+            <a:off x="4572370" y="2464514"/>
             <a:ext cx="742587" cy="41"/>
           </a:xfrm>
           <a:prstGeom prst="straightConnector1">
@@ -9491,7 +9491,7 @@
         </p:nvCxnSpPr>
         <p:spPr>
           <a:xfrm flipV="1">
-            <a:off x="7843648" y="2475706"/>
+            <a:off x="7955160" y="2464555"/>
             <a:ext cx="545985" cy="1"/>
           </a:xfrm>
           <a:prstGeom prst="straightConnector1">
@@ -9533,7 +9533,7 @@
         </p:nvSpPr>
         <p:spPr>
           <a:xfrm>
-            <a:off x="4520379" y="2607241"/>
+            <a:off x="4631891" y="2596090"/>
             <a:ext cx="515815" cy="230832"/>
           </a:xfrm>
           <a:prstGeom prst="rect">
@@ -9568,7 +9568,7 @@
         </p:nvSpPr>
         <p:spPr>
           <a:xfrm>
-            <a:off x="7815843" y="2589771"/>
+            <a:off x="7927355" y="2578620"/>
             <a:ext cx="515815" cy="230832"/>
           </a:xfrm>
           <a:prstGeom prst="rect">
@@ -9603,7 +9603,7 @@
         </p:nvSpPr>
         <p:spPr>
           <a:xfrm>
-            <a:off x="2041581" y="1182537"/>
+            <a:off x="2153093" y="1171386"/>
             <a:ext cx="289166" cy="289166"/>
           </a:xfrm>
           <a:prstGeom prst="smileyFace">
@@ -9659,7 +9659,7 @@
         </p:nvSpPr>
         <p:spPr>
           <a:xfrm>
-            <a:off x="1871494" y="1758782"/>
+            <a:off x="1983006" y="1747631"/>
             <a:ext cx="629340" cy="257908"/>
           </a:xfrm>
           <a:prstGeom prst="rect">
@@ -9731,7 +9731,7 @@
         </p:nvCxnSpPr>
         <p:spPr>
           <a:xfrm>
-            <a:off x="2186164" y="1471703"/>
+            <a:off x="2297676" y="1460552"/>
             <a:ext cx="0" cy="287079"/>
           </a:xfrm>
           <a:prstGeom prst="straightConnector1">
@@ -9777,7 +9777,7 @@
         </p:nvCxnSpPr>
         <p:spPr>
           <a:xfrm>
-            <a:off x="2186164" y="2016690"/>
+            <a:off x="2297676" y="2005539"/>
             <a:ext cx="1" cy="287080"/>
           </a:xfrm>
           <a:prstGeom prst="straightConnector1">
@@ -9820,7 +9820,7 @@
         </p:nvSpPr>
         <p:spPr>
           <a:xfrm>
-            <a:off x="1842288" y="951705"/>
+            <a:off x="1953800" y="940554"/>
             <a:ext cx="687753" cy="230832"/>
           </a:xfrm>
           <a:prstGeom prst="rect">
@@ -9856,7 +9856,7 @@
         </p:nvSpPr>
         <p:spPr>
           <a:xfrm>
-            <a:off x="3710580" y="1182537"/>
+            <a:off x="3822092" y="1171386"/>
             <a:ext cx="289166" cy="289166"/>
           </a:xfrm>
           <a:prstGeom prst="smileyFace">
@@ -9912,7 +9912,7 @@
         </p:nvSpPr>
         <p:spPr>
           <a:xfrm>
-            <a:off x="3540493" y="1758782"/>
+            <a:off x="3652005" y="1747631"/>
             <a:ext cx="629340" cy="257908"/>
           </a:xfrm>
           <a:prstGeom prst="rect">
@@ -9984,7 +9984,7 @@
         </p:nvCxnSpPr>
         <p:spPr>
           <a:xfrm>
-            <a:off x="3855163" y="1471703"/>
+            <a:off x="3966675" y="1460552"/>
             <a:ext cx="0" cy="287079"/>
           </a:xfrm>
           <a:prstGeom prst="straightConnector1">
@@ -10029,7 +10029,7 @@
         </p:nvCxnSpPr>
         <p:spPr>
           <a:xfrm>
-            <a:off x="3855163" y="2016690"/>
+            <a:off x="3966675" y="2005539"/>
             <a:ext cx="1" cy="287080"/>
           </a:xfrm>
           <a:prstGeom prst="straightConnector1">
@@ -10072,7 +10072,7 @@
         </p:nvSpPr>
         <p:spPr>
           <a:xfrm>
-            <a:off x="3511287" y="951705"/>
+            <a:off x="3622799" y="940554"/>
             <a:ext cx="687753" cy="230832"/>
           </a:xfrm>
           <a:prstGeom prst="rect">
@@ -10109,7 +10109,7 @@
         </p:nvSpPr>
         <p:spPr>
           <a:xfrm>
-            <a:off x="7131931" y="1182537"/>
+            <a:off x="7243443" y="1171386"/>
             <a:ext cx="289166" cy="289166"/>
           </a:xfrm>
           <a:prstGeom prst="smileyFace">
@@ -10165,7 +10165,7 @@
         </p:nvSpPr>
         <p:spPr>
           <a:xfrm>
-            <a:off x="6961844" y="1758782"/>
+            <a:off x="7073356" y="1747631"/>
             <a:ext cx="629340" cy="257908"/>
           </a:xfrm>
           <a:prstGeom prst="rect">
@@ -10237,7 +10237,7 @@
         </p:nvCxnSpPr>
         <p:spPr>
           <a:xfrm>
-            <a:off x="7276514" y="1471703"/>
+            <a:off x="7388026" y="1460552"/>
             <a:ext cx="0" cy="287079"/>
           </a:xfrm>
           <a:prstGeom prst="straightConnector1">
@@ -10282,7 +10282,7 @@
         </p:nvCxnSpPr>
         <p:spPr>
           <a:xfrm>
-            <a:off x="7276514" y="2016690"/>
+            <a:off x="7388026" y="2005539"/>
             <a:ext cx="1" cy="287080"/>
           </a:xfrm>
           <a:prstGeom prst="straightConnector1">
@@ -10325,7 +10325,7 @@
         </p:nvSpPr>
         <p:spPr>
           <a:xfrm>
-            <a:off x="6932638" y="951705"/>
+            <a:off x="7044150" y="940554"/>
             <a:ext cx="687753" cy="230832"/>
           </a:xfrm>
           <a:prstGeom prst="rect">
@@ -10396,7 +10396,7 @@
         </p:nvSpPr>
         <p:spPr>
           <a:xfrm>
-            <a:off x="5203445" y="2303726"/>
+            <a:off x="5314957" y="2292575"/>
             <a:ext cx="798034" cy="343877"/>
           </a:xfrm>
           <a:prstGeom prst="roundRect">
@@ -10464,7 +10464,7 @@
         </p:nvSpPr>
         <p:spPr>
           <a:xfrm>
-            <a:off x="6031258" y="2593204"/>
+            <a:off x="6142770" y="2582053"/>
             <a:ext cx="515815" cy="230832"/>
           </a:xfrm>
           <a:prstGeom prst="rect">
@@ -10499,7 +10499,7 @@
         </p:nvSpPr>
         <p:spPr>
           <a:xfrm>
-            <a:off x="5436384" y="1190734"/>
+            <a:off x="5547896" y="1179583"/>
             <a:ext cx="289166" cy="289166"/>
           </a:xfrm>
           <a:prstGeom prst="smileyFace">
@@ -10555,7 +10555,7 @@
         </p:nvSpPr>
         <p:spPr>
           <a:xfrm>
-            <a:off x="5282773" y="1766979"/>
+            <a:off x="5394285" y="1755828"/>
             <a:ext cx="629340" cy="257908"/>
           </a:xfrm>
           <a:prstGeom prst="rect">
@@ -10624,7 +10624,7 @@
         </p:nvCxnSpPr>
         <p:spPr>
           <a:xfrm>
-            <a:off x="5589205" y="1479900"/>
+            <a:off x="5700717" y="1468749"/>
             <a:ext cx="0" cy="287079"/>
           </a:xfrm>
           <a:prstGeom prst="straightConnector1">
@@ -10667,7 +10667,7 @@
         </p:nvCxnSpPr>
         <p:spPr>
           <a:xfrm>
-            <a:off x="5589205" y="2024887"/>
+            <a:off x="5700717" y="2013736"/>
             <a:ext cx="1" cy="287080"/>
           </a:xfrm>
           <a:prstGeom prst="straightConnector1">
@@ -10710,7 +10710,7 @@
         </p:nvSpPr>
         <p:spPr>
           <a:xfrm>
-            <a:off x="5237091" y="959902"/>
+            <a:off x="5348603" y="948751"/>
             <a:ext cx="687753" cy="230832"/>
           </a:xfrm>
           <a:prstGeom prst="rect">
@@ -10746,7 +10746,7 @@
         </p:nvSpPr>
         <p:spPr>
           <a:xfrm>
-            <a:off x="2589363" y="3017374"/>
+            <a:off x="2700875" y="3006223"/>
             <a:ext cx="965620" cy="343877"/>
           </a:xfrm>
           <a:prstGeom prst="roundRect">
@@ -10824,7 +10824,7 @@
         </p:nvCxnSpPr>
         <p:spPr>
           <a:xfrm rot="16200000" flipH="1">
-            <a:off x="2116931" y="2716881"/>
+            <a:off x="2228443" y="2705730"/>
             <a:ext cx="541666" cy="403198"/>
           </a:xfrm>
           <a:prstGeom prst="bentConnector2">
@@ -10869,7 +10869,7 @@
         </p:nvCxnSpPr>
         <p:spPr>
           <a:xfrm flipV="1">
-            <a:off x="3554983" y="2647644"/>
+            <a:off x="3666495" y="2636493"/>
             <a:ext cx="321675" cy="541669"/>
           </a:xfrm>
           <a:prstGeom prst="bentConnector2">
@@ -10911,7 +10911,7 @@
         </p:nvSpPr>
         <p:spPr>
           <a:xfrm>
-            <a:off x="3914614" y="3026724"/>
+            <a:off x="4026126" y="3015573"/>
             <a:ext cx="515815" cy="230832"/>
           </a:xfrm>
           <a:prstGeom prst="rect">
@@ -10950,7 +10950,7 @@
         </p:nvCxnSpPr>
         <p:spPr>
           <a:xfrm>
-            <a:off x="6001479" y="2475665"/>
+            <a:off x="6112991" y="2464514"/>
             <a:ext cx="844245" cy="42"/>
           </a:xfrm>
           <a:prstGeom prst="straightConnector1">
@@ -10992,7 +10992,7 @@
         </p:nvSpPr>
         <p:spPr>
           <a:xfrm>
-            <a:off x="5203445" y="3652866"/>
+            <a:off x="5314957" y="3641715"/>
             <a:ext cx="1289696" cy="343877"/>
           </a:xfrm>
           <a:prstGeom prst="roundRect">
@@ -11038,55 +11038,6 @@
           </a:p>
         </p:txBody>
       </p:sp>
-      <p:cxnSp>
-        <p:nvCxnSpPr>
-          <p:cNvPr id="184" name="Elbow Connector 183">
-            <a:extLst>
-              <a:ext uri="{FF2B5EF4-FFF2-40B4-BE49-F238E27FC236}">
-                <a16:creationId xmlns:a16="http://schemas.microsoft.com/office/drawing/2014/main" id="{CB16975F-EF6F-07C5-AE79-943F77A7000C}"/>
-              </a:ext>
-            </a:extLst>
-          </p:cNvPr>
-          <p:cNvCxnSpPr>
-            <a:cxnSpLocks/>
-            <a:stCxn id="91" idx="1"/>
-            <a:endCxn id="115" idx="1"/>
-          </p:cNvCxnSpPr>
-          <p:nvPr/>
-        </p:nvCxnSpPr>
-        <p:spPr>
-          <a:xfrm rot="10800000" flipH="1" flipV="1">
-            <a:off x="1771949" y="2475709"/>
-            <a:ext cx="3431496" cy="1349096"/>
-          </a:xfrm>
-          <a:prstGeom prst="bentConnector3">
-            <a:avLst>
-              <a:gd name="adj1" fmla="val -6662"/>
-            </a:avLst>
-          </a:prstGeom>
-          <a:ln w="12700">
-            <a:solidFill>
-              <a:srgbClr val="00B050"/>
-            </a:solidFill>
-            <a:prstDash val="dash"/>
-            <a:tailEnd type="triangle"/>
-          </a:ln>
-        </p:spPr>
-        <p:style>
-          <a:lnRef idx="1">
-            <a:schemeClr val="accent1"/>
-          </a:lnRef>
-          <a:fillRef idx="0">
-            <a:schemeClr val="accent1"/>
-          </a:fillRef>
-          <a:effectRef idx="0">
-            <a:schemeClr val="accent1"/>
-          </a:effectRef>
-          <a:fontRef idx="minor">
-            <a:schemeClr val="tx1"/>
-          </a:fontRef>
-        </p:style>
-      </p:cxnSp>
       <p:cxnSp>
         <p:nvCxnSpPr>
           <p:cNvPr id="6" name="Straight Arrow Connector 5">
@@ -11101,7 +11052,7 @@
         </p:nvCxnSpPr>
         <p:spPr>
           <a:xfrm>
-            <a:off x="7073276" y="3632249"/>
+            <a:off x="7184788" y="3621098"/>
             <a:ext cx="441904" cy="0"/>
           </a:xfrm>
           <a:prstGeom prst="straightConnector1">
@@ -11144,7 +11095,7 @@
         </p:nvSpPr>
         <p:spPr>
           <a:xfrm>
-            <a:off x="7510297" y="3513181"/>
+            <a:off x="7621809" y="3502030"/>
             <a:ext cx="731328" cy="230832"/>
           </a:xfrm>
           <a:prstGeom prst="rect">
@@ -11187,7 +11138,7 @@
         </p:nvCxnSpPr>
         <p:spPr>
           <a:xfrm>
-            <a:off x="7056371" y="3363132"/>
+            <a:off x="7167883" y="3351981"/>
             <a:ext cx="441904" cy="0"/>
           </a:xfrm>
           <a:prstGeom prst="straightConnector1">
@@ -11229,7 +11180,7 @@
         </p:nvSpPr>
         <p:spPr>
           <a:xfrm>
-            <a:off x="7493392" y="3244064"/>
+            <a:off x="7604904" y="3232913"/>
             <a:ext cx="731328" cy="230832"/>
           </a:xfrm>
           <a:prstGeom prst="rect">
@@ -11272,7 +11223,7 @@
         </p:nvSpPr>
         <p:spPr>
           <a:xfrm>
-            <a:off x="2026127" y="3816935"/>
+            <a:off x="2137639" y="3805784"/>
             <a:ext cx="515815" cy="230832"/>
           </a:xfrm>
           <a:prstGeom prst="rect">
@@ -11289,67 +11240,6 @@
             <a:r>
               <a:rPr lang="en-US" sz="900" dirty="0"/>
               <a:t>script</a:t>
-            </a:r>
-          </a:p>
-        </p:txBody>
-      </p:sp>
-      <p:sp>
-        <p:nvSpPr>
-          <p:cNvPr id="7" name="Flowchart: Connector 6">
-            <a:extLst>
-              <a:ext uri="{FF2B5EF4-FFF2-40B4-BE49-F238E27FC236}">
-                <a16:creationId xmlns:a16="http://schemas.microsoft.com/office/drawing/2014/main" id="{A4AEECE8-1B27-B3A7-BDA4-A61439694A86}"/>
-              </a:ext>
-            </a:extLst>
-          </p:cNvPr>
-          <p:cNvSpPr/>
-          <p:nvPr/>
-        </p:nvSpPr>
-        <p:spPr>
-          <a:xfrm>
-            <a:off x="3715657" y="3695789"/>
-            <a:ext cx="344060" cy="263154"/>
-          </a:xfrm>
-          <a:prstGeom prst="flowChartConnector">
-            <a:avLst/>
-          </a:prstGeom>
-          <a:solidFill>
-            <a:schemeClr val="bg1"/>
-          </a:solidFill>
-          <a:ln>
-            <a:solidFill>
-              <a:srgbClr val="00B050"/>
-            </a:solidFill>
-          </a:ln>
-        </p:spPr>
-        <p:style>
-          <a:lnRef idx="2">
-            <a:schemeClr val="accent1">
-              <a:shade val="50000"/>
-            </a:schemeClr>
-          </a:lnRef>
-          <a:fillRef idx="1">
-            <a:schemeClr val="accent1"/>
-          </a:fillRef>
-          <a:effectRef idx="0">
-            <a:schemeClr val="accent1"/>
-          </a:effectRef>
-          <a:fontRef idx="minor">
-            <a:schemeClr val="lt1"/>
-          </a:fontRef>
-        </p:style>
-        <p:txBody>
-          <a:bodyPr lIns="0" tIns="0" rIns="0" bIns="0" rtlCol="0" anchor="ctr"/>
-          <a:lstStyle/>
-          <a:p>
-            <a:pPr algn="ctr"/>
-            <a:r>
-              <a:rPr lang="en-US" sz="1000" dirty="0">
-                <a:solidFill>
-                  <a:srgbClr val="00B050"/>
-                </a:solidFill>
-              </a:rPr>
-              <a:t>S1c</a:t>
             </a:r>
           </a:p>
         </p:txBody>
@@ -11368,7 +11258,7 @@
         </p:nvSpPr>
         <p:spPr>
           <a:xfrm>
-            <a:off x="1994038" y="2813473"/>
+            <a:off x="2105550" y="2802322"/>
             <a:ext cx="382031" cy="263154"/>
           </a:xfrm>
           <a:prstGeom prst="flowChartConnector">
@@ -11429,7 +11319,7 @@
         </p:nvSpPr>
         <p:spPr>
           <a:xfrm>
-            <a:off x="3685644" y="2793018"/>
+            <a:off x="3797156" y="2781867"/>
             <a:ext cx="382031" cy="263154"/>
           </a:xfrm>
           <a:prstGeom prst="flowChartConnector">
@@ -11490,7 +11380,7 @@
         </p:nvSpPr>
         <p:spPr>
           <a:xfrm>
-            <a:off x="4664184" y="2337289"/>
+            <a:off x="4775696" y="2326138"/>
             <a:ext cx="260932" cy="263154"/>
           </a:xfrm>
           <a:prstGeom prst="flowChartConnector">
@@ -11551,7 +11441,7 @@
         </p:nvSpPr>
         <p:spPr>
           <a:xfrm>
-            <a:off x="6232209" y="2344087"/>
+            <a:off x="6343721" y="2332936"/>
             <a:ext cx="260932" cy="263154"/>
           </a:xfrm>
           <a:prstGeom prst="flowChartConnector">
@@ -11612,7 +11502,7 @@
         </p:nvSpPr>
         <p:spPr>
           <a:xfrm>
-            <a:off x="7992467" y="2330050"/>
+            <a:off x="8103979" y="2318899"/>
             <a:ext cx="260932" cy="263154"/>
           </a:xfrm>
           <a:prstGeom prst="flowChartConnector">
@@ -11673,7 +11563,7 @@
         </p:nvSpPr>
         <p:spPr>
           <a:xfrm>
-            <a:off x="128111" y="681202"/>
+            <a:off x="239623" y="670051"/>
             <a:ext cx="1319170" cy="2156872"/>
           </a:xfrm>
           <a:prstGeom prst="rect">
@@ -11737,7 +11627,7 @@
         </p:nvSpPr>
         <p:spPr>
           <a:xfrm>
-            <a:off x="323824" y="949259"/>
+            <a:off x="435336" y="938108"/>
             <a:ext cx="687753" cy="230832"/>
           </a:xfrm>
           <a:prstGeom prst="rect">
@@ -11773,7 +11663,7 @@
         </p:nvSpPr>
         <p:spPr>
           <a:xfrm>
-            <a:off x="542446" y="1180091"/>
+            <a:off x="653958" y="1168940"/>
             <a:ext cx="289166" cy="289166"/>
           </a:xfrm>
           <a:prstGeom prst="smileyFace">
@@ -11831,7 +11721,7 @@
         </p:nvCxnSpPr>
         <p:spPr>
           <a:xfrm>
-            <a:off x="687029" y="1469257"/>
+            <a:off x="798541" y="1458106"/>
             <a:ext cx="0" cy="287079"/>
           </a:xfrm>
           <a:prstGeom prst="straightConnector1">
@@ -11874,7 +11764,7 @@
         </p:nvCxnSpPr>
         <p:spPr>
           <a:xfrm>
-            <a:off x="687029" y="2014244"/>
+            <a:off x="798541" y="2003093"/>
             <a:ext cx="1" cy="287080"/>
           </a:xfrm>
           <a:prstGeom prst="straightConnector1">
@@ -11917,7 +11807,7 @@
         </p:nvSpPr>
         <p:spPr>
           <a:xfrm>
-            <a:off x="371248" y="1755962"/>
+            <a:off x="482760" y="1744811"/>
             <a:ext cx="629340" cy="257908"/>
           </a:xfrm>
           <a:prstGeom prst="rect">
@@ -11986,7 +11876,7 @@
         </p:nvSpPr>
         <p:spPr>
           <a:xfrm>
-            <a:off x="307180" y="2311967"/>
+            <a:off x="418692" y="2300816"/>
             <a:ext cx="828431" cy="343877"/>
           </a:xfrm>
           <a:prstGeom prst="roundRect">
@@ -12036,6 +11926,115 @@
                 </a:solidFill>
               </a:rPr>
               <a:t>/pe</a:t>
+            </a:r>
+          </a:p>
+        </p:txBody>
+      </p:sp>
+      <p:cxnSp>
+        <p:nvCxnSpPr>
+          <p:cNvPr id="28" name="Elbow Connector 27">
+            <a:extLst>
+              <a:ext uri="{FF2B5EF4-FFF2-40B4-BE49-F238E27FC236}">
+                <a16:creationId xmlns:a16="http://schemas.microsoft.com/office/drawing/2014/main" id="{DAF42A89-74D2-E543-5535-62A26AD1C8C6}"/>
+              </a:ext>
+            </a:extLst>
+          </p:cNvPr>
+          <p:cNvCxnSpPr>
+            <a:cxnSpLocks/>
+          </p:cNvCxnSpPr>
+          <p:nvPr/>
+        </p:nvCxnSpPr>
+        <p:spPr>
+          <a:xfrm>
+            <a:off x="430299" y="2472754"/>
+            <a:ext cx="4896266" cy="1369173"/>
+          </a:xfrm>
+          <a:prstGeom prst="bentConnector3">
+            <a:avLst>
+              <a:gd name="adj1" fmla="val -5115"/>
+            </a:avLst>
+          </a:prstGeom>
+          <a:ln w="12700">
+            <a:solidFill>
+              <a:schemeClr val="accent6"/>
+            </a:solidFill>
+            <a:prstDash val="dash"/>
+            <a:headEnd type="none" w="med" len="med"/>
+            <a:tailEnd type="triangle" w="med" len="med"/>
+          </a:ln>
+        </p:spPr>
+        <p:style>
+          <a:lnRef idx="2">
+            <a:schemeClr val="accent6"/>
+          </a:lnRef>
+          <a:fillRef idx="0">
+            <a:schemeClr val="accent6"/>
+          </a:fillRef>
+          <a:effectRef idx="1">
+            <a:schemeClr val="accent6"/>
+          </a:effectRef>
+          <a:fontRef idx="minor">
+            <a:schemeClr val="tx1"/>
+          </a:fontRef>
+        </p:style>
+      </p:cxnSp>
+      <p:sp>
+        <p:nvSpPr>
+          <p:cNvPr id="7" name="Flowchart: Connector 6">
+            <a:extLst>
+              <a:ext uri="{FF2B5EF4-FFF2-40B4-BE49-F238E27FC236}">
+                <a16:creationId xmlns:a16="http://schemas.microsoft.com/office/drawing/2014/main" id="{A4AEECE8-1B27-B3A7-BDA4-A61439694A86}"/>
+              </a:ext>
+            </a:extLst>
+          </p:cNvPr>
+          <p:cNvSpPr/>
+          <p:nvPr/>
+        </p:nvSpPr>
+        <p:spPr>
+          <a:xfrm>
+            <a:off x="3797156" y="3732862"/>
+            <a:ext cx="344060" cy="263154"/>
+          </a:xfrm>
+          <a:prstGeom prst="flowChartConnector">
+            <a:avLst/>
+          </a:prstGeom>
+          <a:solidFill>
+            <a:schemeClr val="bg1"/>
+          </a:solidFill>
+          <a:ln>
+            <a:solidFill>
+              <a:srgbClr val="00B050"/>
+            </a:solidFill>
+          </a:ln>
+        </p:spPr>
+        <p:style>
+          <a:lnRef idx="2">
+            <a:schemeClr val="accent1">
+              <a:shade val="50000"/>
+            </a:schemeClr>
+          </a:lnRef>
+          <a:fillRef idx="1">
+            <a:schemeClr val="accent1"/>
+          </a:fillRef>
+          <a:effectRef idx="0">
+            <a:schemeClr val="accent1"/>
+          </a:effectRef>
+          <a:fontRef idx="minor">
+            <a:schemeClr val="lt1"/>
+          </a:fontRef>
+        </p:style>
+        <p:txBody>
+          <a:bodyPr lIns="0" tIns="0" rIns="0" bIns="0" rtlCol="0" anchor="ctr"/>
+          <a:lstStyle/>
+          <a:p>
+            <a:pPr algn="ctr"/>
+            <a:r>
+              <a:rPr lang="en-US" sz="1000" dirty="0">
+                <a:solidFill>
+                  <a:srgbClr val="00B050"/>
+                </a:solidFill>
+              </a:rPr>
+              <a:t>S1c</a:t>
             </a:r>
           </a:p>
         </p:txBody>

</xml_diff>

<commit_message>
Add bug-trimming phase to user-workflow.md (#43)
Add bug-trimming phase to user-workflow.md
</commit_message>
<xml_diff>
--- a/assets/Workflow.pptx
+++ b/assets/Workflow.pptx
@@ -7,6 +7,7 @@
   <p:sldIdLst>
     <p:sldId id="256" r:id="rId2"/>
     <p:sldId id="257" r:id="rId3"/>
+    <p:sldId id="258" r:id="rId4"/>
   </p:sldIdLst>
   <p:sldSz cx="9144000" cy="6858000" type="screen4x3"/>
   <p:notesSz cx="6797675" cy="9926638"/>
@@ -244,7 +245,7 @@
           <a:p>
             <a:fld id="{F1DFEE79-E53D-48D5-A539-1A6C3412748C}" type="datetimeFigureOut">
               <a:rPr lang="en-US" smtClean="0"/>
-              <a:t>5/20/2021</a:t>
+              <a:t>2/21/25</a:t>
             </a:fld>
             <a:endParaRPr lang="en-US"/>
           </a:p>
@@ -414,7 +415,7 @@
           <a:p>
             <a:fld id="{F1DFEE79-E53D-48D5-A539-1A6C3412748C}" type="datetimeFigureOut">
               <a:rPr lang="en-US" smtClean="0"/>
-              <a:t>5/20/2021</a:t>
+              <a:t>2/21/25</a:t>
             </a:fld>
             <a:endParaRPr lang="en-US"/>
           </a:p>
@@ -594,7 +595,7 @@
           <a:p>
             <a:fld id="{F1DFEE79-E53D-48D5-A539-1A6C3412748C}" type="datetimeFigureOut">
               <a:rPr lang="en-US" smtClean="0"/>
-              <a:t>5/20/2021</a:t>
+              <a:t>2/21/25</a:t>
             </a:fld>
             <a:endParaRPr lang="en-US"/>
           </a:p>
@@ -764,7 +765,7 @@
           <a:p>
             <a:fld id="{F1DFEE79-E53D-48D5-A539-1A6C3412748C}" type="datetimeFigureOut">
               <a:rPr lang="en-US" smtClean="0"/>
-              <a:t>5/20/2021</a:t>
+              <a:t>2/21/25</a:t>
             </a:fld>
             <a:endParaRPr lang="en-US"/>
           </a:p>
@@ -1008,7 +1009,7 @@
           <a:p>
             <a:fld id="{F1DFEE79-E53D-48D5-A539-1A6C3412748C}" type="datetimeFigureOut">
               <a:rPr lang="en-US" smtClean="0"/>
-              <a:t>5/20/2021</a:t>
+              <a:t>2/21/25</a:t>
             </a:fld>
             <a:endParaRPr lang="en-US"/>
           </a:p>
@@ -1240,7 +1241,7 @@
           <a:p>
             <a:fld id="{F1DFEE79-E53D-48D5-A539-1A6C3412748C}" type="datetimeFigureOut">
               <a:rPr lang="en-US" smtClean="0"/>
-              <a:t>5/20/2021</a:t>
+              <a:t>2/21/25</a:t>
             </a:fld>
             <a:endParaRPr lang="en-US"/>
           </a:p>
@@ -1607,7 +1608,7 @@
           <a:p>
             <a:fld id="{F1DFEE79-E53D-48D5-A539-1A6C3412748C}" type="datetimeFigureOut">
               <a:rPr lang="en-US" smtClean="0"/>
-              <a:t>5/20/2021</a:t>
+              <a:t>2/21/25</a:t>
             </a:fld>
             <a:endParaRPr lang="en-US"/>
           </a:p>
@@ -1725,7 +1726,7 @@
           <a:p>
             <a:fld id="{F1DFEE79-E53D-48D5-A539-1A6C3412748C}" type="datetimeFigureOut">
               <a:rPr lang="en-US" smtClean="0"/>
-              <a:t>5/20/2021</a:t>
+              <a:t>2/21/25</a:t>
             </a:fld>
             <a:endParaRPr lang="en-US"/>
           </a:p>
@@ -1820,7 +1821,7 @@
           <a:p>
             <a:fld id="{F1DFEE79-E53D-48D5-A539-1A6C3412748C}" type="datetimeFigureOut">
               <a:rPr lang="en-US" smtClean="0"/>
-              <a:t>5/20/2021</a:t>
+              <a:t>2/21/25</a:t>
             </a:fld>
             <a:endParaRPr lang="en-US"/>
           </a:p>
@@ -2097,7 +2098,7 @@
           <a:p>
             <a:fld id="{F1DFEE79-E53D-48D5-A539-1A6C3412748C}" type="datetimeFigureOut">
               <a:rPr lang="en-US" smtClean="0"/>
-              <a:t>5/20/2021</a:t>
+              <a:t>2/21/25</a:t>
             </a:fld>
             <a:endParaRPr lang="en-US"/>
           </a:p>
@@ -2354,7 +2355,7 @@
           <a:p>
             <a:fld id="{F1DFEE79-E53D-48D5-A539-1A6C3412748C}" type="datetimeFigureOut">
               <a:rPr lang="en-US" smtClean="0"/>
-              <a:t>5/20/2021</a:t>
+              <a:t>2/21/25</a:t>
             </a:fld>
             <a:endParaRPr lang="en-US"/>
           </a:p>
@@ -2567,7 +2568,7 @@
           <a:p>
             <a:fld id="{F1DFEE79-E53D-48D5-A539-1A6C3412748C}" type="datetimeFigureOut">
               <a:rPr lang="en-US" smtClean="0"/>
-              <a:t>5/20/2021</a:t>
+              <a:t>2/21/25</a:t>
             </a:fld>
             <a:endParaRPr lang="en-US"/>
           </a:p>
@@ -8776,6 +8777,3281 @@
 </p:sld>
 </file>
 
+<file path=ppt/slides/slide3.xml><?xml version="1.0" encoding="utf-8"?>
+<p:sld xmlns:a="http://schemas.openxmlformats.org/drawingml/2006/main" xmlns:r="http://schemas.openxmlformats.org/officeDocument/2006/relationships" xmlns:p="http://schemas.openxmlformats.org/presentationml/2006/main">
+  <p:cSld>
+    <p:spTree>
+      <p:nvGrpSpPr>
+        <p:cNvPr id="1" name="">
+          <a:extLst>
+            <a:ext uri="{FF2B5EF4-FFF2-40B4-BE49-F238E27FC236}">
+              <a16:creationId xmlns:a16="http://schemas.microsoft.com/office/drawing/2014/main" id="{9F758D80-6C15-9C2B-72A1-DA6B493C28B9}"/>
+            </a:ext>
+          </a:extLst>
+        </p:cNvPr>
+        <p:cNvGrpSpPr/>
+        <p:nvPr/>
+      </p:nvGrpSpPr>
+      <p:grpSpPr>
+        <a:xfrm>
+          <a:off x="0" y="0"/>
+          <a:ext cx="0" cy="0"/>
+          <a:chOff x="0" y="0"/>
+          <a:chExt cx="0" cy="0"/>
+        </a:xfrm>
+      </p:grpSpPr>
+      <p:sp>
+        <p:nvSpPr>
+          <p:cNvPr id="147" name="Rectangle 146">
+            <a:extLst>
+              <a:ext uri="{FF2B5EF4-FFF2-40B4-BE49-F238E27FC236}">
+                <a16:creationId xmlns:a16="http://schemas.microsoft.com/office/drawing/2014/main" id="{6D9AAB06-285C-7686-369E-5ED6650EFAFE}"/>
+              </a:ext>
+            </a:extLst>
+          </p:cNvPr>
+          <p:cNvSpPr/>
+          <p:nvPr/>
+        </p:nvSpPr>
+        <p:spPr>
+          <a:xfrm>
+            <a:off x="3051548" y="2923569"/>
+            <a:ext cx="1432362" cy="589131"/>
+          </a:xfrm>
+          <a:prstGeom prst="rect">
+            <a:avLst/>
+          </a:prstGeom>
+          <a:solidFill>
+            <a:schemeClr val="accent1">
+              <a:lumMod val="20000"/>
+              <a:lumOff val="80000"/>
+            </a:schemeClr>
+          </a:solidFill>
+          <a:ln>
+            <a:noFill/>
+          </a:ln>
+        </p:spPr>
+        <p:style>
+          <a:lnRef idx="2">
+            <a:schemeClr val="accent1">
+              <a:shade val="50000"/>
+            </a:schemeClr>
+          </a:lnRef>
+          <a:fillRef idx="1">
+            <a:schemeClr val="accent1"/>
+          </a:fillRef>
+          <a:effectRef idx="0">
+            <a:schemeClr val="accent1"/>
+          </a:effectRef>
+          <a:fontRef idx="minor">
+            <a:schemeClr val="lt1"/>
+          </a:fontRef>
+        </p:style>
+        <p:txBody>
+          <a:bodyPr rtlCol="0" anchor="t"/>
+          <a:lstStyle/>
+          <a:p>
+            <a:pPr algn="ctr"/>
+            <a:endParaRPr lang="en-SG" sz="1000" dirty="0">
+              <a:solidFill>
+                <a:schemeClr val="accent1">
+                  <a:lumMod val="75000"/>
+                </a:schemeClr>
+              </a:solidFill>
+            </a:endParaRPr>
+          </a:p>
+        </p:txBody>
+      </p:sp>
+      <p:sp>
+        <p:nvSpPr>
+          <p:cNvPr id="136" name="Rectangle 135">
+            <a:extLst>
+              <a:ext uri="{FF2B5EF4-FFF2-40B4-BE49-F238E27FC236}">
+                <a16:creationId xmlns:a16="http://schemas.microsoft.com/office/drawing/2014/main" id="{379E8539-FD6F-7C1B-43DC-D443F35D30FA}"/>
+              </a:ext>
+            </a:extLst>
+          </p:cNvPr>
+          <p:cNvSpPr/>
+          <p:nvPr/>
+        </p:nvSpPr>
+        <p:spPr>
+          <a:xfrm>
+            <a:off x="6640428" y="670050"/>
+            <a:ext cx="1685489" cy="2171556"/>
+          </a:xfrm>
+          <a:prstGeom prst="rect">
+            <a:avLst/>
+          </a:prstGeom>
+          <a:solidFill>
+            <a:schemeClr val="accent1">
+              <a:lumMod val="20000"/>
+              <a:lumOff val="80000"/>
+            </a:schemeClr>
+          </a:solidFill>
+          <a:ln>
+            <a:noFill/>
+          </a:ln>
+        </p:spPr>
+        <p:style>
+          <a:lnRef idx="2">
+            <a:schemeClr val="accent1">
+              <a:shade val="50000"/>
+            </a:schemeClr>
+          </a:lnRef>
+          <a:fillRef idx="1">
+            <a:schemeClr val="accent1"/>
+          </a:fillRef>
+          <a:effectRef idx="0">
+            <a:schemeClr val="accent1"/>
+          </a:effectRef>
+          <a:fontRef idx="minor">
+            <a:schemeClr val="lt1"/>
+          </a:fontRef>
+        </p:style>
+        <p:txBody>
+          <a:bodyPr rtlCol="0" anchor="t"/>
+          <a:lstStyle/>
+          <a:p>
+            <a:pPr algn="ctr"/>
+            <a:r>
+              <a:rPr lang="en-SG" sz="1000" dirty="0">
+                <a:solidFill>
+                  <a:schemeClr val="accent1">
+                    <a:lumMod val="75000"/>
+                  </a:schemeClr>
+                </a:solidFill>
+              </a:rPr>
+              <a:t>Moderation phase</a:t>
+            </a:r>
+          </a:p>
+        </p:txBody>
+      </p:sp>
+      <p:sp>
+        <p:nvSpPr>
+          <p:cNvPr id="135" name="Rectangle 134">
+            <a:extLst>
+              <a:ext uri="{FF2B5EF4-FFF2-40B4-BE49-F238E27FC236}">
+                <a16:creationId xmlns:a16="http://schemas.microsoft.com/office/drawing/2014/main" id="{ED887EFA-A86A-AA2A-CB35-711F884819E0}"/>
+              </a:ext>
+            </a:extLst>
+          </p:cNvPr>
+          <p:cNvSpPr/>
+          <p:nvPr/>
+        </p:nvSpPr>
+        <p:spPr>
+          <a:xfrm>
+            <a:off x="5090537" y="670050"/>
+            <a:ext cx="1463550" cy="2171556"/>
+          </a:xfrm>
+          <a:prstGeom prst="rect">
+            <a:avLst/>
+          </a:prstGeom>
+          <a:solidFill>
+            <a:schemeClr val="accent1">
+              <a:lumMod val="20000"/>
+              <a:lumOff val="80000"/>
+            </a:schemeClr>
+          </a:solidFill>
+          <a:ln>
+            <a:noFill/>
+          </a:ln>
+        </p:spPr>
+        <p:style>
+          <a:lnRef idx="2">
+            <a:schemeClr val="accent1">
+              <a:shade val="50000"/>
+            </a:schemeClr>
+          </a:lnRef>
+          <a:fillRef idx="1">
+            <a:schemeClr val="accent1"/>
+          </a:fillRef>
+          <a:effectRef idx="0">
+            <a:schemeClr val="accent1"/>
+          </a:effectRef>
+          <a:fontRef idx="minor">
+            <a:schemeClr val="lt1"/>
+          </a:fontRef>
+        </p:style>
+        <p:txBody>
+          <a:bodyPr rtlCol="0" anchor="t"/>
+          <a:lstStyle/>
+          <a:p>
+            <a:pPr algn="ctr"/>
+            <a:r>
+              <a:rPr lang="en-SG" sz="1000" dirty="0">
+                <a:solidFill>
+                  <a:schemeClr val="accent1">
+                    <a:lumMod val="75000"/>
+                  </a:schemeClr>
+                </a:solidFill>
+              </a:rPr>
+              <a:t>Tester-response phase</a:t>
+            </a:r>
+          </a:p>
+        </p:txBody>
+      </p:sp>
+      <p:sp>
+        <p:nvSpPr>
+          <p:cNvPr id="128" name="Rectangle 127">
+            <a:extLst>
+              <a:ext uri="{FF2B5EF4-FFF2-40B4-BE49-F238E27FC236}">
+                <a16:creationId xmlns:a16="http://schemas.microsoft.com/office/drawing/2014/main" id="{1B11FE06-1927-DBC3-FA0A-6349D0F49C5D}"/>
+              </a:ext>
+            </a:extLst>
+          </p:cNvPr>
+          <p:cNvSpPr/>
+          <p:nvPr/>
+        </p:nvSpPr>
+        <p:spPr>
+          <a:xfrm>
+            <a:off x="3157484" y="670050"/>
+            <a:ext cx="1851152" cy="2171556"/>
+          </a:xfrm>
+          <a:prstGeom prst="rect">
+            <a:avLst/>
+          </a:prstGeom>
+          <a:solidFill>
+            <a:schemeClr val="accent1">
+              <a:lumMod val="20000"/>
+              <a:lumOff val="80000"/>
+            </a:schemeClr>
+          </a:solidFill>
+          <a:ln>
+            <a:noFill/>
+          </a:ln>
+        </p:spPr>
+        <p:style>
+          <a:lnRef idx="2">
+            <a:schemeClr val="accent1">
+              <a:shade val="50000"/>
+            </a:schemeClr>
+          </a:lnRef>
+          <a:fillRef idx="1">
+            <a:schemeClr val="accent1"/>
+          </a:fillRef>
+          <a:effectRef idx="0">
+            <a:schemeClr val="accent1"/>
+          </a:effectRef>
+          <a:fontRef idx="minor">
+            <a:schemeClr val="lt1"/>
+          </a:fontRef>
+        </p:style>
+        <p:txBody>
+          <a:bodyPr rtlCol="0" anchor="t"/>
+          <a:lstStyle/>
+          <a:p>
+            <a:pPr algn="ctr"/>
+            <a:r>
+              <a:rPr lang="en-SG" sz="1000" dirty="0">
+                <a:solidFill>
+                  <a:schemeClr val="accent1">
+                    <a:lumMod val="75000"/>
+                  </a:schemeClr>
+                </a:solidFill>
+              </a:rPr>
+              <a:t>Dev-response phase</a:t>
+            </a:r>
+          </a:p>
+        </p:txBody>
+      </p:sp>
+      <p:sp>
+        <p:nvSpPr>
+          <p:cNvPr id="9" name="Rectangle 8">
+            <a:extLst>
+              <a:ext uri="{FF2B5EF4-FFF2-40B4-BE49-F238E27FC236}">
+                <a16:creationId xmlns:a16="http://schemas.microsoft.com/office/drawing/2014/main" id="{1784A960-9207-0AEA-351F-98A29BD50AF8}"/>
+              </a:ext>
+            </a:extLst>
+          </p:cNvPr>
+          <p:cNvSpPr/>
+          <p:nvPr/>
+        </p:nvSpPr>
+        <p:spPr>
+          <a:xfrm>
+            <a:off x="1747115" y="673575"/>
+            <a:ext cx="1319170" cy="2839125"/>
+          </a:xfrm>
+          <a:prstGeom prst="rect">
+            <a:avLst/>
+          </a:prstGeom>
+          <a:solidFill>
+            <a:schemeClr val="accent1">
+              <a:lumMod val="20000"/>
+              <a:lumOff val="80000"/>
+            </a:schemeClr>
+          </a:solidFill>
+          <a:ln>
+            <a:noFill/>
+          </a:ln>
+        </p:spPr>
+        <p:style>
+          <a:lnRef idx="2">
+            <a:schemeClr val="accent1">
+              <a:shade val="50000"/>
+            </a:schemeClr>
+          </a:lnRef>
+          <a:fillRef idx="1">
+            <a:schemeClr val="accent1"/>
+          </a:fillRef>
+          <a:effectRef idx="0">
+            <a:schemeClr val="accent1"/>
+          </a:effectRef>
+          <a:fontRef idx="minor">
+            <a:schemeClr val="lt1"/>
+          </a:fontRef>
+        </p:style>
+        <p:txBody>
+          <a:bodyPr rtlCol="0" anchor="t"/>
+          <a:lstStyle/>
+          <a:p>
+            <a:pPr algn="ctr"/>
+            <a:r>
+              <a:rPr lang="en-SG" sz="1000" dirty="0">
+                <a:solidFill>
+                  <a:schemeClr val="accent1">
+                    <a:lumMod val="75000"/>
+                  </a:schemeClr>
+                </a:solidFill>
+              </a:rPr>
+              <a:t>Bug trimming phase</a:t>
+            </a:r>
+          </a:p>
+        </p:txBody>
+      </p:sp>
+      <p:sp>
+        <p:nvSpPr>
+          <p:cNvPr id="91" name="Rounded Rectangle 87">
+            <a:extLst>
+              <a:ext uri="{FF2B5EF4-FFF2-40B4-BE49-F238E27FC236}">
+                <a16:creationId xmlns:a16="http://schemas.microsoft.com/office/drawing/2014/main" id="{4245430E-C4F4-7EB6-F13D-89EFED28384E}"/>
+              </a:ext>
+            </a:extLst>
+          </p:cNvPr>
+          <p:cNvSpPr/>
+          <p:nvPr/>
+        </p:nvSpPr>
+        <p:spPr>
+          <a:xfrm>
+            <a:off x="1883461" y="2292619"/>
+            <a:ext cx="828431" cy="343877"/>
+          </a:xfrm>
+          <a:prstGeom prst="roundRect">
+            <a:avLst>
+              <a:gd name="adj" fmla="val 50000"/>
+            </a:avLst>
+          </a:prstGeom>
+          <a:solidFill>
+            <a:schemeClr val="bg1">
+              <a:lumMod val="85000"/>
+            </a:schemeClr>
+          </a:solidFill>
+        </p:spPr>
+        <p:style>
+          <a:lnRef idx="2">
+            <a:schemeClr val="accent1">
+              <a:shade val="50000"/>
+            </a:schemeClr>
+          </a:lnRef>
+          <a:fillRef idx="1">
+            <a:schemeClr val="accent1"/>
+          </a:fillRef>
+          <a:effectRef idx="0">
+            <a:schemeClr val="accent1"/>
+          </a:effectRef>
+          <a:fontRef idx="minor">
+            <a:schemeClr val="lt1"/>
+          </a:fontRef>
+        </p:style>
+        <p:txBody>
+          <a:bodyPr rtlCol="0" anchor="ctr"/>
+          <a:lstStyle/>
+          <a:p>
+            <a:pPr algn="ctr"/>
+            <a:r>
+              <a:rPr lang="en-US" sz="900" dirty="0">
+                <a:solidFill>
+                  <a:srgbClr val="FF0000"/>
+                </a:solidFill>
+              </a:rPr>
+              <a:t>tester</a:t>
+            </a:r>
+            <a:r>
+              <a:rPr lang="en-US" sz="900" dirty="0">
+                <a:solidFill>
+                  <a:schemeClr val="tx1"/>
+                </a:solidFill>
+              </a:rPr>
+              <a:t>/pe</a:t>
+            </a:r>
+          </a:p>
+        </p:txBody>
+      </p:sp>
+      <p:sp>
+        <p:nvSpPr>
+          <p:cNvPr id="92" name="Rounded Rectangle 90">
+            <a:extLst>
+              <a:ext uri="{FF2B5EF4-FFF2-40B4-BE49-F238E27FC236}">
+                <a16:creationId xmlns:a16="http://schemas.microsoft.com/office/drawing/2014/main" id="{1AA3EF0B-4FA4-7588-E3AB-5800A46581CE}"/>
+              </a:ext>
+            </a:extLst>
+          </p:cNvPr>
+          <p:cNvSpPr/>
+          <p:nvPr/>
+        </p:nvSpPr>
+        <p:spPr>
+          <a:xfrm>
+            <a:off x="3403970" y="2292616"/>
+            <a:ext cx="1168400" cy="343877"/>
+          </a:xfrm>
+          <a:prstGeom prst="roundRect">
+            <a:avLst>
+              <a:gd name="adj" fmla="val 50000"/>
+            </a:avLst>
+          </a:prstGeom>
+          <a:solidFill>
+            <a:schemeClr val="bg1">
+              <a:lumMod val="85000"/>
+            </a:schemeClr>
+          </a:solidFill>
+        </p:spPr>
+        <p:style>
+          <a:lnRef idx="2">
+            <a:schemeClr val="accent1">
+              <a:shade val="50000"/>
+            </a:schemeClr>
+          </a:lnRef>
+          <a:fillRef idx="1">
+            <a:schemeClr val="accent1"/>
+          </a:fillRef>
+          <a:effectRef idx="0">
+            <a:schemeClr val="accent1"/>
+          </a:effectRef>
+          <a:fontRef idx="minor">
+            <a:schemeClr val="lt1"/>
+          </a:fontRef>
+        </p:style>
+        <p:txBody>
+          <a:bodyPr rtlCol="0" anchor="ctr"/>
+          <a:lstStyle/>
+          <a:p>
+            <a:pPr algn="ctr"/>
+            <a:r>
+              <a:rPr lang="en-US" sz="900" dirty="0">
+                <a:solidFill>
+                  <a:schemeClr val="tx1"/>
+                </a:solidFill>
+              </a:rPr>
+              <a:t>module-org/</a:t>
+            </a:r>
+            <a:br>
+              <a:rPr lang="en-US" sz="900" dirty="0">
+                <a:solidFill>
+                  <a:schemeClr val="tx1"/>
+                </a:solidFill>
+              </a:rPr>
+            </a:br>
+            <a:r>
+              <a:rPr lang="en-US" sz="900" dirty="0">
+                <a:solidFill>
+                  <a:schemeClr val="tx1"/>
+                </a:solidFill>
+              </a:rPr>
+              <a:t>pe-dev-response</a:t>
+            </a:r>
+          </a:p>
+        </p:txBody>
+      </p:sp>
+      <p:sp>
+        <p:nvSpPr>
+          <p:cNvPr id="113" name="Rounded Rectangle 91">
+            <a:extLst>
+              <a:ext uri="{FF2B5EF4-FFF2-40B4-BE49-F238E27FC236}">
+                <a16:creationId xmlns:a16="http://schemas.microsoft.com/office/drawing/2014/main" id="{264250FB-DF93-7FB7-0932-14E0D347F72A}"/>
+              </a:ext>
+            </a:extLst>
+          </p:cNvPr>
+          <p:cNvSpPr/>
+          <p:nvPr/>
+        </p:nvSpPr>
+        <p:spPr>
+          <a:xfrm>
+            <a:off x="6957236" y="2292617"/>
+            <a:ext cx="997924" cy="343877"/>
+          </a:xfrm>
+          <a:prstGeom prst="roundRect">
+            <a:avLst>
+              <a:gd name="adj" fmla="val 50000"/>
+            </a:avLst>
+          </a:prstGeom>
+          <a:solidFill>
+            <a:schemeClr val="bg1">
+              <a:lumMod val="85000"/>
+            </a:schemeClr>
+          </a:solidFill>
+        </p:spPr>
+        <p:style>
+          <a:lnRef idx="2">
+            <a:schemeClr val="accent1">
+              <a:shade val="50000"/>
+            </a:schemeClr>
+          </a:lnRef>
+          <a:fillRef idx="1">
+            <a:schemeClr val="accent1"/>
+          </a:fillRef>
+          <a:effectRef idx="0">
+            <a:schemeClr val="accent1"/>
+          </a:effectRef>
+          <a:fontRef idx="minor">
+            <a:schemeClr val="lt1"/>
+          </a:fontRef>
+        </p:style>
+        <p:txBody>
+          <a:bodyPr rtlCol="0" anchor="ctr"/>
+          <a:lstStyle/>
+          <a:p>
+            <a:pPr algn="ctr"/>
+            <a:r>
+              <a:rPr lang="en-US" sz="900" dirty="0">
+                <a:solidFill>
+                  <a:schemeClr val="tx1"/>
+                </a:solidFill>
+              </a:rPr>
+              <a:t>module-org/</a:t>
+            </a:r>
+            <a:br>
+              <a:rPr lang="en-US" sz="900" dirty="0">
+                <a:solidFill>
+                  <a:schemeClr val="tx1"/>
+                </a:solidFill>
+              </a:rPr>
+            </a:br>
+            <a:r>
+              <a:rPr lang="en-US" sz="900" dirty="0">
+                <a:solidFill>
+                  <a:schemeClr val="tx1"/>
+                </a:solidFill>
+              </a:rPr>
+              <a:t>pe-moderation</a:t>
+            </a:r>
+          </a:p>
+        </p:txBody>
+      </p:sp>
+      <p:sp>
+        <p:nvSpPr>
+          <p:cNvPr id="114" name="Folded Corner 112">
+            <a:extLst>
+              <a:ext uri="{FF2B5EF4-FFF2-40B4-BE49-F238E27FC236}">
+                <a16:creationId xmlns:a16="http://schemas.microsoft.com/office/drawing/2014/main" id="{030A5579-3ADA-A1B8-A0F3-32770DBA3B31}"/>
+              </a:ext>
+            </a:extLst>
+          </p:cNvPr>
+          <p:cNvSpPr/>
+          <p:nvPr/>
+        </p:nvSpPr>
+        <p:spPr>
+          <a:xfrm>
+            <a:off x="8501145" y="2292616"/>
+            <a:ext cx="539261" cy="343877"/>
+          </a:xfrm>
+          <a:prstGeom prst="foldedCorner">
+            <a:avLst/>
+          </a:prstGeom>
+          <a:solidFill>
+            <a:schemeClr val="bg1">
+              <a:lumMod val="85000"/>
+            </a:schemeClr>
+          </a:solidFill>
+        </p:spPr>
+        <p:style>
+          <a:lnRef idx="2">
+            <a:schemeClr val="accent1">
+              <a:shade val="50000"/>
+            </a:schemeClr>
+          </a:lnRef>
+          <a:fillRef idx="1">
+            <a:schemeClr val="accent1"/>
+          </a:fillRef>
+          <a:effectRef idx="0">
+            <a:schemeClr val="accent1"/>
+          </a:effectRef>
+          <a:fontRef idx="minor">
+            <a:schemeClr val="lt1"/>
+          </a:fontRef>
+        </p:style>
+        <p:txBody>
+          <a:bodyPr rtlCol="0" anchor="ctr"/>
+          <a:lstStyle/>
+          <a:p>
+            <a:pPr algn="ctr"/>
+            <a:r>
+              <a:rPr lang="en-US" sz="900" dirty="0">
+                <a:solidFill>
+                  <a:schemeClr val="tx1"/>
+                </a:solidFill>
+              </a:rPr>
+              <a:t>report, marks</a:t>
+            </a:r>
+          </a:p>
+        </p:txBody>
+      </p:sp>
+      <p:sp>
+        <p:nvSpPr>
+          <p:cNvPr id="116" name="TextBox 114">
+            <a:extLst>
+              <a:ext uri="{FF2B5EF4-FFF2-40B4-BE49-F238E27FC236}">
+                <a16:creationId xmlns:a16="http://schemas.microsoft.com/office/drawing/2014/main" id="{04A063FA-7B84-C697-51C3-4DFB5C173D2D}"/>
+              </a:ext>
+            </a:extLst>
+          </p:cNvPr>
+          <p:cNvSpPr txBox="1"/>
+          <p:nvPr/>
+        </p:nvSpPr>
+        <p:spPr>
+          <a:xfrm>
+            <a:off x="2107975" y="3179469"/>
+            <a:ext cx="515815" cy="230832"/>
+          </a:xfrm>
+          <a:prstGeom prst="rect">
+            <a:avLst/>
+          </a:prstGeom>
+          <a:noFill/>
+        </p:spPr>
+        <p:txBody>
+          <a:bodyPr wrap="square" rtlCol="0">
+            <a:spAutoFit/>
+          </a:bodyPr>
+          <a:lstStyle/>
+          <a:p>
+            <a:r>
+              <a:rPr lang="en-US" sz="900" dirty="0"/>
+              <a:t>script</a:t>
+            </a:r>
+          </a:p>
+        </p:txBody>
+      </p:sp>
+      <p:cxnSp>
+        <p:nvCxnSpPr>
+          <p:cNvPr id="137" name="Straight Arrow Connector 135">
+            <a:extLst>
+              <a:ext uri="{FF2B5EF4-FFF2-40B4-BE49-F238E27FC236}">
+                <a16:creationId xmlns:a16="http://schemas.microsoft.com/office/drawing/2014/main" id="{706FF20E-588B-2C08-5A61-CDBB9374CBDE}"/>
+              </a:ext>
+            </a:extLst>
+          </p:cNvPr>
+          <p:cNvCxnSpPr>
+            <a:stCxn id="92" idx="3"/>
+            <a:endCxn id="170" idx="1"/>
+          </p:cNvCxnSpPr>
+          <p:nvPr/>
+        </p:nvCxnSpPr>
+        <p:spPr>
+          <a:xfrm flipV="1">
+            <a:off x="4572370" y="2464514"/>
+            <a:ext cx="742587" cy="41"/>
+          </a:xfrm>
+          <a:prstGeom prst="straightConnector1">
+            <a:avLst/>
+          </a:prstGeom>
+          <a:ln w="12700">
+            <a:solidFill>
+              <a:srgbClr val="FF0000"/>
+            </a:solidFill>
+            <a:tailEnd type="triangle"/>
+          </a:ln>
+        </p:spPr>
+        <p:style>
+          <a:lnRef idx="1">
+            <a:schemeClr val="accent1"/>
+          </a:lnRef>
+          <a:fillRef idx="0">
+            <a:schemeClr val="accent1"/>
+          </a:fillRef>
+          <a:effectRef idx="0">
+            <a:schemeClr val="accent1"/>
+          </a:effectRef>
+          <a:fontRef idx="minor">
+            <a:schemeClr val="tx1"/>
+          </a:fontRef>
+        </p:style>
+      </p:cxnSp>
+      <p:cxnSp>
+        <p:nvCxnSpPr>
+          <p:cNvPr id="145" name="Straight Arrow Connector 136">
+            <a:extLst>
+              <a:ext uri="{FF2B5EF4-FFF2-40B4-BE49-F238E27FC236}">
+                <a16:creationId xmlns:a16="http://schemas.microsoft.com/office/drawing/2014/main" id="{CAA0CDAA-D598-8346-9544-991E0C1300AF}"/>
+              </a:ext>
+            </a:extLst>
+          </p:cNvPr>
+          <p:cNvCxnSpPr>
+            <a:cxnSpLocks/>
+            <a:stCxn id="113" idx="3"/>
+            <a:endCxn id="114" idx="1"/>
+          </p:cNvCxnSpPr>
+          <p:nvPr/>
+        </p:nvCxnSpPr>
+        <p:spPr>
+          <a:xfrm flipV="1">
+            <a:off x="7955160" y="2464555"/>
+            <a:ext cx="545985" cy="1"/>
+          </a:xfrm>
+          <a:prstGeom prst="straightConnector1">
+            <a:avLst/>
+          </a:prstGeom>
+          <a:ln w="12700">
+            <a:solidFill>
+              <a:srgbClr val="FF0000"/>
+            </a:solidFill>
+            <a:tailEnd type="triangle"/>
+          </a:ln>
+        </p:spPr>
+        <p:style>
+          <a:lnRef idx="1">
+            <a:schemeClr val="accent1"/>
+          </a:lnRef>
+          <a:fillRef idx="0">
+            <a:schemeClr val="accent1"/>
+          </a:fillRef>
+          <a:effectRef idx="0">
+            <a:schemeClr val="accent1"/>
+          </a:effectRef>
+          <a:fontRef idx="minor">
+            <a:schemeClr val="tx1"/>
+          </a:fontRef>
+        </p:style>
+      </p:cxnSp>
+      <p:sp>
+        <p:nvSpPr>
+          <p:cNvPr id="146" name="TextBox 144">
+            <a:extLst>
+              <a:ext uri="{FF2B5EF4-FFF2-40B4-BE49-F238E27FC236}">
+                <a16:creationId xmlns:a16="http://schemas.microsoft.com/office/drawing/2014/main" id="{F20F8ADF-63F7-A33A-C551-B401EED32442}"/>
+              </a:ext>
+            </a:extLst>
+          </p:cNvPr>
+          <p:cNvSpPr txBox="1"/>
+          <p:nvPr/>
+        </p:nvSpPr>
+        <p:spPr>
+          <a:xfrm>
+            <a:off x="4631891" y="2596090"/>
+            <a:ext cx="515815" cy="230832"/>
+          </a:xfrm>
+          <a:prstGeom prst="rect">
+            <a:avLst/>
+          </a:prstGeom>
+          <a:noFill/>
+        </p:spPr>
+        <p:txBody>
+          <a:bodyPr wrap="square" rtlCol="0">
+            <a:spAutoFit/>
+          </a:bodyPr>
+          <a:lstStyle/>
+          <a:p>
+            <a:r>
+              <a:rPr lang="en-US" sz="900" dirty="0"/>
+              <a:t>script</a:t>
+            </a:r>
+          </a:p>
+        </p:txBody>
+      </p:sp>
+      <p:sp>
+        <p:nvSpPr>
+          <p:cNvPr id="150" name="TextBox 148">
+            <a:extLst>
+              <a:ext uri="{FF2B5EF4-FFF2-40B4-BE49-F238E27FC236}">
+                <a16:creationId xmlns:a16="http://schemas.microsoft.com/office/drawing/2014/main" id="{B78775C2-B76B-71FC-D581-337856938602}"/>
+              </a:ext>
+            </a:extLst>
+          </p:cNvPr>
+          <p:cNvSpPr txBox="1"/>
+          <p:nvPr/>
+        </p:nvSpPr>
+        <p:spPr>
+          <a:xfrm>
+            <a:off x="7927355" y="2578620"/>
+            <a:ext cx="515815" cy="230832"/>
+          </a:xfrm>
+          <a:prstGeom prst="rect">
+            <a:avLst/>
+          </a:prstGeom>
+          <a:noFill/>
+        </p:spPr>
+        <p:txBody>
+          <a:bodyPr wrap="square" rtlCol="0">
+            <a:spAutoFit/>
+          </a:bodyPr>
+          <a:lstStyle/>
+          <a:p>
+            <a:r>
+              <a:rPr lang="en-US" sz="900" dirty="0"/>
+              <a:t>script</a:t>
+            </a:r>
+          </a:p>
+        </p:txBody>
+      </p:sp>
+      <p:sp>
+        <p:nvSpPr>
+          <p:cNvPr id="154" name="Smiley Face 152">
+            <a:extLst>
+              <a:ext uri="{FF2B5EF4-FFF2-40B4-BE49-F238E27FC236}">
+                <a16:creationId xmlns:a16="http://schemas.microsoft.com/office/drawing/2014/main" id="{8DE6BDC3-6C75-8D28-A7D9-517235A96F05}"/>
+              </a:ext>
+            </a:extLst>
+          </p:cNvPr>
+          <p:cNvSpPr/>
+          <p:nvPr/>
+        </p:nvSpPr>
+        <p:spPr>
+          <a:xfrm>
+            <a:off x="2153093" y="1171386"/>
+            <a:ext cx="289166" cy="289166"/>
+          </a:xfrm>
+          <a:prstGeom prst="smileyFace">
+            <a:avLst/>
+          </a:prstGeom>
+          <a:noFill/>
+          <a:ln>
+            <a:solidFill>
+              <a:srgbClr val="0070C0"/>
+            </a:solidFill>
+          </a:ln>
+        </p:spPr>
+        <p:style>
+          <a:lnRef idx="2">
+            <a:schemeClr val="accent1">
+              <a:shade val="50000"/>
+            </a:schemeClr>
+          </a:lnRef>
+          <a:fillRef idx="1">
+            <a:schemeClr val="accent1"/>
+          </a:fillRef>
+          <a:effectRef idx="0">
+            <a:schemeClr val="accent1"/>
+          </a:effectRef>
+          <a:fontRef idx="minor">
+            <a:schemeClr val="lt1"/>
+          </a:fontRef>
+        </p:style>
+        <p:txBody>
+          <a:bodyPr rtlCol="0" anchor="ctr"/>
+          <a:lstStyle/>
+          <a:p>
+            <a:pPr algn="ctr"/>
+            <a:endParaRPr lang="en-US" sz="900">
+              <a:solidFill>
+                <a:schemeClr val="tx1"/>
+              </a:solidFill>
+            </a:endParaRPr>
+          </a:p>
+        </p:txBody>
+      </p:sp>
+      <p:sp>
+        <p:nvSpPr>
+          <p:cNvPr id="155" name="Rectangle 153">
+            <a:extLst>
+              <a:ext uri="{FF2B5EF4-FFF2-40B4-BE49-F238E27FC236}">
+                <a16:creationId xmlns:a16="http://schemas.microsoft.com/office/drawing/2014/main" id="{DEAAA19D-470C-E70B-263B-E190C68DA648}"/>
+              </a:ext>
+            </a:extLst>
+          </p:cNvPr>
+          <p:cNvSpPr/>
+          <p:nvPr/>
+        </p:nvSpPr>
+        <p:spPr>
+          <a:xfrm>
+            <a:off x="1983006" y="1747631"/>
+            <a:ext cx="629340" cy="257908"/>
+          </a:xfrm>
+          <a:prstGeom prst="rect">
+            <a:avLst/>
+          </a:prstGeom>
+          <a:solidFill>
+            <a:schemeClr val="accent2">
+              <a:lumMod val="20000"/>
+              <a:lumOff val="80000"/>
+            </a:schemeClr>
+          </a:solidFill>
+          <a:ln>
+            <a:solidFill>
+              <a:schemeClr val="accent2"/>
+            </a:solidFill>
+          </a:ln>
+        </p:spPr>
+        <p:style>
+          <a:lnRef idx="2">
+            <a:schemeClr val="accent1">
+              <a:shade val="50000"/>
+            </a:schemeClr>
+          </a:lnRef>
+          <a:fillRef idx="1">
+            <a:schemeClr val="accent1"/>
+          </a:fillRef>
+          <a:effectRef idx="0">
+            <a:schemeClr val="accent1"/>
+          </a:effectRef>
+          <a:fontRef idx="minor">
+            <a:schemeClr val="lt1"/>
+          </a:fontRef>
+        </p:style>
+        <p:txBody>
+          <a:bodyPr rtlCol="0" anchor="ctr"/>
+          <a:lstStyle/>
+          <a:p>
+            <a:pPr algn="ctr"/>
+            <a:r>
+              <a:rPr lang="en-US" sz="900" dirty="0" err="1">
+                <a:solidFill>
+                  <a:schemeClr val="tx1"/>
+                </a:solidFill>
+              </a:rPr>
+              <a:t>CATcher</a:t>
+            </a:r>
+            <a:endParaRPr lang="en-US" sz="900" dirty="0">
+              <a:solidFill>
+                <a:schemeClr val="tx1"/>
+              </a:solidFill>
+            </a:endParaRPr>
+          </a:p>
+        </p:txBody>
+      </p:sp>
+      <p:cxnSp>
+        <p:nvCxnSpPr>
+          <p:cNvPr id="156" name="Straight Arrow Connector 154">
+            <a:extLst>
+              <a:ext uri="{FF2B5EF4-FFF2-40B4-BE49-F238E27FC236}">
+                <a16:creationId xmlns:a16="http://schemas.microsoft.com/office/drawing/2014/main" id="{69872B07-C95F-CCEF-5A30-2C1052CE4788}"/>
+              </a:ext>
+            </a:extLst>
+          </p:cNvPr>
+          <p:cNvCxnSpPr>
+            <a:stCxn id="154" idx="4"/>
+            <a:endCxn id="155" idx="0"/>
+          </p:cNvCxnSpPr>
+          <p:nvPr/>
+        </p:nvCxnSpPr>
+        <p:spPr>
+          <a:xfrm>
+            <a:off x="2297676" y="1460552"/>
+            <a:ext cx="0" cy="287079"/>
+          </a:xfrm>
+          <a:prstGeom prst="straightConnector1">
+            <a:avLst/>
+          </a:prstGeom>
+          <a:ln w="12700">
+            <a:solidFill>
+              <a:schemeClr val="accent2"/>
+            </a:solidFill>
+            <a:prstDash val="sysDot"/>
+            <a:tailEnd type="triangle"/>
+          </a:ln>
+        </p:spPr>
+        <p:style>
+          <a:lnRef idx="1">
+            <a:schemeClr val="accent1"/>
+          </a:lnRef>
+          <a:fillRef idx="0">
+            <a:schemeClr val="accent1"/>
+          </a:fillRef>
+          <a:effectRef idx="0">
+            <a:schemeClr val="accent1"/>
+          </a:effectRef>
+          <a:fontRef idx="minor">
+            <a:schemeClr val="tx1"/>
+          </a:fontRef>
+        </p:style>
+      </p:cxnSp>
+      <p:cxnSp>
+        <p:nvCxnSpPr>
+          <p:cNvPr id="157" name="Straight Arrow Connector 155">
+            <a:extLst>
+              <a:ext uri="{FF2B5EF4-FFF2-40B4-BE49-F238E27FC236}">
+                <a16:creationId xmlns:a16="http://schemas.microsoft.com/office/drawing/2014/main" id="{2A56298D-1F2C-D18A-78A1-1DF5B65B22D1}"/>
+              </a:ext>
+            </a:extLst>
+          </p:cNvPr>
+          <p:cNvCxnSpPr>
+            <a:stCxn id="155" idx="2"/>
+            <a:endCxn id="91" idx="0"/>
+          </p:cNvCxnSpPr>
+          <p:nvPr/>
+        </p:nvCxnSpPr>
+        <p:spPr>
+          <a:xfrm>
+            <a:off x="2297676" y="2005539"/>
+            <a:ext cx="1" cy="287080"/>
+          </a:xfrm>
+          <a:prstGeom prst="straightConnector1">
+            <a:avLst/>
+          </a:prstGeom>
+          <a:ln w="12700">
+            <a:solidFill>
+              <a:schemeClr val="accent2"/>
+            </a:solidFill>
+            <a:prstDash val="sysDot"/>
+            <a:tailEnd type="triangle"/>
+          </a:ln>
+        </p:spPr>
+        <p:style>
+          <a:lnRef idx="1">
+            <a:schemeClr val="accent1"/>
+          </a:lnRef>
+          <a:fillRef idx="0">
+            <a:schemeClr val="accent1"/>
+          </a:fillRef>
+          <a:effectRef idx="0">
+            <a:schemeClr val="accent1"/>
+          </a:effectRef>
+          <a:fontRef idx="minor">
+            <a:schemeClr val="tx1"/>
+          </a:fontRef>
+        </p:style>
+      </p:cxnSp>
+      <p:sp>
+        <p:nvSpPr>
+          <p:cNvPr id="158" name="TextBox 156">
+            <a:extLst>
+              <a:ext uri="{FF2B5EF4-FFF2-40B4-BE49-F238E27FC236}">
+                <a16:creationId xmlns:a16="http://schemas.microsoft.com/office/drawing/2014/main" id="{A2BD10C5-00CE-2797-8555-65C3782E98EE}"/>
+              </a:ext>
+            </a:extLst>
+          </p:cNvPr>
+          <p:cNvSpPr txBox="1"/>
+          <p:nvPr/>
+        </p:nvSpPr>
+        <p:spPr>
+          <a:xfrm>
+            <a:off x="1953800" y="940554"/>
+            <a:ext cx="687753" cy="230832"/>
+          </a:xfrm>
+          <a:prstGeom prst="rect">
+            <a:avLst/>
+          </a:prstGeom>
+          <a:noFill/>
+        </p:spPr>
+        <p:txBody>
+          <a:bodyPr wrap="square" rtlCol="0">
+            <a:spAutoFit/>
+          </a:bodyPr>
+          <a:lstStyle/>
+          <a:p>
+            <a:pPr algn="ctr"/>
+            <a:r>
+              <a:rPr lang="en-US" sz="900" dirty="0"/>
+              <a:t>testers</a:t>
+            </a:r>
+          </a:p>
+        </p:txBody>
+      </p:sp>
+      <p:sp>
+        <p:nvSpPr>
+          <p:cNvPr id="159" name="Smiley Face 157">
+            <a:extLst>
+              <a:ext uri="{FF2B5EF4-FFF2-40B4-BE49-F238E27FC236}">
+                <a16:creationId xmlns:a16="http://schemas.microsoft.com/office/drawing/2014/main" id="{20F58ABA-FFF1-2A3A-B5E2-C808AD162CDD}"/>
+              </a:ext>
+            </a:extLst>
+          </p:cNvPr>
+          <p:cNvSpPr/>
+          <p:nvPr/>
+        </p:nvSpPr>
+        <p:spPr>
+          <a:xfrm>
+            <a:off x="3822092" y="1171386"/>
+            <a:ext cx="289166" cy="289166"/>
+          </a:xfrm>
+          <a:prstGeom prst="smileyFace">
+            <a:avLst/>
+          </a:prstGeom>
+          <a:noFill/>
+          <a:ln>
+            <a:solidFill>
+              <a:srgbClr val="00B050"/>
+            </a:solidFill>
+          </a:ln>
+        </p:spPr>
+        <p:style>
+          <a:lnRef idx="2">
+            <a:schemeClr val="accent1">
+              <a:shade val="50000"/>
+            </a:schemeClr>
+          </a:lnRef>
+          <a:fillRef idx="1">
+            <a:schemeClr val="accent1"/>
+          </a:fillRef>
+          <a:effectRef idx="0">
+            <a:schemeClr val="accent1"/>
+          </a:effectRef>
+          <a:fontRef idx="minor">
+            <a:schemeClr val="lt1"/>
+          </a:fontRef>
+        </p:style>
+        <p:txBody>
+          <a:bodyPr rtlCol="0" anchor="ctr"/>
+          <a:lstStyle/>
+          <a:p>
+            <a:pPr algn="ctr"/>
+            <a:endParaRPr lang="en-US" sz="900">
+              <a:solidFill>
+                <a:schemeClr val="tx1"/>
+              </a:solidFill>
+            </a:endParaRPr>
+          </a:p>
+        </p:txBody>
+      </p:sp>
+      <p:sp>
+        <p:nvSpPr>
+          <p:cNvPr id="160" name="Rectangle 158">
+            <a:extLst>
+              <a:ext uri="{FF2B5EF4-FFF2-40B4-BE49-F238E27FC236}">
+                <a16:creationId xmlns:a16="http://schemas.microsoft.com/office/drawing/2014/main" id="{21289C21-19D2-544F-21A2-0ED291A6FCC5}"/>
+              </a:ext>
+            </a:extLst>
+          </p:cNvPr>
+          <p:cNvSpPr/>
+          <p:nvPr/>
+        </p:nvSpPr>
+        <p:spPr>
+          <a:xfrm>
+            <a:off x="3652005" y="1747631"/>
+            <a:ext cx="629340" cy="257908"/>
+          </a:xfrm>
+          <a:prstGeom prst="rect">
+            <a:avLst/>
+          </a:prstGeom>
+          <a:solidFill>
+            <a:schemeClr val="accent2">
+              <a:lumMod val="20000"/>
+              <a:lumOff val="80000"/>
+            </a:schemeClr>
+          </a:solidFill>
+          <a:ln>
+            <a:solidFill>
+              <a:schemeClr val="accent2"/>
+            </a:solidFill>
+          </a:ln>
+        </p:spPr>
+        <p:style>
+          <a:lnRef idx="2">
+            <a:schemeClr val="accent1">
+              <a:shade val="50000"/>
+            </a:schemeClr>
+          </a:lnRef>
+          <a:fillRef idx="1">
+            <a:schemeClr val="accent1"/>
+          </a:fillRef>
+          <a:effectRef idx="0">
+            <a:schemeClr val="accent1"/>
+          </a:effectRef>
+          <a:fontRef idx="minor">
+            <a:schemeClr val="lt1"/>
+          </a:fontRef>
+        </p:style>
+        <p:txBody>
+          <a:bodyPr rtlCol="0" anchor="ctr"/>
+          <a:lstStyle/>
+          <a:p>
+            <a:pPr algn="ctr"/>
+            <a:r>
+              <a:rPr lang="en-US" sz="900" dirty="0" err="1">
+                <a:solidFill>
+                  <a:schemeClr val="tx1"/>
+                </a:solidFill>
+              </a:rPr>
+              <a:t>CATcher</a:t>
+            </a:r>
+            <a:endParaRPr lang="en-US" sz="900" dirty="0">
+              <a:solidFill>
+                <a:schemeClr val="tx1"/>
+              </a:solidFill>
+            </a:endParaRPr>
+          </a:p>
+        </p:txBody>
+      </p:sp>
+      <p:cxnSp>
+        <p:nvCxnSpPr>
+          <p:cNvPr id="161" name="Straight Arrow Connector 159">
+            <a:extLst>
+              <a:ext uri="{FF2B5EF4-FFF2-40B4-BE49-F238E27FC236}">
+                <a16:creationId xmlns:a16="http://schemas.microsoft.com/office/drawing/2014/main" id="{CEAB65C6-E690-4799-481F-0BAC72371A05}"/>
+              </a:ext>
+            </a:extLst>
+          </p:cNvPr>
+          <p:cNvCxnSpPr>
+            <a:stCxn id="159" idx="4"/>
+            <a:endCxn id="160" idx="0"/>
+          </p:cNvCxnSpPr>
+          <p:nvPr/>
+        </p:nvCxnSpPr>
+        <p:spPr>
+          <a:xfrm>
+            <a:off x="3966675" y="1460552"/>
+            <a:ext cx="0" cy="287079"/>
+          </a:xfrm>
+          <a:prstGeom prst="straightConnector1">
+            <a:avLst/>
+          </a:prstGeom>
+          <a:ln w="12700">
+            <a:solidFill>
+              <a:schemeClr val="accent2"/>
+            </a:solidFill>
+            <a:prstDash val="sysDot"/>
+            <a:tailEnd type="triangle"/>
+          </a:ln>
+        </p:spPr>
+        <p:style>
+          <a:lnRef idx="1">
+            <a:schemeClr val="accent1"/>
+          </a:lnRef>
+          <a:fillRef idx="0">
+            <a:schemeClr val="accent1"/>
+          </a:fillRef>
+          <a:effectRef idx="0">
+            <a:schemeClr val="accent1"/>
+          </a:effectRef>
+          <a:fontRef idx="minor">
+            <a:schemeClr val="tx1"/>
+          </a:fontRef>
+        </p:style>
+      </p:cxnSp>
+      <p:cxnSp>
+        <p:nvCxnSpPr>
+          <p:cNvPr id="162" name="Straight Arrow Connector 160">
+            <a:extLst>
+              <a:ext uri="{FF2B5EF4-FFF2-40B4-BE49-F238E27FC236}">
+                <a16:creationId xmlns:a16="http://schemas.microsoft.com/office/drawing/2014/main" id="{43B7141A-9BDD-7652-DCB1-D4B3B02E1AD4}"/>
+              </a:ext>
+            </a:extLst>
+          </p:cNvPr>
+          <p:cNvCxnSpPr>
+            <a:stCxn id="160" idx="2"/>
+          </p:cNvCxnSpPr>
+          <p:nvPr/>
+        </p:nvCxnSpPr>
+        <p:spPr>
+          <a:xfrm>
+            <a:off x="3966675" y="2005539"/>
+            <a:ext cx="1" cy="287080"/>
+          </a:xfrm>
+          <a:prstGeom prst="straightConnector1">
+            <a:avLst/>
+          </a:prstGeom>
+          <a:ln w="12700">
+            <a:solidFill>
+              <a:schemeClr val="accent2"/>
+            </a:solidFill>
+            <a:prstDash val="sysDot"/>
+            <a:tailEnd type="triangle"/>
+          </a:ln>
+        </p:spPr>
+        <p:style>
+          <a:lnRef idx="1">
+            <a:schemeClr val="accent1"/>
+          </a:lnRef>
+          <a:fillRef idx="0">
+            <a:schemeClr val="accent1"/>
+          </a:fillRef>
+          <a:effectRef idx="0">
+            <a:schemeClr val="accent1"/>
+          </a:effectRef>
+          <a:fontRef idx="minor">
+            <a:schemeClr val="tx1"/>
+          </a:fontRef>
+        </p:style>
+      </p:cxnSp>
+      <p:sp>
+        <p:nvSpPr>
+          <p:cNvPr id="163" name="TextBox 161">
+            <a:extLst>
+              <a:ext uri="{FF2B5EF4-FFF2-40B4-BE49-F238E27FC236}">
+                <a16:creationId xmlns:a16="http://schemas.microsoft.com/office/drawing/2014/main" id="{6897368A-6330-42AB-1283-40BC30421DF4}"/>
+              </a:ext>
+            </a:extLst>
+          </p:cNvPr>
+          <p:cNvSpPr txBox="1"/>
+          <p:nvPr/>
+        </p:nvSpPr>
+        <p:spPr>
+          <a:xfrm>
+            <a:off x="3622799" y="940554"/>
+            <a:ext cx="687753" cy="230832"/>
+          </a:xfrm>
+          <a:prstGeom prst="rect">
+            <a:avLst/>
+          </a:prstGeom>
+          <a:noFill/>
+        </p:spPr>
+        <p:txBody>
+          <a:bodyPr wrap="square" rtlCol="0">
+            <a:spAutoFit/>
+          </a:bodyPr>
+          <a:lstStyle/>
+          <a:p>
+            <a:pPr algn="ctr"/>
+            <a:r>
+              <a:rPr lang="en-US" sz="900" dirty="0" err="1"/>
+              <a:t>devs</a:t>
+            </a:r>
+            <a:endParaRPr lang="en-US" sz="900" dirty="0"/>
+          </a:p>
+        </p:txBody>
+      </p:sp>
+      <p:sp>
+        <p:nvSpPr>
+          <p:cNvPr id="164" name="Smiley Face 162">
+            <a:extLst>
+              <a:ext uri="{FF2B5EF4-FFF2-40B4-BE49-F238E27FC236}">
+                <a16:creationId xmlns:a16="http://schemas.microsoft.com/office/drawing/2014/main" id="{9F84D06A-1E2A-2CFB-DA94-F1F10C00EBF2}"/>
+              </a:ext>
+            </a:extLst>
+          </p:cNvPr>
+          <p:cNvSpPr/>
+          <p:nvPr/>
+        </p:nvSpPr>
+        <p:spPr>
+          <a:xfrm>
+            <a:off x="7243443" y="1171386"/>
+            <a:ext cx="289166" cy="289166"/>
+          </a:xfrm>
+          <a:prstGeom prst="smileyFace">
+            <a:avLst/>
+          </a:prstGeom>
+          <a:noFill/>
+          <a:ln>
+            <a:solidFill>
+              <a:schemeClr val="tx1"/>
+            </a:solidFill>
+          </a:ln>
+        </p:spPr>
+        <p:style>
+          <a:lnRef idx="2">
+            <a:schemeClr val="accent1">
+              <a:shade val="50000"/>
+            </a:schemeClr>
+          </a:lnRef>
+          <a:fillRef idx="1">
+            <a:schemeClr val="accent1"/>
+          </a:fillRef>
+          <a:effectRef idx="0">
+            <a:schemeClr val="accent1"/>
+          </a:effectRef>
+          <a:fontRef idx="minor">
+            <a:schemeClr val="lt1"/>
+          </a:fontRef>
+        </p:style>
+        <p:txBody>
+          <a:bodyPr rtlCol="0" anchor="ctr"/>
+          <a:lstStyle/>
+          <a:p>
+            <a:pPr algn="ctr"/>
+            <a:endParaRPr lang="en-US" sz="900">
+              <a:solidFill>
+                <a:schemeClr val="tx1"/>
+              </a:solidFill>
+            </a:endParaRPr>
+          </a:p>
+        </p:txBody>
+      </p:sp>
+      <p:sp>
+        <p:nvSpPr>
+          <p:cNvPr id="165" name="Rectangle 163">
+            <a:extLst>
+              <a:ext uri="{FF2B5EF4-FFF2-40B4-BE49-F238E27FC236}">
+                <a16:creationId xmlns:a16="http://schemas.microsoft.com/office/drawing/2014/main" id="{458E81C4-B001-AF37-DC17-9EDB29588B21}"/>
+              </a:ext>
+            </a:extLst>
+          </p:cNvPr>
+          <p:cNvSpPr/>
+          <p:nvPr/>
+        </p:nvSpPr>
+        <p:spPr>
+          <a:xfrm>
+            <a:off x="7073356" y="1747631"/>
+            <a:ext cx="629340" cy="257908"/>
+          </a:xfrm>
+          <a:prstGeom prst="rect">
+            <a:avLst/>
+          </a:prstGeom>
+          <a:solidFill>
+            <a:schemeClr val="accent2">
+              <a:lumMod val="20000"/>
+              <a:lumOff val="80000"/>
+            </a:schemeClr>
+          </a:solidFill>
+          <a:ln>
+            <a:solidFill>
+              <a:schemeClr val="accent2"/>
+            </a:solidFill>
+          </a:ln>
+        </p:spPr>
+        <p:style>
+          <a:lnRef idx="2">
+            <a:schemeClr val="accent1">
+              <a:shade val="50000"/>
+            </a:schemeClr>
+          </a:lnRef>
+          <a:fillRef idx="1">
+            <a:schemeClr val="accent1"/>
+          </a:fillRef>
+          <a:effectRef idx="0">
+            <a:schemeClr val="accent1"/>
+          </a:effectRef>
+          <a:fontRef idx="minor">
+            <a:schemeClr val="lt1"/>
+          </a:fontRef>
+        </p:style>
+        <p:txBody>
+          <a:bodyPr rtlCol="0" anchor="ctr"/>
+          <a:lstStyle/>
+          <a:p>
+            <a:pPr algn="ctr"/>
+            <a:r>
+              <a:rPr lang="en-US" sz="900" dirty="0" err="1">
+                <a:solidFill>
+                  <a:schemeClr val="tx1"/>
+                </a:solidFill>
+              </a:rPr>
+              <a:t>CATcher</a:t>
+            </a:r>
+            <a:endParaRPr lang="en-US" sz="900" dirty="0">
+              <a:solidFill>
+                <a:schemeClr val="tx1"/>
+              </a:solidFill>
+            </a:endParaRPr>
+          </a:p>
+        </p:txBody>
+      </p:sp>
+      <p:cxnSp>
+        <p:nvCxnSpPr>
+          <p:cNvPr id="166" name="Straight Arrow Connector 164">
+            <a:extLst>
+              <a:ext uri="{FF2B5EF4-FFF2-40B4-BE49-F238E27FC236}">
+                <a16:creationId xmlns:a16="http://schemas.microsoft.com/office/drawing/2014/main" id="{56E7DF6B-2BD0-7F8E-3504-E7F5D8DAA2B4}"/>
+              </a:ext>
+            </a:extLst>
+          </p:cNvPr>
+          <p:cNvCxnSpPr>
+            <a:stCxn id="164" idx="4"/>
+            <a:endCxn id="165" idx="0"/>
+          </p:cNvCxnSpPr>
+          <p:nvPr/>
+        </p:nvCxnSpPr>
+        <p:spPr>
+          <a:xfrm>
+            <a:off x="7388026" y="1460552"/>
+            <a:ext cx="0" cy="287079"/>
+          </a:xfrm>
+          <a:prstGeom prst="straightConnector1">
+            <a:avLst/>
+          </a:prstGeom>
+          <a:ln w="12700">
+            <a:solidFill>
+              <a:schemeClr val="accent2"/>
+            </a:solidFill>
+            <a:prstDash val="sysDot"/>
+            <a:tailEnd type="triangle"/>
+          </a:ln>
+        </p:spPr>
+        <p:style>
+          <a:lnRef idx="1">
+            <a:schemeClr val="accent1"/>
+          </a:lnRef>
+          <a:fillRef idx="0">
+            <a:schemeClr val="accent1"/>
+          </a:fillRef>
+          <a:effectRef idx="0">
+            <a:schemeClr val="accent1"/>
+          </a:effectRef>
+          <a:fontRef idx="minor">
+            <a:schemeClr val="tx1"/>
+          </a:fontRef>
+        </p:style>
+      </p:cxnSp>
+      <p:cxnSp>
+        <p:nvCxnSpPr>
+          <p:cNvPr id="167" name="Straight Arrow Connector 165">
+            <a:extLst>
+              <a:ext uri="{FF2B5EF4-FFF2-40B4-BE49-F238E27FC236}">
+                <a16:creationId xmlns:a16="http://schemas.microsoft.com/office/drawing/2014/main" id="{A968DD05-E1CC-60DB-0AB8-B674457B8C29}"/>
+              </a:ext>
+            </a:extLst>
+          </p:cNvPr>
+          <p:cNvCxnSpPr>
+            <a:stCxn id="165" idx="2"/>
+          </p:cNvCxnSpPr>
+          <p:nvPr/>
+        </p:nvCxnSpPr>
+        <p:spPr>
+          <a:xfrm>
+            <a:off x="7388026" y="2005539"/>
+            <a:ext cx="1" cy="287080"/>
+          </a:xfrm>
+          <a:prstGeom prst="straightConnector1">
+            <a:avLst/>
+          </a:prstGeom>
+          <a:ln w="12700">
+            <a:solidFill>
+              <a:schemeClr val="accent2"/>
+            </a:solidFill>
+            <a:prstDash val="sysDot"/>
+            <a:tailEnd type="triangle"/>
+          </a:ln>
+        </p:spPr>
+        <p:style>
+          <a:lnRef idx="1">
+            <a:schemeClr val="accent1"/>
+          </a:lnRef>
+          <a:fillRef idx="0">
+            <a:schemeClr val="accent1"/>
+          </a:fillRef>
+          <a:effectRef idx="0">
+            <a:schemeClr val="accent1"/>
+          </a:effectRef>
+          <a:fontRef idx="minor">
+            <a:schemeClr val="tx1"/>
+          </a:fontRef>
+        </p:style>
+      </p:cxnSp>
+      <p:sp>
+        <p:nvSpPr>
+          <p:cNvPr id="168" name="TextBox 166">
+            <a:extLst>
+              <a:ext uri="{FF2B5EF4-FFF2-40B4-BE49-F238E27FC236}">
+                <a16:creationId xmlns:a16="http://schemas.microsoft.com/office/drawing/2014/main" id="{6F470ADE-D457-6D2E-49E4-EF37B41CC6C5}"/>
+              </a:ext>
+            </a:extLst>
+          </p:cNvPr>
+          <p:cNvSpPr txBox="1"/>
+          <p:nvPr/>
+        </p:nvSpPr>
+        <p:spPr>
+          <a:xfrm>
+            <a:off x="7044150" y="940554"/>
+            <a:ext cx="687753" cy="230832"/>
+          </a:xfrm>
+          <a:prstGeom prst="rect">
+            <a:avLst/>
+          </a:prstGeom>
+          <a:noFill/>
+        </p:spPr>
+        <p:txBody>
+          <a:bodyPr wrap="square" rtlCol="0">
+            <a:spAutoFit/>
+          </a:bodyPr>
+          <a:lstStyle/>
+          <a:p>
+            <a:pPr algn="ctr"/>
+            <a:r>
+              <a:rPr lang="en-US" sz="900" dirty="0"/>
+              <a:t>tutors</a:t>
+            </a:r>
+          </a:p>
+        </p:txBody>
+      </p:sp>
+      <p:sp>
+        <p:nvSpPr>
+          <p:cNvPr id="169" name="TextBox 167">
+            <a:extLst>
+              <a:ext uri="{FF2B5EF4-FFF2-40B4-BE49-F238E27FC236}">
+                <a16:creationId xmlns:a16="http://schemas.microsoft.com/office/drawing/2014/main" id="{0655FEC7-6455-85B5-882A-BFEFA75E292E}"/>
+              </a:ext>
+            </a:extLst>
+          </p:cNvPr>
+          <p:cNvSpPr txBox="1"/>
+          <p:nvPr/>
+        </p:nvSpPr>
+        <p:spPr>
+          <a:xfrm>
+            <a:off x="89205" y="61969"/>
+            <a:ext cx="1380230" cy="369332"/>
+          </a:xfrm>
+          <a:prstGeom prst="rect">
+            <a:avLst/>
+          </a:prstGeom>
+          <a:noFill/>
+        </p:spPr>
+        <p:txBody>
+          <a:bodyPr wrap="square" rtlCol="0">
+            <a:spAutoFit/>
+          </a:bodyPr>
+          <a:lstStyle/>
+          <a:p>
+            <a:r>
+              <a:rPr lang="en-US" dirty="0"/>
+              <a:t>Version 4</a:t>
+            </a:r>
+          </a:p>
+        </p:txBody>
+      </p:sp>
+      <p:sp>
+        <p:nvSpPr>
+          <p:cNvPr id="170" name="Rounded Rectangle 168">
+            <a:extLst>
+              <a:ext uri="{FF2B5EF4-FFF2-40B4-BE49-F238E27FC236}">
+                <a16:creationId xmlns:a16="http://schemas.microsoft.com/office/drawing/2014/main" id="{FB84DA2B-ECFF-D306-30E4-891E9EBBD78C}"/>
+              </a:ext>
+            </a:extLst>
+          </p:cNvPr>
+          <p:cNvSpPr/>
+          <p:nvPr/>
+        </p:nvSpPr>
+        <p:spPr>
+          <a:xfrm>
+            <a:off x="5314957" y="2292575"/>
+            <a:ext cx="798034" cy="343877"/>
+          </a:xfrm>
+          <a:prstGeom prst="roundRect">
+            <a:avLst>
+              <a:gd name="adj" fmla="val 50000"/>
+            </a:avLst>
+          </a:prstGeom>
+          <a:solidFill>
+            <a:schemeClr val="bg1">
+              <a:lumMod val="85000"/>
+            </a:schemeClr>
+          </a:solidFill>
+        </p:spPr>
+        <p:style>
+          <a:lnRef idx="2">
+            <a:schemeClr val="accent1">
+              <a:shade val="50000"/>
+            </a:schemeClr>
+          </a:lnRef>
+          <a:fillRef idx="1">
+            <a:schemeClr val="accent1"/>
+          </a:fillRef>
+          <a:effectRef idx="0">
+            <a:schemeClr val="accent1"/>
+          </a:effectRef>
+          <a:fontRef idx="minor">
+            <a:schemeClr val="lt1"/>
+          </a:fontRef>
+        </p:style>
+        <p:txBody>
+          <a:bodyPr rtlCol="0" anchor="ctr"/>
+          <a:lstStyle/>
+          <a:p>
+            <a:pPr algn="ctr"/>
+            <a:r>
+              <a:rPr lang="en-US" sz="900" dirty="0">
+                <a:solidFill>
+                  <a:srgbClr val="FF0000"/>
+                </a:solidFill>
+              </a:rPr>
+              <a:t>tester</a:t>
+            </a:r>
+            <a:r>
+              <a:rPr lang="en-US" sz="900" dirty="0">
+                <a:solidFill>
+                  <a:schemeClr val="tx1"/>
+                </a:solidFill>
+              </a:rPr>
+              <a:t>/pe</a:t>
+            </a:r>
+          </a:p>
+        </p:txBody>
+      </p:sp>
+      <p:sp>
+        <p:nvSpPr>
+          <p:cNvPr id="171" name="TextBox 169">
+            <a:extLst>
+              <a:ext uri="{FF2B5EF4-FFF2-40B4-BE49-F238E27FC236}">
+                <a16:creationId xmlns:a16="http://schemas.microsoft.com/office/drawing/2014/main" id="{AC332780-140A-D401-D50E-70B31C595D01}"/>
+              </a:ext>
+            </a:extLst>
+          </p:cNvPr>
+          <p:cNvSpPr txBox="1"/>
+          <p:nvPr/>
+        </p:nvSpPr>
+        <p:spPr>
+          <a:xfrm>
+            <a:off x="6142770" y="2582053"/>
+            <a:ext cx="515815" cy="230832"/>
+          </a:xfrm>
+          <a:prstGeom prst="rect">
+            <a:avLst/>
+          </a:prstGeom>
+          <a:noFill/>
+        </p:spPr>
+        <p:txBody>
+          <a:bodyPr wrap="square" rtlCol="0">
+            <a:spAutoFit/>
+          </a:bodyPr>
+          <a:lstStyle/>
+          <a:p>
+            <a:r>
+              <a:rPr lang="en-US" sz="900" dirty="0"/>
+              <a:t>script</a:t>
+            </a:r>
+          </a:p>
+        </p:txBody>
+      </p:sp>
+      <p:sp>
+        <p:nvSpPr>
+          <p:cNvPr id="175" name="Smiley Face 173">
+            <a:extLst>
+              <a:ext uri="{FF2B5EF4-FFF2-40B4-BE49-F238E27FC236}">
+                <a16:creationId xmlns:a16="http://schemas.microsoft.com/office/drawing/2014/main" id="{EE76B243-9A95-9A64-D2D9-169C9464F992}"/>
+              </a:ext>
+            </a:extLst>
+          </p:cNvPr>
+          <p:cNvSpPr/>
+          <p:nvPr/>
+        </p:nvSpPr>
+        <p:spPr>
+          <a:xfrm>
+            <a:off x="5547896" y="1179583"/>
+            <a:ext cx="289166" cy="289166"/>
+          </a:xfrm>
+          <a:prstGeom prst="smileyFace">
+            <a:avLst/>
+          </a:prstGeom>
+          <a:noFill/>
+          <a:ln>
+            <a:solidFill>
+              <a:srgbClr val="0070C0"/>
+            </a:solidFill>
+          </a:ln>
+        </p:spPr>
+        <p:style>
+          <a:lnRef idx="2">
+            <a:schemeClr val="accent1">
+              <a:shade val="50000"/>
+            </a:schemeClr>
+          </a:lnRef>
+          <a:fillRef idx="1">
+            <a:schemeClr val="accent1"/>
+          </a:fillRef>
+          <a:effectRef idx="0">
+            <a:schemeClr val="accent1"/>
+          </a:effectRef>
+          <a:fontRef idx="minor">
+            <a:schemeClr val="lt1"/>
+          </a:fontRef>
+        </p:style>
+        <p:txBody>
+          <a:bodyPr rtlCol="0" anchor="ctr"/>
+          <a:lstStyle/>
+          <a:p>
+            <a:pPr algn="ctr"/>
+            <a:endParaRPr lang="en-US" sz="900">
+              <a:solidFill>
+                <a:schemeClr val="tx1"/>
+              </a:solidFill>
+            </a:endParaRPr>
+          </a:p>
+        </p:txBody>
+      </p:sp>
+      <p:sp>
+        <p:nvSpPr>
+          <p:cNvPr id="176" name="Rectangle 174">
+            <a:extLst>
+              <a:ext uri="{FF2B5EF4-FFF2-40B4-BE49-F238E27FC236}">
+                <a16:creationId xmlns:a16="http://schemas.microsoft.com/office/drawing/2014/main" id="{96336FF2-60AD-6A68-F42C-EBF2A1DA5437}"/>
+              </a:ext>
+            </a:extLst>
+          </p:cNvPr>
+          <p:cNvSpPr/>
+          <p:nvPr/>
+        </p:nvSpPr>
+        <p:spPr>
+          <a:xfrm>
+            <a:off x="5394285" y="1755828"/>
+            <a:ext cx="629340" cy="257908"/>
+          </a:xfrm>
+          <a:prstGeom prst="rect">
+            <a:avLst/>
+          </a:prstGeom>
+          <a:solidFill>
+            <a:schemeClr val="accent2">
+              <a:lumMod val="20000"/>
+              <a:lumOff val="80000"/>
+            </a:schemeClr>
+          </a:solidFill>
+          <a:ln>
+            <a:solidFill>
+              <a:schemeClr val="accent2"/>
+            </a:solidFill>
+          </a:ln>
+        </p:spPr>
+        <p:style>
+          <a:lnRef idx="2">
+            <a:schemeClr val="accent1">
+              <a:shade val="50000"/>
+            </a:schemeClr>
+          </a:lnRef>
+          <a:fillRef idx="1">
+            <a:schemeClr val="accent1"/>
+          </a:fillRef>
+          <a:effectRef idx="0">
+            <a:schemeClr val="accent1"/>
+          </a:effectRef>
+          <a:fontRef idx="minor">
+            <a:schemeClr val="lt1"/>
+          </a:fontRef>
+        </p:style>
+        <p:txBody>
+          <a:bodyPr rtlCol="0" anchor="ctr"/>
+          <a:lstStyle/>
+          <a:p>
+            <a:pPr algn="ctr"/>
+            <a:r>
+              <a:rPr lang="en-US" sz="900" dirty="0" err="1">
+                <a:solidFill>
+                  <a:schemeClr val="tx1"/>
+                </a:solidFill>
+              </a:rPr>
+              <a:t>CATcher</a:t>
+            </a:r>
+            <a:endParaRPr lang="en-US" sz="900" dirty="0">
+              <a:solidFill>
+                <a:schemeClr val="tx1"/>
+              </a:solidFill>
+            </a:endParaRPr>
+          </a:p>
+        </p:txBody>
+      </p:sp>
+      <p:cxnSp>
+        <p:nvCxnSpPr>
+          <p:cNvPr id="177" name="Straight Arrow Connector 175">
+            <a:extLst>
+              <a:ext uri="{FF2B5EF4-FFF2-40B4-BE49-F238E27FC236}">
+                <a16:creationId xmlns:a16="http://schemas.microsoft.com/office/drawing/2014/main" id="{8DADB2BE-327D-E6B1-A81C-F1EFA6C2C22D}"/>
+              </a:ext>
+            </a:extLst>
+          </p:cNvPr>
+          <p:cNvCxnSpPr/>
+          <p:nvPr/>
+        </p:nvCxnSpPr>
+        <p:spPr>
+          <a:xfrm>
+            <a:off x="5700717" y="1468749"/>
+            <a:ext cx="0" cy="287079"/>
+          </a:xfrm>
+          <a:prstGeom prst="straightConnector1">
+            <a:avLst/>
+          </a:prstGeom>
+          <a:ln w="12700">
+            <a:solidFill>
+              <a:schemeClr val="accent2"/>
+            </a:solidFill>
+            <a:prstDash val="sysDot"/>
+            <a:tailEnd type="triangle"/>
+          </a:ln>
+        </p:spPr>
+        <p:style>
+          <a:lnRef idx="1">
+            <a:schemeClr val="accent1"/>
+          </a:lnRef>
+          <a:fillRef idx="0">
+            <a:schemeClr val="accent1"/>
+          </a:fillRef>
+          <a:effectRef idx="0">
+            <a:schemeClr val="accent1"/>
+          </a:effectRef>
+          <a:fontRef idx="minor">
+            <a:schemeClr val="tx1"/>
+          </a:fontRef>
+        </p:style>
+      </p:cxnSp>
+      <p:cxnSp>
+        <p:nvCxnSpPr>
+          <p:cNvPr id="178" name="Straight Arrow Connector 176">
+            <a:extLst>
+              <a:ext uri="{FF2B5EF4-FFF2-40B4-BE49-F238E27FC236}">
+                <a16:creationId xmlns:a16="http://schemas.microsoft.com/office/drawing/2014/main" id="{A29545EA-3D20-2EC9-D536-75F32026C06A}"/>
+              </a:ext>
+            </a:extLst>
+          </p:cNvPr>
+          <p:cNvCxnSpPr/>
+          <p:nvPr/>
+        </p:nvCxnSpPr>
+        <p:spPr>
+          <a:xfrm>
+            <a:off x="5700717" y="2013736"/>
+            <a:ext cx="1" cy="287080"/>
+          </a:xfrm>
+          <a:prstGeom prst="straightConnector1">
+            <a:avLst/>
+          </a:prstGeom>
+          <a:ln w="12700">
+            <a:solidFill>
+              <a:schemeClr val="accent2"/>
+            </a:solidFill>
+            <a:prstDash val="sysDot"/>
+            <a:tailEnd type="triangle"/>
+          </a:ln>
+        </p:spPr>
+        <p:style>
+          <a:lnRef idx="1">
+            <a:schemeClr val="accent1"/>
+          </a:lnRef>
+          <a:fillRef idx="0">
+            <a:schemeClr val="accent1"/>
+          </a:fillRef>
+          <a:effectRef idx="0">
+            <a:schemeClr val="accent1"/>
+          </a:effectRef>
+          <a:fontRef idx="minor">
+            <a:schemeClr val="tx1"/>
+          </a:fontRef>
+        </p:style>
+      </p:cxnSp>
+      <p:sp>
+        <p:nvSpPr>
+          <p:cNvPr id="179" name="TextBox 177">
+            <a:extLst>
+              <a:ext uri="{FF2B5EF4-FFF2-40B4-BE49-F238E27FC236}">
+                <a16:creationId xmlns:a16="http://schemas.microsoft.com/office/drawing/2014/main" id="{8433DC1E-EF09-8CD4-B063-6D63DA5E955F}"/>
+              </a:ext>
+            </a:extLst>
+          </p:cNvPr>
+          <p:cNvSpPr txBox="1"/>
+          <p:nvPr/>
+        </p:nvSpPr>
+        <p:spPr>
+          <a:xfrm>
+            <a:off x="5348603" y="948751"/>
+            <a:ext cx="687753" cy="230832"/>
+          </a:xfrm>
+          <a:prstGeom prst="rect">
+            <a:avLst/>
+          </a:prstGeom>
+          <a:noFill/>
+        </p:spPr>
+        <p:txBody>
+          <a:bodyPr wrap="square" rtlCol="0">
+            <a:spAutoFit/>
+          </a:bodyPr>
+          <a:lstStyle/>
+          <a:p>
+            <a:pPr algn="ctr"/>
+            <a:r>
+              <a:rPr lang="en-US" sz="900" dirty="0"/>
+              <a:t>testers</a:t>
+            </a:r>
+          </a:p>
+        </p:txBody>
+      </p:sp>
+      <p:sp>
+        <p:nvSpPr>
+          <p:cNvPr id="143" name="Rounded Rectangle 90">
+            <a:extLst>
+              <a:ext uri="{FF2B5EF4-FFF2-40B4-BE49-F238E27FC236}">
+                <a16:creationId xmlns:a16="http://schemas.microsoft.com/office/drawing/2014/main" id="{A11E5419-2580-2D9C-4074-921CB566ED65}"/>
+              </a:ext>
+            </a:extLst>
+          </p:cNvPr>
+          <p:cNvSpPr/>
+          <p:nvPr/>
+        </p:nvSpPr>
+        <p:spPr>
+          <a:xfrm>
+            <a:off x="2700875" y="3006223"/>
+            <a:ext cx="965620" cy="343877"/>
+          </a:xfrm>
+          <a:prstGeom prst="roundRect">
+            <a:avLst>
+              <a:gd name="adj" fmla="val 50000"/>
+            </a:avLst>
+          </a:prstGeom>
+          <a:solidFill>
+            <a:schemeClr val="bg1">
+              <a:lumMod val="85000"/>
+            </a:schemeClr>
+          </a:solidFill>
+        </p:spPr>
+        <p:style>
+          <a:lnRef idx="2">
+            <a:schemeClr val="accent1">
+              <a:shade val="50000"/>
+            </a:schemeClr>
+          </a:lnRef>
+          <a:fillRef idx="1">
+            <a:schemeClr val="accent1"/>
+          </a:fillRef>
+          <a:effectRef idx="0">
+            <a:schemeClr val="accent1"/>
+          </a:effectRef>
+          <a:fontRef idx="minor">
+            <a:schemeClr val="lt1"/>
+          </a:fontRef>
+        </p:style>
+        <p:txBody>
+          <a:bodyPr rtlCol="0" anchor="ctr"/>
+          <a:lstStyle/>
+          <a:p>
+            <a:pPr algn="ctr"/>
+            <a:r>
+              <a:rPr lang="en-US" sz="900" dirty="0">
+                <a:solidFill>
+                  <a:schemeClr val="tx1"/>
+                </a:solidFill>
+              </a:rPr>
+              <a:t>module-org/</a:t>
+            </a:r>
+            <a:br>
+              <a:rPr lang="en-US" sz="900" dirty="0">
+                <a:solidFill>
+                  <a:schemeClr val="tx1"/>
+                </a:solidFill>
+              </a:rPr>
+            </a:br>
+            <a:r>
+              <a:rPr lang="en-US" sz="900" dirty="0">
+                <a:solidFill>
+                  <a:schemeClr val="tx1"/>
+                </a:solidFill>
+              </a:rPr>
+              <a:t>pe-interim</a:t>
+            </a:r>
+          </a:p>
+        </p:txBody>
+      </p:sp>
+      <p:cxnSp>
+        <p:nvCxnSpPr>
+          <p:cNvPr id="3" name="Elbow Connector 2">
+            <a:extLst>
+              <a:ext uri="{FF2B5EF4-FFF2-40B4-BE49-F238E27FC236}">
+                <a16:creationId xmlns:a16="http://schemas.microsoft.com/office/drawing/2014/main" id="{08644BA8-4389-5F89-7824-C4F66AED5FEB}"/>
+              </a:ext>
+            </a:extLst>
+          </p:cNvPr>
+          <p:cNvCxnSpPr>
+            <a:stCxn id="91" idx="2"/>
+            <a:endCxn id="143" idx="1"/>
+          </p:cNvCxnSpPr>
+          <p:nvPr/>
+        </p:nvCxnSpPr>
+        <p:spPr>
+          <a:xfrm rot="16200000" flipH="1">
+            <a:off x="2228443" y="2705730"/>
+            <a:ext cx="541666" cy="403198"/>
+          </a:xfrm>
+          <a:prstGeom prst="bentConnector2">
+            <a:avLst/>
+          </a:prstGeom>
+          <a:ln w="12700">
+            <a:solidFill>
+              <a:srgbClr val="FF0000"/>
+            </a:solidFill>
+            <a:tailEnd type="triangle"/>
+          </a:ln>
+        </p:spPr>
+        <p:style>
+          <a:lnRef idx="1">
+            <a:schemeClr val="accent1"/>
+          </a:lnRef>
+          <a:fillRef idx="0">
+            <a:schemeClr val="accent1"/>
+          </a:fillRef>
+          <a:effectRef idx="0">
+            <a:schemeClr val="accent1"/>
+          </a:effectRef>
+          <a:fontRef idx="minor">
+            <a:schemeClr val="tx1"/>
+          </a:fontRef>
+        </p:style>
+      </p:cxnSp>
+      <p:cxnSp>
+        <p:nvCxnSpPr>
+          <p:cNvPr id="180" name="Elbow Connector 179">
+            <a:extLst>
+              <a:ext uri="{FF2B5EF4-FFF2-40B4-BE49-F238E27FC236}">
+                <a16:creationId xmlns:a16="http://schemas.microsoft.com/office/drawing/2014/main" id="{733F6A7B-3FE4-CF3C-B208-B2D6704B2867}"/>
+              </a:ext>
+            </a:extLst>
+          </p:cNvPr>
+          <p:cNvCxnSpPr>
+            <a:stCxn id="143" idx="3"/>
+            <a:endCxn id="92" idx="2"/>
+          </p:cNvCxnSpPr>
+          <p:nvPr/>
+        </p:nvCxnSpPr>
+        <p:spPr>
+          <a:xfrm flipV="1">
+            <a:off x="3666495" y="2636493"/>
+            <a:ext cx="321675" cy="541669"/>
+          </a:xfrm>
+          <a:prstGeom prst="bentConnector2">
+            <a:avLst/>
+          </a:prstGeom>
+          <a:ln w="12700">
+            <a:solidFill>
+              <a:srgbClr val="FF0000"/>
+            </a:solidFill>
+            <a:tailEnd type="triangle"/>
+          </a:ln>
+        </p:spPr>
+        <p:style>
+          <a:lnRef idx="1">
+            <a:schemeClr val="accent1"/>
+          </a:lnRef>
+          <a:fillRef idx="0">
+            <a:schemeClr val="accent1"/>
+          </a:fillRef>
+          <a:effectRef idx="0">
+            <a:schemeClr val="accent1"/>
+          </a:effectRef>
+          <a:fontRef idx="minor">
+            <a:schemeClr val="tx1"/>
+          </a:fontRef>
+        </p:style>
+      </p:cxnSp>
+      <p:sp>
+        <p:nvSpPr>
+          <p:cNvPr id="181" name="TextBox 114">
+            <a:extLst>
+              <a:ext uri="{FF2B5EF4-FFF2-40B4-BE49-F238E27FC236}">
+                <a16:creationId xmlns:a16="http://schemas.microsoft.com/office/drawing/2014/main" id="{5434E282-F038-8833-D38E-BC88C35F329C}"/>
+              </a:ext>
+            </a:extLst>
+          </p:cNvPr>
+          <p:cNvSpPr txBox="1"/>
+          <p:nvPr/>
+        </p:nvSpPr>
+        <p:spPr>
+          <a:xfrm>
+            <a:off x="4026126" y="3015573"/>
+            <a:ext cx="515815" cy="230832"/>
+          </a:xfrm>
+          <a:prstGeom prst="rect">
+            <a:avLst/>
+          </a:prstGeom>
+          <a:noFill/>
+        </p:spPr>
+        <p:txBody>
+          <a:bodyPr wrap="square" rtlCol="0">
+            <a:spAutoFit/>
+          </a:bodyPr>
+          <a:lstStyle/>
+          <a:p>
+            <a:r>
+              <a:rPr lang="en-US" sz="900" dirty="0"/>
+              <a:t>script</a:t>
+            </a:r>
+          </a:p>
+        </p:txBody>
+      </p:sp>
+      <p:cxnSp>
+        <p:nvCxnSpPr>
+          <p:cNvPr id="183" name="Straight Arrow Connector 135">
+            <a:extLst>
+              <a:ext uri="{FF2B5EF4-FFF2-40B4-BE49-F238E27FC236}">
+                <a16:creationId xmlns:a16="http://schemas.microsoft.com/office/drawing/2014/main" id="{A8A563C4-86CE-641F-608C-E72F54A566C8}"/>
+              </a:ext>
+            </a:extLst>
+          </p:cNvPr>
+          <p:cNvCxnSpPr>
+            <a:cxnSpLocks/>
+            <a:stCxn id="170" idx="3"/>
+            <a:endCxn id="113" idx="1"/>
+          </p:cNvCxnSpPr>
+          <p:nvPr/>
+        </p:nvCxnSpPr>
+        <p:spPr>
+          <a:xfrm>
+            <a:off x="6112991" y="2464514"/>
+            <a:ext cx="844245" cy="42"/>
+          </a:xfrm>
+          <a:prstGeom prst="straightConnector1">
+            <a:avLst/>
+          </a:prstGeom>
+          <a:ln w="12700">
+            <a:solidFill>
+              <a:srgbClr val="FF0000"/>
+            </a:solidFill>
+            <a:tailEnd type="triangle"/>
+          </a:ln>
+        </p:spPr>
+        <p:style>
+          <a:lnRef idx="1">
+            <a:schemeClr val="accent1"/>
+          </a:lnRef>
+          <a:fillRef idx="0">
+            <a:schemeClr val="accent1"/>
+          </a:fillRef>
+          <a:effectRef idx="0">
+            <a:schemeClr val="accent1"/>
+          </a:effectRef>
+          <a:fontRef idx="minor">
+            <a:schemeClr val="tx1"/>
+          </a:fontRef>
+        </p:style>
+      </p:cxnSp>
+      <p:sp>
+        <p:nvSpPr>
+          <p:cNvPr id="115" name="Rounded Rectangle 90">
+            <a:extLst>
+              <a:ext uri="{FF2B5EF4-FFF2-40B4-BE49-F238E27FC236}">
+                <a16:creationId xmlns:a16="http://schemas.microsoft.com/office/drawing/2014/main" id="{0FAC3FBE-CB00-6118-FE97-9098098BFBF6}"/>
+              </a:ext>
+            </a:extLst>
+          </p:cNvPr>
+          <p:cNvSpPr/>
+          <p:nvPr/>
+        </p:nvSpPr>
+        <p:spPr>
+          <a:xfrm>
+            <a:off x="5314957" y="3641715"/>
+            <a:ext cx="1289696" cy="343877"/>
+          </a:xfrm>
+          <a:prstGeom prst="roundRect">
+            <a:avLst>
+              <a:gd name="adj" fmla="val 50000"/>
+            </a:avLst>
+          </a:prstGeom>
+          <a:solidFill>
+            <a:schemeClr val="bg1">
+              <a:lumMod val="85000"/>
+            </a:schemeClr>
+          </a:solidFill>
+        </p:spPr>
+        <p:style>
+          <a:lnRef idx="2">
+            <a:schemeClr val="accent1">
+              <a:shade val="50000"/>
+            </a:schemeClr>
+          </a:lnRef>
+          <a:fillRef idx="1">
+            <a:schemeClr val="accent1"/>
+          </a:fillRef>
+          <a:effectRef idx="0">
+            <a:schemeClr val="accent1"/>
+          </a:effectRef>
+          <a:fontRef idx="minor">
+            <a:schemeClr val="lt1"/>
+          </a:fontRef>
+        </p:style>
+        <p:txBody>
+          <a:bodyPr rtlCol="0" anchor="ctr"/>
+          <a:lstStyle/>
+          <a:p>
+            <a:pPr algn="ctr"/>
+            <a:r>
+              <a:rPr lang="en-US" sz="900" dirty="0">
+                <a:solidFill>
+                  <a:schemeClr val="tx1"/>
+                </a:solidFill>
+              </a:rPr>
+              <a:t>team-org/main-repo</a:t>
+            </a:r>
+          </a:p>
+        </p:txBody>
+      </p:sp>
+      <p:cxnSp>
+        <p:nvCxnSpPr>
+          <p:cNvPr id="6" name="Straight Arrow Connector 5">
+            <a:extLst>
+              <a:ext uri="{FF2B5EF4-FFF2-40B4-BE49-F238E27FC236}">
+                <a16:creationId xmlns:a16="http://schemas.microsoft.com/office/drawing/2014/main" id="{4A67E6AD-8F09-1235-4285-3A07EAC936E4}"/>
+              </a:ext>
+            </a:extLst>
+          </p:cNvPr>
+          <p:cNvCxnSpPr/>
+          <p:nvPr/>
+        </p:nvCxnSpPr>
+        <p:spPr>
+          <a:xfrm>
+            <a:off x="7184788" y="3621098"/>
+            <a:ext cx="441904" cy="0"/>
+          </a:xfrm>
+          <a:prstGeom prst="straightConnector1">
+            <a:avLst/>
+          </a:prstGeom>
+          <a:ln w="12700">
+            <a:solidFill>
+              <a:srgbClr val="00B050"/>
+            </a:solidFill>
+            <a:prstDash val="dash"/>
+            <a:tailEnd type="triangle"/>
+          </a:ln>
+        </p:spPr>
+        <p:style>
+          <a:lnRef idx="1">
+            <a:schemeClr val="accent1"/>
+          </a:lnRef>
+          <a:fillRef idx="0">
+            <a:schemeClr val="accent1"/>
+          </a:fillRef>
+          <a:effectRef idx="0">
+            <a:schemeClr val="accent1"/>
+          </a:effectRef>
+          <a:fontRef idx="minor">
+            <a:schemeClr val="tx1"/>
+          </a:fontRef>
+        </p:style>
+      </p:cxnSp>
+      <p:sp>
+        <p:nvSpPr>
+          <p:cNvPr id="185" name="TextBox 127">
+            <a:extLst>
+              <a:ext uri="{FF2B5EF4-FFF2-40B4-BE49-F238E27FC236}">
+                <a16:creationId xmlns:a16="http://schemas.microsoft.com/office/drawing/2014/main" id="{967BF62F-67CE-15DC-EC05-94BFA7A8C001}"/>
+              </a:ext>
+            </a:extLst>
+          </p:cNvPr>
+          <p:cNvSpPr txBox="1"/>
+          <p:nvPr/>
+        </p:nvSpPr>
+        <p:spPr>
+          <a:xfrm>
+            <a:off x="7621809" y="3502030"/>
+            <a:ext cx="731328" cy="230832"/>
+          </a:xfrm>
+          <a:prstGeom prst="rect">
+            <a:avLst/>
+          </a:prstGeom>
+          <a:noFill/>
+          <a:ln>
+            <a:noFill/>
+          </a:ln>
+        </p:spPr>
+        <p:txBody>
+          <a:bodyPr wrap="square" rtlCol="0">
+            <a:spAutoFit/>
+          </a:bodyPr>
+          <a:lstStyle/>
+          <a:p>
+            <a:pPr algn="ctr"/>
+            <a:r>
+              <a:rPr lang="en-US" sz="900" dirty="0">
+                <a:solidFill>
+                  <a:srgbClr val="00B050"/>
+                </a:solidFill>
+              </a:rPr>
+              <a:t>Dry run</a:t>
+            </a:r>
+          </a:p>
+        </p:txBody>
+      </p:sp>
+      <p:cxnSp>
+        <p:nvCxnSpPr>
+          <p:cNvPr id="186" name="Straight Arrow Connector 185">
+            <a:extLst>
+              <a:ext uri="{FF2B5EF4-FFF2-40B4-BE49-F238E27FC236}">
+                <a16:creationId xmlns:a16="http://schemas.microsoft.com/office/drawing/2014/main" id="{F4C78C39-09BD-7804-F7A2-DEFD378BB70E}"/>
+              </a:ext>
+            </a:extLst>
+          </p:cNvPr>
+          <p:cNvCxnSpPr/>
+          <p:nvPr/>
+        </p:nvCxnSpPr>
+        <p:spPr>
+          <a:xfrm>
+            <a:off x="7167883" y="3351981"/>
+            <a:ext cx="441904" cy="0"/>
+          </a:xfrm>
+          <a:prstGeom prst="straightConnector1">
+            <a:avLst/>
+          </a:prstGeom>
+          <a:ln w="12700">
+            <a:solidFill>
+              <a:srgbClr val="FF0000"/>
+            </a:solidFill>
+            <a:tailEnd type="triangle"/>
+          </a:ln>
+        </p:spPr>
+        <p:style>
+          <a:lnRef idx="1">
+            <a:schemeClr val="accent1"/>
+          </a:lnRef>
+          <a:fillRef idx="0">
+            <a:schemeClr val="accent1"/>
+          </a:fillRef>
+          <a:effectRef idx="0">
+            <a:schemeClr val="accent1"/>
+          </a:effectRef>
+          <a:fontRef idx="minor">
+            <a:schemeClr val="tx1"/>
+          </a:fontRef>
+        </p:style>
+      </p:cxnSp>
+      <p:sp>
+        <p:nvSpPr>
+          <p:cNvPr id="187" name="TextBox 127">
+            <a:extLst>
+              <a:ext uri="{FF2B5EF4-FFF2-40B4-BE49-F238E27FC236}">
+                <a16:creationId xmlns:a16="http://schemas.microsoft.com/office/drawing/2014/main" id="{C1FD6B29-A6B1-B25D-ABF4-284F2ACA4D1C}"/>
+              </a:ext>
+            </a:extLst>
+          </p:cNvPr>
+          <p:cNvSpPr txBox="1"/>
+          <p:nvPr/>
+        </p:nvSpPr>
+        <p:spPr>
+          <a:xfrm>
+            <a:off x="7604904" y="3232913"/>
+            <a:ext cx="731328" cy="230832"/>
+          </a:xfrm>
+          <a:prstGeom prst="rect">
+            <a:avLst/>
+          </a:prstGeom>
+          <a:noFill/>
+          <a:ln>
+            <a:noFill/>
+          </a:ln>
+        </p:spPr>
+        <p:txBody>
+          <a:bodyPr wrap="square" rtlCol="0">
+            <a:spAutoFit/>
+          </a:bodyPr>
+          <a:lstStyle/>
+          <a:p>
+            <a:pPr algn="ctr"/>
+            <a:r>
+              <a:rPr lang="en-US" sz="900" dirty="0">
+                <a:solidFill>
+                  <a:srgbClr val="FF0000"/>
+                </a:solidFill>
+              </a:rPr>
+              <a:t>Actual PE</a:t>
+            </a:r>
+          </a:p>
+        </p:txBody>
+      </p:sp>
+      <p:sp>
+        <p:nvSpPr>
+          <p:cNvPr id="188" name="TextBox 114">
+            <a:extLst>
+              <a:ext uri="{FF2B5EF4-FFF2-40B4-BE49-F238E27FC236}">
+                <a16:creationId xmlns:a16="http://schemas.microsoft.com/office/drawing/2014/main" id="{3AF2BDC6-E443-46DC-2182-47A7D66C8386}"/>
+              </a:ext>
+            </a:extLst>
+          </p:cNvPr>
+          <p:cNvSpPr txBox="1"/>
+          <p:nvPr/>
+        </p:nvSpPr>
+        <p:spPr>
+          <a:xfrm>
+            <a:off x="2137639" y="3805784"/>
+            <a:ext cx="515815" cy="230832"/>
+          </a:xfrm>
+          <a:prstGeom prst="rect">
+            <a:avLst/>
+          </a:prstGeom>
+          <a:noFill/>
+        </p:spPr>
+        <p:txBody>
+          <a:bodyPr wrap="square" rtlCol="0">
+            <a:spAutoFit/>
+          </a:bodyPr>
+          <a:lstStyle/>
+          <a:p>
+            <a:r>
+              <a:rPr lang="en-US" sz="900" dirty="0"/>
+              <a:t>script</a:t>
+            </a:r>
+          </a:p>
+        </p:txBody>
+      </p:sp>
+      <p:sp>
+        <p:nvSpPr>
+          <p:cNvPr id="189" name="Flowchart: Connector 188">
+            <a:extLst>
+              <a:ext uri="{FF2B5EF4-FFF2-40B4-BE49-F238E27FC236}">
+                <a16:creationId xmlns:a16="http://schemas.microsoft.com/office/drawing/2014/main" id="{58726892-FE52-5B36-107C-E2F4DACB9EC3}"/>
+              </a:ext>
+            </a:extLst>
+          </p:cNvPr>
+          <p:cNvSpPr/>
+          <p:nvPr/>
+        </p:nvSpPr>
+        <p:spPr>
+          <a:xfrm>
+            <a:off x="2105550" y="2802322"/>
+            <a:ext cx="382031" cy="263154"/>
+          </a:xfrm>
+          <a:prstGeom prst="flowChartConnector">
+            <a:avLst/>
+          </a:prstGeom>
+          <a:solidFill>
+            <a:schemeClr val="bg1"/>
+          </a:solidFill>
+          <a:ln>
+            <a:solidFill>
+              <a:srgbClr val="FF0000"/>
+            </a:solidFill>
+          </a:ln>
+        </p:spPr>
+        <p:style>
+          <a:lnRef idx="2">
+            <a:schemeClr val="accent1">
+              <a:shade val="50000"/>
+            </a:schemeClr>
+          </a:lnRef>
+          <a:fillRef idx="1">
+            <a:schemeClr val="accent1"/>
+          </a:fillRef>
+          <a:effectRef idx="0">
+            <a:schemeClr val="accent1"/>
+          </a:effectRef>
+          <a:fontRef idx="minor">
+            <a:schemeClr val="lt1"/>
+          </a:fontRef>
+        </p:style>
+        <p:txBody>
+          <a:bodyPr lIns="0" tIns="0" rIns="0" bIns="0" rtlCol="0" anchor="ctr"/>
+          <a:lstStyle/>
+          <a:p>
+            <a:pPr algn="ctr"/>
+            <a:r>
+              <a:rPr lang="en-US" sz="1000" dirty="0">
+                <a:solidFill>
+                  <a:srgbClr val="FF0000"/>
+                </a:solidFill>
+              </a:rPr>
+              <a:t>S1a</a:t>
+            </a:r>
+          </a:p>
+        </p:txBody>
+      </p:sp>
+      <p:sp>
+        <p:nvSpPr>
+          <p:cNvPr id="190" name="Flowchart: Connector 189">
+            <a:extLst>
+              <a:ext uri="{FF2B5EF4-FFF2-40B4-BE49-F238E27FC236}">
+                <a16:creationId xmlns:a16="http://schemas.microsoft.com/office/drawing/2014/main" id="{97856CA9-F37F-94FC-6D97-D53160BC8A1F}"/>
+              </a:ext>
+            </a:extLst>
+          </p:cNvPr>
+          <p:cNvSpPr/>
+          <p:nvPr/>
+        </p:nvSpPr>
+        <p:spPr>
+          <a:xfrm>
+            <a:off x="3797156" y="2781867"/>
+            <a:ext cx="382031" cy="263154"/>
+          </a:xfrm>
+          <a:prstGeom prst="flowChartConnector">
+            <a:avLst/>
+          </a:prstGeom>
+          <a:solidFill>
+            <a:schemeClr val="bg1"/>
+          </a:solidFill>
+          <a:ln>
+            <a:solidFill>
+              <a:srgbClr val="FF0000"/>
+            </a:solidFill>
+          </a:ln>
+        </p:spPr>
+        <p:style>
+          <a:lnRef idx="2">
+            <a:schemeClr val="accent1">
+              <a:shade val="50000"/>
+            </a:schemeClr>
+          </a:lnRef>
+          <a:fillRef idx="1">
+            <a:schemeClr val="accent1"/>
+          </a:fillRef>
+          <a:effectRef idx="0">
+            <a:schemeClr val="accent1"/>
+          </a:effectRef>
+          <a:fontRef idx="minor">
+            <a:schemeClr val="lt1"/>
+          </a:fontRef>
+        </p:style>
+        <p:txBody>
+          <a:bodyPr lIns="0" tIns="0" rIns="0" bIns="0" rtlCol="0" anchor="ctr"/>
+          <a:lstStyle/>
+          <a:p>
+            <a:pPr algn="ctr"/>
+            <a:r>
+              <a:rPr lang="en-US" sz="1000" dirty="0">
+                <a:solidFill>
+                  <a:srgbClr val="FF0000"/>
+                </a:solidFill>
+              </a:rPr>
+              <a:t>S1b</a:t>
+            </a:r>
+          </a:p>
+        </p:txBody>
+      </p:sp>
+      <p:sp>
+        <p:nvSpPr>
+          <p:cNvPr id="191" name="Flowchart: Connector 190">
+            <a:extLst>
+              <a:ext uri="{FF2B5EF4-FFF2-40B4-BE49-F238E27FC236}">
+                <a16:creationId xmlns:a16="http://schemas.microsoft.com/office/drawing/2014/main" id="{AF46CB45-70A8-D949-73AE-F665FF7255DA}"/>
+              </a:ext>
+            </a:extLst>
+          </p:cNvPr>
+          <p:cNvSpPr/>
+          <p:nvPr/>
+        </p:nvSpPr>
+        <p:spPr>
+          <a:xfrm>
+            <a:off x="4775696" y="2326138"/>
+            <a:ext cx="260932" cy="263154"/>
+          </a:xfrm>
+          <a:prstGeom prst="flowChartConnector">
+            <a:avLst/>
+          </a:prstGeom>
+          <a:solidFill>
+            <a:schemeClr val="bg1"/>
+          </a:solidFill>
+          <a:ln>
+            <a:solidFill>
+              <a:srgbClr val="FF0000"/>
+            </a:solidFill>
+          </a:ln>
+        </p:spPr>
+        <p:style>
+          <a:lnRef idx="2">
+            <a:schemeClr val="accent1">
+              <a:shade val="50000"/>
+            </a:schemeClr>
+          </a:lnRef>
+          <a:fillRef idx="1">
+            <a:schemeClr val="accent1"/>
+          </a:fillRef>
+          <a:effectRef idx="0">
+            <a:schemeClr val="accent1"/>
+          </a:effectRef>
+          <a:fontRef idx="minor">
+            <a:schemeClr val="lt1"/>
+          </a:fontRef>
+        </p:style>
+        <p:txBody>
+          <a:bodyPr lIns="0" tIns="0" rIns="0" bIns="0" rtlCol="0" anchor="ctr"/>
+          <a:lstStyle/>
+          <a:p>
+            <a:pPr algn="ctr"/>
+            <a:r>
+              <a:rPr lang="en-US" sz="1000" dirty="0">
+                <a:solidFill>
+                  <a:srgbClr val="FF0000"/>
+                </a:solidFill>
+              </a:rPr>
+              <a:t>S2</a:t>
+            </a:r>
+          </a:p>
+        </p:txBody>
+      </p:sp>
+      <p:sp>
+        <p:nvSpPr>
+          <p:cNvPr id="192" name="Flowchart: Connector 191">
+            <a:extLst>
+              <a:ext uri="{FF2B5EF4-FFF2-40B4-BE49-F238E27FC236}">
+                <a16:creationId xmlns:a16="http://schemas.microsoft.com/office/drawing/2014/main" id="{458A25C3-FC02-B23B-470D-CB2F887B1BDB}"/>
+              </a:ext>
+            </a:extLst>
+          </p:cNvPr>
+          <p:cNvSpPr/>
+          <p:nvPr/>
+        </p:nvSpPr>
+        <p:spPr>
+          <a:xfrm>
+            <a:off x="6343721" y="2332936"/>
+            <a:ext cx="260932" cy="263154"/>
+          </a:xfrm>
+          <a:prstGeom prst="flowChartConnector">
+            <a:avLst/>
+          </a:prstGeom>
+          <a:solidFill>
+            <a:schemeClr val="bg1"/>
+          </a:solidFill>
+          <a:ln>
+            <a:solidFill>
+              <a:srgbClr val="FF0000"/>
+            </a:solidFill>
+          </a:ln>
+        </p:spPr>
+        <p:style>
+          <a:lnRef idx="2">
+            <a:schemeClr val="accent1">
+              <a:shade val="50000"/>
+            </a:schemeClr>
+          </a:lnRef>
+          <a:fillRef idx="1">
+            <a:schemeClr val="accent1"/>
+          </a:fillRef>
+          <a:effectRef idx="0">
+            <a:schemeClr val="accent1"/>
+          </a:effectRef>
+          <a:fontRef idx="minor">
+            <a:schemeClr val="lt1"/>
+          </a:fontRef>
+        </p:style>
+        <p:txBody>
+          <a:bodyPr lIns="0" tIns="0" rIns="0" bIns="0" rtlCol="0" anchor="ctr"/>
+          <a:lstStyle/>
+          <a:p>
+            <a:pPr algn="ctr"/>
+            <a:r>
+              <a:rPr lang="en-US" sz="1000" dirty="0">
+                <a:solidFill>
+                  <a:srgbClr val="FF0000"/>
+                </a:solidFill>
+              </a:rPr>
+              <a:t>S3</a:t>
+            </a:r>
+          </a:p>
+        </p:txBody>
+      </p:sp>
+      <p:sp>
+        <p:nvSpPr>
+          <p:cNvPr id="193" name="Flowchart: Connector 192">
+            <a:extLst>
+              <a:ext uri="{FF2B5EF4-FFF2-40B4-BE49-F238E27FC236}">
+                <a16:creationId xmlns:a16="http://schemas.microsoft.com/office/drawing/2014/main" id="{F3DA81DB-DF16-39FD-B533-D8D7DC022F6D}"/>
+              </a:ext>
+            </a:extLst>
+          </p:cNvPr>
+          <p:cNvSpPr/>
+          <p:nvPr/>
+        </p:nvSpPr>
+        <p:spPr>
+          <a:xfrm>
+            <a:off x="8103979" y="2318899"/>
+            <a:ext cx="260932" cy="263154"/>
+          </a:xfrm>
+          <a:prstGeom prst="flowChartConnector">
+            <a:avLst/>
+          </a:prstGeom>
+          <a:solidFill>
+            <a:schemeClr val="bg1"/>
+          </a:solidFill>
+          <a:ln>
+            <a:solidFill>
+              <a:srgbClr val="FF0000"/>
+            </a:solidFill>
+          </a:ln>
+        </p:spPr>
+        <p:style>
+          <a:lnRef idx="2">
+            <a:schemeClr val="accent1">
+              <a:shade val="50000"/>
+            </a:schemeClr>
+          </a:lnRef>
+          <a:fillRef idx="1">
+            <a:schemeClr val="accent1"/>
+          </a:fillRef>
+          <a:effectRef idx="0">
+            <a:schemeClr val="accent1"/>
+          </a:effectRef>
+          <a:fontRef idx="minor">
+            <a:schemeClr val="lt1"/>
+          </a:fontRef>
+        </p:style>
+        <p:txBody>
+          <a:bodyPr lIns="0" tIns="0" rIns="0" bIns="0" rtlCol="0" anchor="ctr"/>
+          <a:lstStyle/>
+          <a:p>
+            <a:pPr algn="ctr"/>
+            <a:r>
+              <a:rPr lang="en-US" sz="1000" dirty="0">
+                <a:solidFill>
+                  <a:srgbClr val="FF0000"/>
+                </a:solidFill>
+              </a:rPr>
+              <a:t>S4</a:t>
+            </a:r>
+          </a:p>
+        </p:txBody>
+      </p:sp>
+      <p:sp>
+        <p:nvSpPr>
+          <p:cNvPr id="2" name="Rectangle 1">
+            <a:extLst>
+              <a:ext uri="{FF2B5EF4-FFF2-40B4-BE49-F238E27FC236}">
+                <a16:creationId xmlns:a16="http://schemas.microsoft.com/office/drawing/2014/main" id="{511A7A8B-01E5-754C-7B58-FF189F2D7BB3}"/>
+              </a:ext>
+            </a:extLst>
+          </p:cNvPr>
+          <p:cNvSpPr/>
+          <p:nvPr/>
+        </p:nvSpPr>
+        <p:spPr>
+          <a:xfrm>
+            <a:off x="239623" y="670051"/>
+            <a:ext cx="1319170" cy="2156872"/>
+          </a:xfrm>
+          <a:prstGeom prst="rect">
+            <a:avLst/>
+          </a:prstGeom>
+          <a:solidFill>
+            <a:schemeClr val="accent1">
+              <a:lumMod val="20000"/>
+              <a:lumOff val="80000"/>
+            </a:schemeClr>
+          </a:solidFill>
+          <a:ln>
+            <a:noFill/>
+          </a:ln>
+        </p:spPr>
+        <p:style>
+          <a:lnRef idx="2">
+            <a:schemeClr val="accent1">
+              <a:shade val="50000"/>
+            </a:schemeClr>
+          </a:lnRef>
+          <a:fillRef idx="1">
+            <a:schemeClr val="accent1"/>
+          </a:fillRef>
+          <a:effectRef idx="0">
+            <a:schemeClr val="accent1"/>
+          </a:effectRef>
+          <a:fontRef idx="minor">
+            <a:schemeClr val="lt1"/>
+          </a:fontRef>
+        </p:style>
+        <p:txBody>
+          <a:bodyPr rtlCol="0" anchor="t"/>
+          <a:lstStyle/>
+          <a:p>
+            <a:pPr algn="ctr"/>
+            <a:r>
+              <a:rPr lang="en-SG" sz="1000" dirty="0">
+                <a:solidFill>
+                  <a:schemeClr val="accent1">
+                    <a:lumMod val="75000"/>
+                  </a:schemeClr>
+                </a:solidFill>
+              </a:rPr>
+              <a:t>Bug reporting phase</a:t>
+            </a:r>
+          </a:p>
+        </p:txBody>
+      </p:sp>
+      <p:sp>
+        <p:nvSpPr>
+          <p:cNvPr id="5" name="TextBox 156">
+            <a:extLst>
+              <a:ext uri="{FF2B5EF4-FFF2-40B4-BE49-F238E27FC236}">
+                <a16:creationId xmlns:a16="http://schemas.microsoft.com/office/drawing/2014/main" id="{0A141964-3CEA-CEAE-61E4-752613F85499}"/>
+              </a:ext>
+            </a:extLst>
+          </p:cNvPr>
+          <p:cNvSpPr txBox="1"/>
+          <p:nvPr/>
+        </p:nvSpPr>
+        <p:spPr>
+          <a:xfrm>
+            <a:off x="435336" y="938108"/>
+            <a:ext cx="687753" cy="230832"/>
+          </a:xfrm>
+          <a:prstGeom prst="rect">
+            <a:avLst/>
+          </a:prstGeom>
+          <a:noFill/>
+        </p:spPr>
+        <p:txBody>
+          <a:bodyPr wrap="square" rtlCol="0">
+            <a:spAutoFit/>
+          </a:bodyPr>
+          <a:lstStyle/>
+          <a:p>
+            <a:pPr algn="ctr"/>
+            <a:r>
+              <a:rPr lang="en-US" sz="900" dirty="0"/>
+              <a:t>testers</a:t>
+            </a:r>
+          </a:p>
+        </p:txBody>
+      </p:sp>
+      <p:sp>
+        <p:nvSpPr>
+          <p:cNvPr id="11" name="Smiley Face 152">
+            <a:extLst>
+              <a:ext uri="{FF2B5EF4-FFF2-40B4-BE49-F238E27FC236}">
+                <a16:creationId xmlns:a16="http://schemas.microsoft.com/office/drawing/2014/main" id="{266F0882-C370-29D4-9978-2522FFA31760}"/>
+              </a:ext>
+            </a:extLst>
+          </p:cNvPr>
+          <p:cNvSpPr/>
+          <p:nvPr/>
+        </p:nvSpPr>
+        <p:spPr>
+          <a:xfrm>
+            <a:off x="653958" y="1168940"/>
+            <a:ext cx="289166" cy="289166"/>
+          </a:xfrm>
+          <a:prstGeom prst="smileyFace">
+            <a:avLst/>
+          </a:prstGeom>
+          <a:noFill/>
+          <a:ln>
+            <a:solidFill>
+              <a:srgbClr val="0070C0"/>
+            </a:solidFill>
+          </a:ln>
+        </p:spPr>
+        <p:style>
+          <a:lnRef idx="2">
+            <a:schemeClr val="accent1">
+              <a:shade val="50000"/>
+            </a:schemeClr>
+          </a:lnRef>
+          <a:fillRef idx="1">
+            <a:schemeClr val="accent1"/>
+          </a:fillRef>
+          <a:effectRef idx="0">
+            <a:schemeClr val="accent1"/>
+          </a:effectRef>
+          <a:fontRef idx="minor">
+            <a:schemeClr val="lt1"/>
+          </a:fontRef>
+        </p:style>
+        <p:txBody>
+          <a:bodyPr rtlCol="0" anchor="ctr"/>
+          <a:lstStyle/>
+          <a:p>
+            <a:pPr algn="ctr"/>
+            <a:endParaRPr lang="en-US" sz="900">
+              <a:solidFill>
+                <a:schemeClr val="tx1"/>
+              </a:solidFill>
+            </a:endParaRPr>
+          </a:p>
+        </p:txBody>
+      </p:sp>
+      <p:cxnSp>
+        <p:nvCxnSpPr>
+          <p:cNvPr id="12" name="Straight Arrow Connector 154">
+            <a:extLst>
+              <a:ext uri="{FF2B5EF4-FFF2-40B4-BE49-F238E27FC236}">
+                <a16:creationId xmlns:a16="http://schemas.microsoft.com/office/drawing/2014/main" id="{5C780608-0FD8-262E-14CC-0B9F9F9F339F}"/>
+              </a:ext>
+            </a:extLst>
+          </p:cNvPr>
+          <p:cNvCxnSpPr>
+            <a:stCxn id="11" idx="4"/>
+          </p:cNvCxnSpPr>
+          <p:nvPr/>
+        </p:nvCxnSpPr>
+        <p:spPr>
+          <a:xfrm>
+            <a:off x="798541" y="1458106"/>
+            <a:ext cx="0" cy="287079"/>
+          </a:xfrm>
+          <a:prstGeom prst="straightConnector1">
+            <a:avLst/>
+          </a:prstGeom>
+          <a:ln w="12700">
+            <a:solidFill>
+              <a:schemeClr val="accent2"/>
+            </a:solidFill>
+            <a:prstDash val="sysDot"/>
+            <a:tailEnd type="triangle"/>
+          </a:ln>
+        </p:spPr>
+        <p:style>
+          <a:lnRef idx="1">
+            <a:schemeClr val="accent1"/>
+          </a:lnRef>
+          <a:fillRef idx="0">
+            <a:schemeClr val="accent1"/>
+          </a:fillRef>
+          <a:effectRef idx="0">
+            <a:schemeClr val="accent1"/>
+          </a:effectRef>
+          <a:fontRef idx="minor">
+            <a:schemeClr val="tx1"/>
+          </a:fontRef>
+        </p:style>
+      </p:cxnSp>
+      <p:cxnSp>
+        <p:nvCxnSpPr>
+          <p:cNvPr id="13" name="Straight Arrow Connector 155">
+            <a:extLst>
+              <a:ext uri="{FF2B5EF4-FFF2-40B4-BE49-F238E27FC236}">
+                <a16:creationId xmlns:a16="http://schemas.microsoft.com/office/drawing/2014/main" id="{EC672569-39D9-9D05-9D4F-E9EFD70020D0}"/>
+              </a:ext>
+            </a:extLst>
+          </p:cNvPr>
+          <p:cNvCxnSpPr/>
+          <p:nvPr/>
+        </p:nvCxnSpPr>
+        <p:spPr>
+          <a:xfrm>
+            <a:off x="798541" y="2003093"/>
+            <a:ext cx="1" cy="287080"/>
+          </a:xfrm>
+          <a:prstGeom prst="straightConnector1">
+            <a:avLst/>
+          </a:prstGeom>
+          <a:ln w="12700">
+            <a:solidFill>
+              <a:schemeClr val="accent2"/>
+            </a:solidFill>
+            <a:prstDash val="sysDot"/>
+            <a:tailEnd type="triangle"/>
+          </a:ln>
+        </p:spPr>
+        <p:style>
+          <a:lnRef idx="1">
+            <a:schemeClr val="accent1"/>
+          </a:lnRef>
+          <a:fillRef idx="0">
+            <a:schemeClr val="accent1"/>
+          </a:fillRef>
+          <a:effectRef idx="0">
+            <a:schemeClr val="accent1"/>
+          </a:effectRef>
+          <a:fontRef idx="minor">
+            <a:schemeClr val="tx1"/>
+          </a:fontRef>
+        </p:style>
+      </p:cxnSp>
+      <p:sp>
+        <p:nvSpPr>
+          <p:cNvPr id="15" name="Rectangle 153">
+            <a:extLst>
+              <a:ext uri="{FF2B5EF4-FFF2-40B4-BE49-F238E27FC236}">
+                <a16:creationId xmlns:a16="http://schemas.microsoft.com/office/drawing/2014/main" id="{33C52576-3C90-BB94-F4D8-4D0BA33F1375}"/>
+              </a:ext>
+            </a:extLst>
+          </p:cNvPr>
+          <p:cNvSpPr/>
+          <p:nvPr/>
+        </p:nvSpPr>
+        <p:spPr>
+          <a:xfrm>
+            <a:off x="482760" y="1744811"/>
+            <a:ext cx="629340" cy="257908"/>
+          </a:xfrm>
+          <a:prstGeom prst="rect">
+            <a:avLst/>
+          </a:prstGeom>
+          <a:solidFill>
+            <a:schemeClr val="accent2">
+              <a:lumMod val="20000"/>
+              <a:lumOff val="80000"/>
+            </a:schemeClr>
+          </a:solidFill>
+          <a:ln>
+            <a:solidFill>
+              <a:schemeClr val="accent2"/>
+            </a:solidFill>
+          </a:ln>
+        </p:spPr>
+        <p:style>
+          <a:lnRef idx="2">
+            <a:schemeClr val="accent1">
+              <a:shade val="50000"/>
+            </a:schemeClr>
+          </a:lnRef>
+          <a:fillRef idx="1">
+            <a:schemeClr val="accent1"/>
+          </a:fillRef>
+          <a:effectRef idx="0">
+            <a:schemeClr val="accent1"/>
+          </a:effectRef>
+          <a:fontRef idx="minor">
+            <a:schemeClr val="lt1"/>
+          </a:fontRef>
+        </p:style>
+        <p:txBody>
+          <a:bodyPr rtlCol="0" anchor="ctr"/>
+          <a:lstStyle/>
+          <a:p>
+            <a:pPr algn="ctr"/>
+            <a:r>
+              <a:rPr lang="en-US" sz="900" dirty="0" err="1">
+                <a:solidFill>
+                  <a:schemeClr val="tx1"/>
+                </a:solidFill>
+              </a:rPr>
+              <a:t>CATcher</a:t>
+            </a:r>
+            <a:endParaRPr lang="en-US" sz="900" dirty="0">
+              <a:solidFill>
+                <a:schemeClr val="tx1"/>
+              </a:solidFill>
+            </a:endParaRPr>
+          </a:p>
+        </p:txBody>
+      </p:sp>
+      <p:sp>
+        <p:nvSpPr>
+          <p:cNvPr id="16" name="Rounded Rectangle 87">
+            <a:extLst>
+              <a:ext uri="{FF2B5EF4-FFF2-40B4-BE49-F238E27FC236}">
+                <a16:creationId xmlns:a16="http://schemas.microsoft.com/office/drawing/2014/main" id="{0E9884E5-08E5-D69F-06AE-6AFC0C210C6A}"/>
+              </a:ext>
+            </a:extLst>
+          </p:cNvPr>
+          <p:cNvSpPr/>
+          <p:nvPr/>
+        </p:nvSpPr>
+        <p:spPr>
+          <a:xfrm>
+            <a:off x="418692" y="2300816"/>
+            <a:ext cx="828431" cy="343877"/>
+          </a:xfrm>
+          <a:prstGeom prst="roundRect">
+            <a:avLst>
+              <a:gd name="adj" fmla="val 50000"/>
+            </a:avLst>
+          </a:prstGeom>
+          <a:solidFill>
+            <a:schemeClr val="bg1">
+              <a:lumMod val="85000"/>
+            </a:schemeClr>
+          </a:solidFill>
+        </p:spPr>
+        <p:style>
+          <a:lnRef idx="2">
+            <a:schemeClr val="accent1">
+              <a:shade val="50000"/>
+            </a:schemeClr>
+          </a:lnRef>
+          <a:fillRef idx="1">
+            <a:schemeClr val="accent1"/>
+          </a:fillRef>
+          <a:effectRef idx="0">
+            <a:schemeClr val="accent1"/>
+          </a:effectRef>
+          <a:fontRef idx="minor">
+            <a:schemeClr val="lt1"/>
+          </a:fontRef>
+        </p:style>
+        <p:txBody>
+          <a:bodyPr rtlCol="0" anchor="ctr"/>
+          <a:lstStyle/>
+          <a:p>
+            <a:pPr algn="ctr"/>
+            <a:r>
+              <a:rPr lang="en-US" sz="900" dirty="0">
+                <a:solidFill>
+                  <a:srgbClr val="FF0000"/>
+                </a:solidFill>
+              </a:rPr>
+              <a:t>tester</a:t>
+            </a:r>
+            <a:r>
+              <a:rPr lang="en-US" sz="900" dirty="0">
+                <a:solidFill>
+                  <a:schemeClr val="tx1"/>
+                </a:solidFill>
+              </a:rPr>
+              <a:t>/pe</a:t>
+            </a:r>
+          </a:p>
+        </p:txBody>
+      </p:sp>
+      <p:cxnSp>
+        <p:nvCxnSpPr>
+          <p:cNvPr id="28" name="Elbow Connector 27">
+            <a:extLst>
+              <a:ext uri="{FF2B5EF4-FFF2-40B4-BE49-F238E27FC236}">
+                <a16:creationId xmlns:a16="http://schemas.microsoft.com/office/drawing/2014/main" id="{DAF42A89-74D2-E543-5535-62A26AD1C8C6}"/>
+              </a:ext>
+            </a:extLst>
+          </p:cNvPr>
+          <p:cNvCxnSpPr>
+            <a:cxnSpLocks/>
+          </p:cNvCxnSpPr>
+          <p:nvPr/>
+        </p:nvCxnSpPr>
+        <p:spPr>
+          <a:xfrm>
+            <a:off x="430299" y="2472754"/>
+            <a:ext cx="4896266" cy="1369173"/>
+          </a:xfrm>
+          <a:prstGeom prst="bentConnector3">
+            <a:avLst>
+              <a:gd name="adj1" fmla="val -5115"/>
+            </a:avLst>
+          </a:prstGeom>
+          <a:ln w="12700">
+            <a:solidFill>
+              <a:schemeClr val="accent6"/>
+            </a:solidFill>
+            <a:prstDash val="dash"/>
+            <a:headEnd type="none" w="med" len="med"/>
+            <a:tailEnd type="triangle" w="med" len="med"/>
+          </a:ln>
+        </p:spPr>
+        <p:style>
+          <a:lnRef idx="2">
+            <a:schemeClr val="accent6"/>
+          </a:lnRef>
+          <a:fillRef idx="0">
+            <a:schemeClr val="accent6"/>
+          </a:fillRef>
+          <a:effectRef idx="1">
+            <a:schemeClr val="accent6"/>
+          </a:effectRef>
+          <a:fontRef idx="minor">
+            <a:schemeClr val="tx1"/>
+          </a:fontRef>
+        </p:style>
+      </p:cxnSp>
+      <p:sp>
+        <p:nvSpPr>
+          <p:cNvPr id="7" name="Flowchart: Connector 6">
+            <a:extLst>
+              <a:ext uri="{FF2B5EF4-FFF2-40B4-BE49-F238E27FC236}">
+                <a16:creationId xmlns:a16="http://schemas.microsoft.com/office/drawing/2014/main" id="{A4AEECE8-1B27-B3A7-BDA4-A61439694A86}"/>
+              </a:ext>
+            </a:extLst>
+          </p:cNvPr>
+          <p:cNvSpPr/>
+          <p:nvPr/>
+        </p:nvSpPr>
+        <p:spPr>
+          <a:xfrm>
+            <a:off x="3797156" y="3732862"/>
+            <a:ext cx="344060" cy="263154"/>
+          </a:xfrm>
+          <a:prstGeom prst="flowChartConnector">
+            <a:avLst/>
+          </a:prstGeom>
+          <a:solidFill>
+            <a:schemeClr val="bg1"/>
+          </a:solidFill>
+          <a:ln>
+            <a:solidFill>
+              <a:srgbClr val="00B050"/>
+            </a:solidFill>
+          </a:ln>
+        </p:spPr>
+        <p:style>
+          <a:lnRef idx="2">
+            <a:schemeClr val="accent1">
+              <a:shade val="50000"/>
+            </a:schemeClr>
+          </a:lnRef>
+          <a:fillRef idx="1">
+            <a:schemeClr val="accent1"/>
+          </a:fillRef>
+          <a:effectRef idx="0">
+            <a:schemeClr val="accent1"/>
+          </a:effectRef>
+          <a:fontRef idx="minor">
+            <a:schemeClr val="lt1"/>
+          </a:fontRef>
+        </p:style>
+        <p:txBody>
+          <a:bodyPr lIns="0" tIns="0" rIns="0" bIns="0" rtlCol="0" anchor="ctr"/>
+          <a:lstStyle/>
+          <a:p>
+            <a:pPr algn="ctr"/>
+            <a:r>
+              <a:rPr lang="en-US" sz="1000" dirty="0">
+                <a:solidFill>
+                  <a:srgbClr val="00B050"/>
+                </a:solidFill>
+              </a:rPr>
+              <a:t>S1c</a:t>
+            </a:r>
+          </a:p>
+        </p:txBody>
+      </p:sp>
+    </p:spTree>
+    <p:extLst>
+      <p:ext uri="{BB962C8B-B14F-4D97-AF65-F5344CB8AC3E}">
+        <p14:creationId xmlns:p14="http://schemas.microsoft.com/office/powerpoint/2010/main" val="3898920289"/>
+      </p:ext>
+    </p:extLst>
+  </p:cSld>
+  <p:clrMapOvr>
+    <a:masterClrMapping/>
+  </p:clrMapOvr>
+</p:sld>
+</file>
+
 <file path=ppt/theme/theme1.xml><?xml version="1.0" encoding="utf-8"?>
 <a:theme xmlns:a="http://schemas.openxmlformats.org/drawingml/2006/main" name="Office Theme">
   <a:themeElements>

</xml_diff>